<commit_message>
modified:   "Documentation/Spanish/Documentaci\303\263n.docx" 	modified:   Presentation-demo/MN_QMP_Demo.pptx
</commit_message>
<xml_diff>
--- a/Presentation-demo/MN_QMP_Demo.pptx
+++ b/Presentation-demo/MN_QMP_Demo.pptx
@@ -5,7 +5,7 @@
     <p:sldMasterId id="2147483660" r:id="rId1"/>
   </p:sldMasterIdLst>
   <p:notesMasterIdLst>
-    <p:notesMasterId r:id="rId10"/>
+    <p:notesMasterId r:id="rId14"/>
   </p:notesMasterIdLst>
   <p:sldIdLst>
     <p:sldId id="256" r:id="rId2"/>
@@ -14,8 +14,12 @@
     <p:sldId id="260" r:id="rId5"/>
     <p:sldId id="267" r:id="rId6"/>
     <p:sldId id="268" r:id="rId7"/>
-    <p:sldId id="269" r:id="rId8"/>
-    <p:sldId id="262" r:id="rId9"/>
+    <p:sldId id="271" r:id="rId8"/>
+    <p:sldId id="273" r:id="rId9"/>
+    <p:sldId id="269" r:id="rId10"/>
+    <p:sldId id="272" r:id="rId11"/>
+    <p:sldId id="270" r:id="rId12"/>
+    <p:sldId id="262" r:id="rId13"/>
   </p:sldIdLst>
   <p:sldSz cx="9144000" cy="6858000" type="screen4x3"/>
   <p:notesSz cx="6858000" cy="9144000"/>
@@ -200,7 +204,7 @@
             <a:fld id="{55E5443F-E353-429A-B0E4-7B65604E2DF0}" type="datetimeFigureOut">
               <a:rPr lang="ru-RU" smtClean="0"/>
               <a:pPr/>
-              <a:t>04.03.2013</a:t>
+              <a:t>05.03.2013</a:t>
             </a:fld>
             <a:endParaRPr lang="ru-RU"/>
           </a:p>
@@ -369,7 +373,7 @@
     </p:spTree>
     <p:extLst>
       <p:ext uri="{BB962C8B-B14F-4D97-AF65-F5344CB8AC3E}">
-        <p14:creationId xmlns:p14="http://schemas.microsoft.com/office/powerpoint/2010/main" xmlns="" val="2089319304"/>
+        <p14:creationId xmlns="" xmlns:p14="http://schemas.microsoft.com/office/powerpoint/2010/main" val="2089319304"/>
       </p:ext>
     </p:extLst>
   </p:cSld>
@@ -664,7 +668,7 @@
             <a:fld id="{65D1C55E-B11D-438C-8012-585487039BCD}" type="datetime1">
               <a:rPr lang="ru-RU" smtClean="0"/>
               <a:pPr/>
-              <a:t>04.03.2013</a:t>
+              <a:t>05.03.2013</a:t>
             </a:fld>
             <a:endParaRPr lang="ru-RU"/>
           </a:p>
@@ -831,7 +835,7 @@
             <a:fld id="{D43CF458-E8BA-4D11-B660-B7EDE58252C2}" type="datetime1">
               <a:rPr lang="ru-RU" smtClean="0"/>
               <a:pPr/>
-              <a:t>04.03.2013</a:t>
+              <a:t>05.03.2013</a:t>
             </a:fld>
             <a:endParaRPr lang="ru-RU"/>
           </a:p>
@@ -1008,7 +1012,7 @@
             <a:fld id="{D76480F4-9944-4231-A2FC-ACBF0C541F07}" type="datetime1">
               <a:rPr lang="ru-RU" smtClean="0"/>
               <a:pPr/>
-              <a:t>04.03.2013</a:t>
+              <a:t>05.03.2013</a:t>
             </a:fld>
             <a:endParaRPr lang="ru-RU"/>
           </a:p>
@@ -1175,7 +1179,7 @@
             <a:fld id="{0ABA554F-15B7-4471-954B-B09B3D6EBBF1}" type="datetime1">
               <a:rPr lang="ru-RU" smtClean="0"/>
               <a:pPr/>
-              <a:t>04.03.2013</a:t>
+              <a:t>05.03.2013</a:t>
             </a:fld>
             <a:endParaRPr lang="ru-RU"/>
           </a:p>
@@ -1418,7 +1422,7 @@
             <a:fld id="{193206D4-02DB-42E0-93CE-7D2D2568A31F}" type="datetime1">
               <a:rPr lang="ru-RU" smtClean="0"/>
               <a:pPr/>
-              <a:t>04.03.2013</a:t>
+              <a:t>05.03.2013</a:t>
             </a:fld>
             <a:endParaRPr lang="ru-RU"/>
           </a:p>
@@ -1703,7 +1707,7 @@
             <a:fld id="{626C50A8-49AA-42C6-A936-43CA5B1F5E8C}" type="datetime1">
               <a:rPr lang="ru-RU" smtClean="0"/>
               <a:pPr/>
-              <a:t>04.03.2013</a:t>
+              <a:t>05.03.2013</a:t>
             </a:fld>
             <a:endParaRPr lang="ru-RU"/>
           </a:p>
@@ -2134,7 +2138,7 @@
             <a:fld id="{BCAD40CC-8075-46F1-8DC6-60D6F6E6F283}" type="datetime1">
               <a:rPr lang="ru-RU" smtClean="0"/>
               <a:pPr/>
-              <a:t>04.03.2013</a:t>
+              <a:t>05.03.2013</a:t>
             </a:fld>
             <a:endParaRPr lang="ru-RU"/>
           </a:p>
@@ -2249,7 +2253,7 @@
             <a:fld id="{273125D8-D6B7-4598-A720-622DD29B88E5}" type="datetime1">
               <a:rPr lang="ru-RU" smtClean="0"/>
               <a:pPr/>
-              <a:t>04.03.2013</a:t>
+              <a:t>05.03.2013</a:t>
             </a:fld>
             <a:endParaRPr lang="ru-RU"/>
           </a:p>
@@ -2341,7 +2345,7 @@
             <a:fld id="{F96B8079-F953-4D97-9271-6C73546CD683}" type="datetime1">
               <a:rPr lang="ru-RU" smtClean="0"/>
               <a:pPr/>
-              <a:t>04.03.2013</a:t>
+              <a:t>05.03.2013</a:t>
             </a:fld>
             <a:endParaRPr lang="ru-RU"/>
           </a:p>
@@ -2532,7 +2536,7 @@
             <a:fld id="{D3BC4E32-C344-47BA-8C91-74F8F7BE8607}" type="datetime1">
               <a:rPr lang="ru-RU" smtClean="0"/>
               <a:pPr/>
-              <a:t>04.03.2013</a:t>
+              <a:t>05.03.2013</a:t>
             </a:fld>
             <a:endParaRPr lang="ru-RU"/>
           </a:p>
@@ -2852,7 +2856,7 @@
             <a:fld id="{56E44682-18C2-4899-90E2-EA3C96A5D216}" type="datetime1">
               <a:rPr lang="ru-RU" smtClean="0"/>
               <a:pPr/>
-              <a:t>04.03.2013</a:t>
+              <a:t>05.03.2013</a:t>
             </a:fld>
             <a:endParaRPr lang="ru-RU"/>
           </a:p>
@@ -3234,7 +3238,7 @@
             <a:fld id="{366EE1AE-826B-4213-A73B-DC4CAF3252C2}" type="datetime1">
               <a:rPr lang="ru-RU" smtClean="0"/>
               <a:pPr/>
-              <a:t>04.03.2013</a:t>
+              <a:t>05.03.2013</a:t>
             </a:fld>
             <a:endParaRPr lang="ru-RU"/>
           </a:p>
@@ -3626,17 +3630,8 @@
             </a:r>
             <a:r>
               <a:rPr lang="es-ES_tradnl" dirty="0" smtClean="0"/>
-              <a:t>			</a:t>
-            </a:r>
-            <a:r>
-              <a:rPr lang="es-ES_tradnl" dirty="0" smtClean="0"/>
-              <a:t>04</a:t>
-            </a:r>
-            <a:r>
-              <a:rPr lang="es-ES_tradnl" dirty="0" smtClean="0"/>
-              <a:t>-03-2013</a:t>
-            </a:r>
-            <a:endParaRPr lang="es-ES_tradnl" dirty="0" smtClean="0"/>
+              <a:t>			04-03-2013</a:t>
+            </a:r>
           </a:p>
           <a:p>
             <a:r>
@@ -3654,7 +3649,1471 @@
     </p:spTree>
     <p:extLst>
       <p:ext uri="{BB962C8B-B14F-4D97-AF65-F5344CB8AC3E}">
-        <p14:creationId xmlns:p14="http://schemas.microsoft.com/office/powerpoint/2010/main" xmlns="" val="1584798069"/>
+        <p14:creationId xmlns="" xmlns:p14="http://schemas.microsoft.com/office/powerpoint/2010/main" val="1584798069"/>
+      </p:ext>
+    </p:extLst>
+  </p:cSld>
+  <p:clrMapOvr>
+    <a:masterClrMapping/>
+  </p:clrMapOvr>
+  <p:timing>
+    <p:tnLst>
+      <p:par>
+        <p:cTn id="1" dur="indefinite" restart="never" nodeType="tmRoot"/>
+      </p:par>
+    </p:tnLst>
+  </p:timing>
+</p:sld>
+</file>
+
+<file path=ppt/slides/slide10.xml><?xml version="1.0" encoding="utf-8"?>
+<p:sld xmlns:a="http://schemas.openxmlformats.org/drawingml/2006/main" xmlns:r="http://schemas.openxmlformats.org/officeDocument/2006/relationships" xmlns:p="http://schemas.openxmlformats.org/presentationml/2006/main">
+  <p:cSld>
+    <p:spTree>
+      <p:nvGrpSpPr>
+        <p:cNvPr id="1" name=""/>
+        <p:cNvGrpSpPr/>
+        <p:nvPr/>
+      </p:nvGrpSpPr>
+      <p:grpSpPr>
+        <a:xfrm>
+          <a:off x="0" y="0"/>
+          <a:ext cx="0" cy="0"/>
+          <a:chOff x="0" y="0"/>
+          <a:chExt cx="0" cy="0"/>
+        </a:xfrm>
+      </p:grpSpPr>
+      <p:sp>
+        <p:nvSpPr>
+          <p:cNvPr id="2" name="1 Título"/>
+          <p:cNvSpPr>
+            <a:spLocks noGrp="1"/>
+          </p:cNvSpPr>
+          <p:nvPr>
+            <p:ph type="title"/>
+          </p:nvPr>
+        </p:nvSpPr>
+        <p:spPr/>
+        <p:txBody>
+          <a:bodyPr/>
+          <a:lstStyle/>
+          <a:p>
+            <a:r>
+              <a:rPr lang="es-ES" dirty="0" smtClean="0"/>
+              <a:t>QMP</a:t>
+            </a:r>
+            <a:endParaRPr lang="es-ES" dirty="0"/>
+          </a:p>
+        </p:txBody>
+      </p:sp>
+      <p:sp>
+        <p:nvSpPr>
+          <p:cNvPr id="3" name="2 Marcador de contenido"/>
+          <p:cNvSpPr>
+            <a:spLocks noGrp="1"/>
+          </p:cNvSpPr>
+          <p:nvPr>
+            <p:ph idx="1"/>
+          </p:nvPr>
+        </p:nvSpPr>
+        <p:spPr/>
+        <p:txBody>
+          <a:bodyPr/>
+          <a:lstStyle/>
+          <a:p>
+            <a:pPr algn="just">
+              <a:buNone/>
+            </a:pPr>
+            <a:r>
+              <a:rPr lang="en-US" b="1" dirty="0" smtClean="0"/>
+              <a:t>BMX6</a:t>
+            </a:r>
+          </a:p>
+          <a:p>
+            <a:pPr algn="just"/>
+            <a:r>
+              <a:rPr lang="en-US" dirty="0" smtClean="0"/>
+              <a:t>Pro-active: Uses UDP flooding to periodically send Originator Messages (OGM) and build a routing table.</a:t>
+            </a:r>
+          </a:p>
+          <a:p>
+            <a:pPr algn="just"/>
+            <a:r>
+              <a:rPr lang="en-US" dirty="0" smtClean="0"/>
+              <a:t>Destination-sequenced, Distance-vector (DSDV): Every node just knows which neighbor is better to reach another, namely, they do not need to know the entire topology, just the best paths.</a:t>
+            </a:r>
+          </a:p>
+          <a:p>
+            <a:endParaRPr lang="es-ES" dirty="0" smtClean="0"/>
+          </a:p>
+          <a:p>
+            <a:pPr>
+              <a:buNone/>
+            </a:pPr>
+            <a:endParaRPr lang="es-ES" b="1" dirty="0"/>
+          </a:p>
+        </p:txBody>
+      </p:sp>
+      <p:sp>
+        <p:nvSpPr>
+          <p:cNvPr id="4" name="3 Marcador de número de diapositiva"/>
+          <p:cNvSpPr>
+            <a:spLocks noGrp="1"/>
+          </p:cNvSpPr>
+          <p:nvPr>
+            <p:ph type="sldNum" sz="quarter" idx="12"/>
+          </p:nvPr>
+        </p:nvSpPr>
+        <p:spPr/>
+        <p:txBody>
+          <a:bodyPr/>
+          <a:lstStyle/>
+          <a:p>
+            <a:fld id="{DA3FA644-4273-4B12-888A-E74B32B8A478}" type="slidenum">
+              <a:rPr lang="ru-RU" smtClean="0"/>
+              <a:pPr/>
+              <a:t>10</a:t>
+            </a:fld>
+            <a:endParaRPr lang="ru-RU"/>
+          </a:p>
+        </p:txBody>
+      </p:sp>
+      <p:pic>
+        <p:nvPicPr>
+          <p:cNvPr id="2051" name="Picture 3"/>
+          <p:cNvPicPr>
+            <a:picLocks noChangeAspect="1" noChangeArrowheads="1"/>
+          </p:cNvPicPr>
+          <p:nvPr/>
+        </p:nvPicPr>
+        <p:blipFill>
+          <a:blip r:embed="rId2" cstate="print"/>
+          <a:srcRect/>
+          <a:stretch>
+            <a:fillRect/>
+          </a:stretch>
+        </p:blipFill>
+        <p:spPr bwMode="auto">
+          <a:xfrm>
+            <a:off x="1331640" y="0"/>
+            <a:ext cx="5712397" cy="3667068"/>
+          </a:xfrm>
+          <a:prstGeom prst="rect">
+            <a:avLst/>
+          </a:prstGeom>
+          <a:noFill/>
+          <a:ln w="9525">
+            <a:noFill/>
+            <a:miter lim="800000"/>
+            <a:headEnd/>
+            <a:tailEnd/>
+          </a:ln>
+        </p:spPr>
+      </p:pic>
+      <p:graphicFrame>
+        <p:nvGraphicFramePr>
+          <p:cNvPr id="19" name="18 Tabla"/>
+          <p:cNvGraphicFramePr>
+            <a:graphicFrameLocks noGrp="1"/>
+          </p:cNvGraphicFramePr>
+          <p:nvPr/>
+        </p:nvGraphicFramePr>
+        <p:xfrm>
+          <a:off x="1403648" y="4437112"/>
+          <a:ext cx="6096000" cy="1905635"/>
+        </p:xfrm>
+        <a:graphic>
+          <a:graphicData uri="http://schemas.openxmlformats.org/drawingml/2006/table">
+            <a:tbl>
+              <a:tblPr firstRow="1" bandRow="1">
+                <a:tableStyleId>{5C22544A-7EE6-4342-B048-85BDC9FD1C3A}</a:tableStyleId>
+              </a:tblPr>
+              <a:tblGrid>
+                <a:gridCol w="1016000"/>
+                <a:gridCol w="1016000"/>
+                <a:gridCol w="1016000"/>
+                <a:gridCol w="1016000"/>
+                <a:gridCol w="1016000"/>
+                <a:gridCol w="1016000"/>
+              </a:tblGrid>
+              <a:tr h="381127">
+                <a:tc gridSpan="6">
+                  <a:txBody>
+                    <a:bodyPr/>
+                    <a:lstStyle/>
+                    <a:p>
+                      <a:pPr algn="ctr"/>
+                      <a:r>
+                        <a:rPr lang="en-US" noProof="0" dirty="0" smtClean="0"/>
+                        <a:t>Best Path to A</a:t>
+                      </a:r>
+                      <a:endParaRPr lang="en-US" noProof="0" dirty="0"/>
+                    </a:p>
+                  </a:txBody>
+                  <a:tcPr/>
+                </a:tc>
+                <a:tc hMerge="1">
+                  <a:txBody>
+                    <a:bodyPr/>
+                    <a:lstStyle/>
+                    <a:p>
+                      <a:pPr algn="ctr"/>
+                      <a:endParaRPr lang="en-US" noProof="0" dirty="0"/>
+                    </a:p>
+                  </a:txBody>
+                  <a:tcPr/>
+                </a:tc>
+                <a:tc hMerge="1">
+                  <a:txBody>
+                    <a:bodyPr/>
+                    <a:lstStyle/>
+                    <a:p>
+                      <a:pPr algn="ctr"/>
+                      <a:endParaRPr lang="en-US" noProof="0" dirty="0"/>
+                    </a:p>
+                  </a:txBody>
+                  <a:tcPr/>
+                </a:tc>
+                <a:tc hMerge="1">
+                  <a:txBody>
+                    <a:bodyPr/>
+                    <a:lstStyle/>
+                    <a:p>
+                      <a:pPr algn="ctr"/>
+                      <a:endParaRPr lang="en-US" noProof="0" dirty="0"/>
+                    </a:p>
+                  </a:txBody>
+                  <a:tcPr/>
+                </a:tc>
+                <a:tc hMerge="1">
+                  <a:txBody>
+                    <a:bodyPr/>
+                    <a:lstStyle/>
+                    <a:p>
+                      <a:pPr algn="ctr"/>
+                      <a:endParaRPr lang="en-US" noProof="0" dirty="0"/>
+                    </a:p>
+                  </a:txBody>
+                  <a:tcPr/>
+                </a:tc>
+                <a:tc hMerge="1">
+                  <a:txBody>
+                    <a:bodyPr/>
+                    <a:lstStyle/>
+                    <a:p>
+                      <a:pPr algn="ctr"/>
+                      <a:endParaRPr lang="en-US" noProof="0" dirty="0"/>
+                    </a:p>
+                  </a:txBody>
+                  <a:tcPr/>
+                </a:tc>
+              </a:tr>
+              <a:tr h="381127">
+                <a:tc>
+                  <a:txBody>
+                    <a:bodyPr/>
+                    <a:lstStyle/>
+                    <a:p>
+                      <a:pPr algn="ctr"/>
+                      <a:r>
+                        <a:rPr lang="en-US" noProof="0" dirty="0" smtClean="0"/>
+                        <a:t>Step</a:t>
+                      </a:r>
+                      <a:endParaRPr lang="en-US" noProof="0" dirty="0"/>
+                    </a:p>
+                  </a:txBody>
+                  <a:tcPr>
+                    <a:solidFill>
+                      <a:schemeClr val="accent6"/>
+                    </a:solidFill>
+                  </a:tcPr>
+                </a:tc>
+                <a:tc>
+                  <a:txBody>
+                    <a:bodyPr/>
+                    <a:lstStyle/>
+                    <a:p>
+                      <a:pPr algn="ctr"/>
+                      <a:r>
+                        <a:rPr lang="en-US" noProof="0" dirty="0" smtClean="0"/>
+                        <a:t>B</a:t>
+                      </a:r>
+                      <a:endParaRPr lang="en-US" noProof="0" dirty="0"/>
+                    </a:p>
+                  </a:txBody>
+                  <a:tcPr>
+                    <a:solidFill>
+                      <a:schemeClr val="accent6"/>
+                    </a:solidFill>
+                  </a:tcPr>
+                </a:tc>
+                <a:tc>
+                  <a:txBody>
+                    <a:bodyPr/>
+                    <a:lstStyle/>
+                    <a:p>
+                      <a:pPr algn="ctr"/>
+                      <a:r>
+                        <a:rPr lang="en-US" noProof="0" dirty="0" smtClean="0"/>
+                        <a:t>C</a:t>
+                      </a:r>
+                      <a:endParaRPr lang="en-US" noProof="0" dirty="0"/>
+                    </a:p>
+                  </a:txBody>
+                  <a:tcPr>
+                    <a:solidFill>
+                      <a:schemeClr val="accent6"/>
+                    </a:solidFill>
+                  </a:tcPr>
+                </a:tc>
+                <a:tc>
+                  <a:txBody>
+                    <a:bodyPr/>
+                    <a:lstStyle/>
+                    <a:p>
+                      <a:pPr algn="ctr"/>
+                      <a:r>
+                        <a:rPr lang="en-US" noProof="0" dirty="0" smtClean="0"/>
+                        <a:t>E</a:t>
+                      </a:r>
+                      <a:endParaRPr lang="en-US" noProof="0" dirty="0"/>
+                    </a:p>
+                  </a:txBody>
+                  <a:tcPr>
+                    <a:solidFill>
+                      <a:schemeClr val="accent6"/>
+                    </a:solidFill>
+                  </a:tcPr>
+                </a:tc>
+                <a:tc>
+                  <a:txBody>
+                    <a:bodyPr/>
+                    <a:lstStyle/>
+                    <a:p>
+                      <a:pPr algn="ctr"/>
+                      <a:r>
+                        <a:rPr lang="en-US" noProof="0" dirty="0" smtClean="0"/>
+                        <a:t>D</a:t>
+                      </a:r>
+                      <a:endParaRPr lang="en-US" noProof="0" dirty="0"/>
+                    </a:p>
+                  </a:txBody>
+                  <a:tcPr>
+                    <a:solidFill>
+                      <a:schemeClr val="accent6"/>
+                    </a:solidFill>
+                  </a:tcPr>
+                </a:tc>
+                <a:tc>
+                  <a:txBody>
+                    <a:bodyPr/>
+                    <a:lstStyle/>
+                    <a:p>
+                      <a:pPr algn="ctr"/>
+                      <a:r>
+                        <a:rPr lang="en-US" noProof="0" dirty="0" smtClean="0"/>
+                        <a:t>F</a:t>
+                      </a:r>
+                      <a:endParaRPr lang="en-US" noProof="0" dirty="0"/>
+                    </a:p>
+                  </a:txBody>
+                  <a:tcPr>
+                    <a:solidFill>
+                      <a:schemeClr val="accent6"/>
+                    </a:solidFill>
+                  </a:tcPr>
+                </a:tc>
+              </a:tr>
+              <a:tr h="381127">
+                <a:tc>
+                  <a:txBody>
+                    <a:bodyPr/>
+                    <a:lstStyle/>
+                    <a:p>
+                      <a:pPr algn="ctr"/>
+                      <a:r>
+                        <a:rPr lang="en-US" noProof="0" dirty="0" smtClean="0"/>
+                        <a:t>1</a:t>
+                      </a:r>
+                      <a:endParaRPr lang="en-US" noProof="0" dirty="0"/>
+                    </a:p>
+                  </a:txBody>
+                  <a:tcPr/>
+                </a:tc>
+                <a:tc>
+                  <a:txBody>
+                    <a:bodyPr/>
+                    <a:lstStyle/>
+                    <a:p>
+                      <a:pPr algn="ctr"/>
+                      <a:r>
+                        <a:rPr lang="en-US" noProof="0" dirty="0" smtClean="0"/>
+                        <a:t>A</a:t>
+                      </a:r>
+                      <a:endParaRPr lang="en-US" noProof="0" dirty="0"/>
+                    </a:p>
+                  </a:txBody>
+                  <a:tcPr/>
+                </a:tc>
+                <a:tc>
+                  <a:txBody>
+                    <a:bodyPr/>
+                    <a:lstStyle/>
+                    <a:p>
+                      <a:pPr algn="ctr"/>
+                      <a:r>
+                        <a:rPr lang="en-US" noProof="0" dirty="0" smtClean="0"/>
+                        <a:t>-</a:t>
+                      </a:r>
+                      <a:endParaRPr lang="en-US" noProof="0" dirty="0"/>
+                    </a:p>
+                  </a:txBody>
+                  <a:tcPr/>
+                </a:tc>
+                <a:tc>
+                  <a:txBody>
+                    <a:bodyPr/>
+                    <a:lstStyle/>
+                    <a:p>
+                      <a:pPr algn="ctr"/>
+                      <a:r>
+                        <a:rPr lang="en-US" noProof="0" dirty="0" smtClean="0"/>
+                        <a:t>A</a:t>
+                      </a:r>
+                      <a:endParaRPr lang="en-US" noProof="0" dirty="0"/>
+                    </a:p>
+                  </a:txBody>
+                  <a:tcPr/>
+                </a:tc>
+                <a:tc>
+                  <a:txBody>
+                    <a:bodyPr/>
+                    <a:lstStyle/>
+                    <a:p>
+                      <a:pPr algn="ctr"/>
+                      <a:r>
+                        <a:rPr lang="en-US" noProof="0" dirty="0" smtClean="0"/>
+                        <a:t>-</a:t>
+                      </a:r>
+                      <a:endParaRPr lang="en-US" noProof="0" dirty="0"/>
+                    </a:p>
+                  </a:txBody>
+                  <a:tcPr/>
+                </a:tc>
+                <a:tc>
+                  <a:txBody>
+                    <a:bodyPr/>
+                    <a:lstStyle/>
+                    <a:p>
+                      <a:pPr algn="ctr"/>
+                      <a:r>
+                        <a:rPr lang="en-US" noProof="0" dirty="0" smtClean="0"/>
+                        <a:t>-</a:t>
+                      </a:r>
+                      <a:endParaRPr lang="en-US" noProof="0" dirty="0"/>
+                    </a:p>
+                  </a:txBody>
+                  <a:tcPr/>
+                </a:tc>
+              </a:tr>
+              <a:tr h="381127">
+                <a:tc>
+                  <a:txBody>
+                    <a:bodyPr/>
+                    <a:lstStyle/>
+                    <a:p>
+                      <a:pPr algn="ctr"/>
+                      <a:r>
+                        <a:rPr lang="en-US" noProof="0" dirty="0" smtClean="0"/>
+                        <a:t>2</a:t>
+                      </a:r>
+                      <a:endParaRPr lang="en-US" noProof="0" dirty="0"/>
+                    </a:p>
+                  </a:txBody>
+                  <a:tcPr/>
+                </a:tc>
+                <a:tc>
+                  <a:txBody>
+                    <a:bodyPr/>
+                    <a:lstStyle/>
+                    <a:p>
+                      <a:pPr algn="ctr"/>
+                      <a:r>
+                        <a:rPr lang="en-US" noProof="0" dirty="0" smtClean="0"/>
+                        <a:t>A</a:t>
+                      </a:r>
+                      <a:endParaRPr lang="en-US" noProof="0" dirty="0"/>
+                    </a:p>
+                  </a:txBody>
+                  <a:tcPr/>
+                </a:tc>
+                <a:tc>
+                  <a:txBody>
+                    <a:bodyPr/>
+                    <a:lstStyle/>
+                    <a:p>
+                      <a:pPr algn="ctr"/>
+                      <a:r>
+                        <a:rPr lang="en-US" noProof="0" dirty="0" smtClean="0"/>
+                        <a:t>B</a:t>
+                      </a:r>
+                      <a:endParaRPr lang="en-US" noProof="0" dirty="0"/>
+                    </a:p>
+                  </a:txBody>
+                  <a:tcPr/>
+                </a:tc>
+                <a:tc>
+                  <a:txBody>
+                    <a:bodyPr/>
+                    <a:lstStyle/>
+                    <a:p>
+                      <a:pPr algn="ctr"/>
+                      <a:r>
+                        <a:rPr lang="en-US" noProof="0" dirty="0" smtClean="0"/>
+                        <a:t>A</a:t>
+                      </a:r>
+                      <a:endParaRPr lang="en-US" noProof="0" dirty="0"/>
+                    </a:p>
+                  </a:txBody>
+                  <a:tcPr/>
+                </a:tc>
+                <a:tc>
+                  <a:txBody>
+                    <a:bodyPr/>
+                    <a:lstStyle/>
+                    <a:p>
+                      <a:pPr algn="ctr"/>
+                      <a:r>
+                        <a:rPr lang="en-US" noProof="0" dirty="0" smtClean="0"/>
+                        <a:t>-</a:t>
+                      </a:r>
+                      <a:endParaRPr lang="en-US" noProof="0" dirty="0"/>
+                    </a:p>
+                  </a:txBody>
+                  <a:tcPr/>
+                </a:tc>
+                <a:tc>
+                  <a:txBody>
+                    <a:bodyPr/>
+                    <a:lstStyle/>
+                    <a:p>
+                      <a:pPr algn="ctr"/>
+                      <a:r>
+                        <a:rPr lang="en-US" noProof="0" dirty="0" smtClean="0"/>
+                        <a:t>E</a:t>
+                      </a:r>
+                      <a:endParaRPr lang="en-US" noProof="0" dirty="0"/>
+                    </a:p>
+                  </a:txBody>
+                  <a:tcPr/>
+                </a:tc>
+              </a:tr>
+              <a:tr h="381127">
+                <a:tc>
+                  <a:txBody>
+                    <a:bodyPr/>
+                    <a:lstStyle/>
+                    <a:p>
+                      <a:pPr algn="ctr"/>
+                      <a:r>
+                        <a:rPr lang="en-US" noProof="0" dirty="0" smtClean="0"/>
+                        <a:t>3</a:t>
+                      </a:r>
+                      <a:endParaRPr lang="en-US" noProof="0" dirty="0"/>
+                    </a:p>
+                  </a:txBody>
+                  <a:tcPr/>
+                </a:tc>
+                <a:tc>
+                  <a:txBody>
+                    <a:bodyPr/>
+                    <a:lstStyle/>
+                    <a:p>
+                      <a:pPr algn="ctr"/>
+                      <a:r>
+                        <a:rPr lang="en-US" noProof="0" dirty="0" smtClean="0"/>
+                        <a:t>A</a:t>
+                      </a:r>
+                      <a:endParaRPr lang="en-US" noProof="0" dirty="0"/>
+                    </a:p>
+                  </a:txBody>
+                  <a:tcPr/>
+                </a:tc>
+                <a:tc>
+                  <a:txBody>
+                    <a:bodyPr/>
+                    <a:lstStyle/>
+                    <a:p>
+                      <a:pPr algn="ctr"/>
+                      <a:r>
+                        <a:rPr lang="en-US" noProof="0" dirty="0" smtClean="0"/>
+                        <a:t>B</a:t>
+                      </a:r>
+                      <a:endParaRPr lang="en-US" noProof="0" dirty="0"/>
+                    </a:p>
+                  </a:txBody>
+                  <a:tcPr/>
+                </a:tc>
+                <a:tc>
+                  <a:txBody>
+                    <a:bodyPr/>
+                    <a:lstStyle/>
+                    <a:p>
+                      <a:pPr algn="ctr"/>
+                      <a:r>
+                        <a:rPr lang="en-US" noProof="0" dirty="0" smtClean="0"/>
+                        <a:t>A</a:t>
+                      </a:r>
+                      <a:endParaRPr lang="en-US" noProof="0" dirty="0"/>
+                    </a:p>
+                  </a:txBody>
+                  <a:tcPr/>
+                </a:tc>
+                <a:tc>
+                  <a:txBody>
+                    <a:bodyPr/>
+                    <a:lstStyle/>
+                    <a:p>
+                      <a:pPr algn="ctr"/>
+                      <a:r>
+                        <a:rPr lang="en-US" noProof="0" dirty="0" smtClean="0"/>
+                        <a:t>C</a:t>
+                      </a:r>
+                      <a:endParaRPr lang="en-US" noProof="0" dirty="0"/>
+                    </a:p>
+                  </a:txBody>
+                  <a:tcPr/>
+                </a:tc>
+                <a:tc>
+                  <a:txBody>
+                    <a:bodyPr/>
+                    <a:lstStyle/>
+                    <a:p>
+                      <a:pPr algn="ctr"/>
+                      <a:r>
+                        <a:rPr lang="en-US" noProof="0" dirty="0" smtClean="0"/>
+                        <a:t>E</a:t>
+                      </a:r>
+                      <a:endParaRPr lang="en-US" noProof="0" dirty="0"/>
+                    </a:p>
+                  </a:txBody>
+                  <a:tcPr/>
+                </a:tc>
+              </a:tr>
+            </a:tbl>
+          </a:graphicData>
+        </a:graphic>
+      </p:graphicFrame>
+    </p:spTree>
+  </p:cSld>
+  <p:clrMapOvr>
+    <a:masterClrMapping/>
+  </p:clrMapOvr>
+  <p:timing>
+    <p:tnLst>
+      <p:par>
+        <p:cTn id="1" dur="indefinite" restart="never" nodeType="tmRoot">
+          <p:childTnLst>
+            <p:seq concurrent="1" nextAc="seek">
+              <p:cTn id="2" dur="indefinite" nodeType="mainSeq">
+                <p:childTnLst>
+                  <p:par>
+                    <p:cTn id="3" fill="hold">
+                      <p:stCondLst>
+                        <p:cond delay="indefinite"/>
+                      </p:stCondLst>
+                      <p:childTnLst>
+                        <p:par>
+                          <p:cTn id="4" fill="hold">
+                            <p:stCondLst>
+                              <p:cond delay="0"/>
+                            </p:stCondLst>
+                            <p:childTnLst>
+                              <p:par>
+                                <p:cTn id="5" presetID="30" presetClass="entr" presetSubtype="0" fill="hold" nodeType="clickEffect">
+                                  <p:stCondLst>
+                                    <p:cond delay="0"/>
+                                  </p:stCondLst>
+                                  <p:childTnLst>
+                                    <p:set>
+                                      <p:cBhvr>
+                                        <p:cTn id="6" dur="1" fill="hold">
+                                          <p:stCondLst>
+                                            <p:cond delay="0"/>
+                                          </p:stCondLst>
+                                        </p:cTn>
+                                        <p:tgtEl>
+                                          <p:spTgt spid="2051"/>
+                                        </p:tgtEl>
+                                        <p:attrNameLst>
+                                          <p:attrName>style.visibility</p:attrName>
+                                        </p:attrNameLst>
+                                      </p:cBhvr>
+                                      <p:to>
+                                        <p:strVal val="visible"/>
+                                      </p:to>
+                                    </p:set>
+                                    <p:animEffect transition="in" filter="fade">
+                                      <p:cBhvr>
+                                        <p:cTn id="7" dur="800" decel="100000"/>
+                                        <p:tgtEl>
+                                          <p:spTgt spid="2051"/>
+                                        </p:tgtEl>
+                                      </p:cBhvr>
+                                    </p:animEffect>
+                                    <p:anim calcmode="lin" valueType="num">
+                                      <p:cBhvr>
+                                        <p:cTn id="8" dur="800" decel="100000" fill="hold"/>
+                                        <p:tgtEl>
+                                          <p:spTgt spid="2051"/>
+                                        </p:tgtEl>
+                                        <p:attrNameLst>
+                                          <p:attrName>style.rotation</p:attrName>
+                                        </p:attrNameLst>
+                                      </p:cBhvr>
+                                      <p:tavLst>
+                                        <p:tav tm="0">
+                                          <p:val>
+                                            <p:fltVal val="-90"/>
+                                          </p:val>
+                                        </p:tav>
+                                        <p:tav tm="100000">
+                                          <p:val>
+                                            <p:fltVal val="0"/>
+                                          </p:val>
+                                        </p:tav>
+                                      </p:tavLst>
+                                    </p:anim>
+                                    <p:anim calcmode="lin" valueType="num">
+                                      <p:cBhvr>
+                                        <p:cTn id="9" dur="800" decel="100000" fill="hold"/>
+                                        <p:tgtEl>
+                                          <p:spTgt spid="2051"/>
+                                        </p:tgtEl>
+                                        <p:attrNameLst>
+                                          <p:attrName>ppt_x</p:attrName>
+                                        </p:attrNameLst>
+                                      </p:cBhvr>
+                                      <p:tavLst>
+                                        <p:tav tm="0">
+                                          <p:val>
+                                            <p:strVal val="#ppt_x+0.4"/>
+                                          </p:val>
+                                        </p:tav>
+                                        <p:tav tm="100000">
+                                          <p:val>
+                                            <p:strVal val="#ppt_x-0.05"/>
+                                          </p:val>
+                                        </p:tav>
+                                      </p:tavLst>
+                                    </p:anim>
+                                    <p:anim calcmode="lin" valueType="num">
+                                      <p:cBhvr>
+                                        <p:cTn id="10" dur="800" decel="100000" fill="hold"/>
+                                        <p:tgtEl>
+                                          <p:spTgt spid="2051"/>
+                                        </p:tgtEl>
+                                        <p:attrNameLst>
+                                          <p:attrName>ppt_y</p:attrName>
+                                        </p:attrNameLst>
+                                      </p:cBhvr>
+                                      <p:tavLst>
+                                        <p:tav tm="0">
+                                          <p:val>
+                                            <p:strVal val="#ppt_y-0.4"/>
+                                          </p:val>
+                                        </p:tav>
+                                        <p:tav tm="100000">
+                                          <p:val>
+                                            <p:strVal val="#ppt_y+0.1"/>
+                                          </p:val>
+                                        </p:tav>
+                                      </p:tavLst>
+                                    </p:anim>
+                                    <p:anim calcmode="lin" valueType="num">
+                                      <p:cBhvr>
+                                        <p:cTn id="11" dur="200" accel="100000" fill="hold">
+                                          <p:stCondLst>
+                                            <p:cond delay="800"/>
+                                          </p:stCondLst>
+                                        </p:cTn>
+                                        <p:tgtEl>
+                                          <p:spTgt spid="2051"/>
+                                        </p:tgtEl>
+                                        <p:attrNameLst>
+                                          <p:attrName>ppt_x</p:attrName>
+                                        </p:attrNameLst>
+                                      </p:cBhvr>
+                                      <p:tavLst>
+                                        <p:tav tm="0">
+                                          <p:val>
+                                            <p:strVal val="#ppt_x-0.05"/>
+                                          </p:val>
+                                        </p:tav>
+                                        <p:tav tm="100000">
+                                          <p:val>
+                                            <p:strVal val="#ppt_x"/>
+                                          </p:val>
+                                        </p:tav>
+                                      </p:tavLst>
+                                    </p:anim>
+                                    <p:anim calcmode="lin" valueType="num">
+                                      <p:cBhvr>
+                                        <p:cTn id="12" dur="200" accel="100000" fill="hold">
+                                          <p:stCondLst>
+                                            <p:cond delay="800"/>
+                                          </p:stCondLst>
+                                        </p:cTn>
+                                        <p:tgtEl>
+                                          <p:spTgt spid="2051"/>
+                                        </p:tgtEl>
+                                        <p:attrNameLst>
+                                          <p:attrName>ppt_y</p:attrName>
+                                        </p:attrNameLst>
+                                      </p:cBhvr>
+                                      <p:tavLst>
+                                        <p:tav tm="0">
+                                          <p:val>
+                                            <p:strVal val="#ppt_y+0.1"/>
+                                          </p:val>
+                                        </p:tav>
+                                        <p:tav tm="100000">
+                                          <p:val>
+                                            <p:strVal val="#ppt_y"/>
+                                          </p:val>
+                                        </p:tav>
+                                      </p:tavLst>
+                                    </p:anim>
+                                  </p:childTnLst>
+                                </p:cTn>
+                              </p:par>
+                              <p:par>
+                                <p:cTn id="13" presetID="2" presetClass="entr" presetSubtype="4" fill="hold" nodeType="withEffect">
+                                  <p:stCondLst>
+                                    <p:cond delay="0"/>
+                                  </p:stCondLst>
+                                  <p:childTnLst>
+                                    <p:set>
+                                      <p:cBhvr>
+                                        <p:cTn id="14" dur="1" fill="hold">
+                                          <p:stCondLst>
+                                            <p:cond delay="0"/>
+                                          </p:stCondLst>
+                                        </p:cTn>
+                                        <p:tgtEl>
+                                          <p:spTgt spid="19"/>
+                                        </p:tgtEl>
+                                        <p:attrNameLst>
+                                          <p:attrName>style.visibility</p:attrName>
+                                        </p:attrNameLst>
+                                      </p:cBhvr>
+                                      <p:to>
+                                        <p:strVal val="visible"/>
+                                      </p:to>
+                                    </p:set>
+                                    <p:anim calcmode="lin" valueType="num">
+                                      <p:cBhvr additive="base">
+                                        <p:cTn id="15" dur="500" fill="hold"/>
+                                        <p:tgtEl>
+                                          <p:spTgt spid="19"/>
+                                        </p:tgtEl>
+                                        <p:attrNameLst>
+                                          <p:attrName>ppt_x</p:attrName>
+                                        </p:attrNameLst>
+                                      </p:cBhvr>
+                                      <p:tavLst>
+                                        <p:tav tm="0">
+                                          <p:val>
+                                            <p:strVal val="#ppt_x"/>
+                                          </p:val>
+                                        </p:tav>
+                                        <p:tav tm="100000">
+                                          <p:val>
+                                            <p:strVal val="#ppt_x"/>
+                                          </p:val>
+                                        </p:tav>
+                                      </p:tavLst>
+                                    </p:anim>
+                                    <p:anim calcmode="lin" valueType="num">
+                                      <p:cBhvr additive="base">
+                                        <p:cTn id="16" dur="500" fill="hold"/>
+                                        <p:tgtEl>
+                                          <p:spTgt spid="19"/>
+                                        </p:tgtEl>
+                                        <p:attrNameLst>
+                                          <p:attrName>ppt_y</p:attrName>
+                                        </p:attrNameLst>
+                                      </p:cBhvr>
+                                      <p:tavLst>
+                                        <p:tav tm="0">
+                                          <p:val>
+                                            <p:strVal val="1+#ppt_h/2"/>
+                                          </p:val>
+                                        </p:tav>
+                                        <p:tav tm="100000">
+                                          <p:val>
+                                            <p:strVal val="#ppt_y"/>
+                                          </p:val>
+                                        </p:tav>
+                                      </p:tavLst>
+                                    </p:anim>
+                                  </p:childTnLst>
+                                </p:cTn>
+                              </p:par>
+                              <p:par>
+                                <p:cTn id="17" presetID="4" presetClass="exit" presetSubtype="16" fill="hold" grpId="0" nodeType="withEffect">
+                                  <p:stCondLst>
+                                    <p:cond delay="0"/>
+                                  </p:stCondLst>
+                                  <p:childTnLst>
+                                    <p:animEffect transition="out" filter="box(in)">
+                                      <p:cBhvr>
+                                        <p:cTn id="18" dur="500"/>
+                                        <p:tgtEl>
+                                          <p:spTgt spid="3">
+                                            <p:txEl>
+                                              <p:pRg st="0" end="0"/>
+                                            </p:txEl>
+                                          </p:spTgt>
+                                        </p:tgtEl>
+                                      </p:cBhvr>
+                                    </p:animEffect>
+                                    <p:set>
+                                      <p:cBhvr>
+                                        <p:cTn id="19" dur="1" fill="hold">
+                                          <p:stCondLst>
+                                            <p:cond delay="499"/>
+                                          </p:stCondLst>
+                                        </p:cTn>
+                                        <p:tgtEl>
+                                          <p:spTgt spid="3">
+                                            <p:txEl>
+                                              <p:pRg st="0" end="0"/>
+                                            </p:txEl>
+                                          </p:spTgt>
+                                        </p:tgtEl>
+                                        <p:attrNameLst>
+                                          <p:attrName>style.visibility</p:attrName>
+                                        </p:attrNameLst>
+                                      </p:cBhvr>
+                                      <p:to>
+                                        <p:strVal val="hidden"/>
+                                      </p:to>
+                                    </p:set>
+                                  </p:childTnLst>
+                                </p:cTn>
+                              </p:par>
+                              <p:par>
+                                <p:cTn id="20" presetID="4" presetClass="exit" presetSubtype="16" fill="hold" grpId="0" nodeType="withEffect">
+                                  <p:stCondLst>
+                                    <p:cond delay="0"/>
+                                  </p:stCondLst>
+                                  <p:childTnLst>
+                                    <p:animEffect transition="out" filter="box(in)">
+                                      <p:cBhvr>
+                                        <p:cTn id="21" dur="500"/>
+                                        <p:tgtEl>
+                                          <p:spTgt spid="3">
+                                            <p:txEl>
+                                              <p:pRg st="1" end="1"/>
+                                            </p:txEl>
+                                          </p:spTgt>
+                                        </p:tgtEl>
+                                      </p:cBhvr>
+                                    </p:animEffect>
+                                    <p:set>
+                                      <p:cBhvr>
+                                        <p:cTn id="22" dur="1" fill="hold">
+                                          <p:stCondLst>
+                                            <p:cond delay="499"/>
+                                          </p:stCondLst>
+                                        </p:cTn>
+                                        <p:tgtEl>
+                                          <p:spTgt spid="3">
+                                            <p:txEl>
+                                              <p:pRg st="1" end="1"/>
+                                            </p:txEl>
+                                          </p:spTgt>
+                                        </p:tgtEl>
+                                        <p:attrNameLst>
+                                          <p:attrName>style.visibility</p:attrName>
+                                        </p:attrNameLst>
+                                      </p:cBhvr>
+                                      <p:to>
+                                        <p:strVal val="hidden"/>
+                                      </p:to>
+                                    </p:set>
+                                  </p:childTnLst>
+                                </p:cTn>
+                              </p:par>
+                              <p:par>
+                                <p:cTn id="23" presetID="4" presetClass="exit" presetSubtype="16" fill="hold" grpId="0" nodeType="withEffect">
+                                  <p:stCondLst>
+                                    <p:cond delay="0"/>
+                                  </p:stCondLst>
+                                  <p:childTnLst>
+                                    <p:animEffect transition="out" filter="box(in)">
+                                      <p:cBhvr>
+                                        <p:cTn id="24" dur="500"/>
+                                        <p:tgtEl>
+                                          <p:spTgt spid="3">
+                                            <p:txEl>
+                                              <p:pRg st="2" end="2"/>
+                                            </p:txEl>
+                                          </p:spTgt>
+                                        </p:tgtEl>
+                                      </p:cBhvr>
+                                    </p:animEffect>
+                                    <p:set>
+                                      <p:cBhvr>
+                                        <p:cTn id="25" dur="1" fill="hold">
+                                          <p:stCondLst>
+                                            <p:cond delay="499"/>
+                                          </p:stCondLst>
+                                        </p:cTn>
+                                        <p:tgtEl>
+                                          <p:spTgt spid="3">
+                                            <p:txEl>
+                                              <p:pRg st="2" end="2"/>
+                                            </p:txEl>
+                                          </p:spTgt>
+                                        </p:tgtEl>
+                                        <p:attrNameLst>
+                                          <p:attrName>style.visibility</p:attrName>
+                                        </p:attrNameLst>
+                                      </p:cBhvr>
+                                      <p:to>
+                                        <p:strVal val="hidden"/>
+                                      </p:to>
+                                    </p:set>
+                                  </p:childTnLst>
+                                </p:cTn>
+                              </p:par>
+                              <p:par>
+                                <p:cTn id="26" presetID="8" presetClass="exit" presetSubtype="16" fill="hold" grpId="0" nodeType="withEffect">
+                                  <p:stCondLst>
+                                    <p:cond delay="0"/>
+                                  </p:stCondLst>
+                                  <p:childTnLst>
+                                    <p:animEffect transition="out" filter="diamond(in)">
+                                      <p:cBhvr>
+                                        <p:cTn id="27" dur="500"/>
+                                        <p:tgtEl>
+                                          <p:spTgt spid="2"/>
+                                        </p:tgtEl>
+                                      </p:cBhvr>
+                                    </p:animEffect>
+                                    <p:set>
+                                      <p:cBhvr>
+                                        <p:cTn id="28" dur="1" fill="hold">
+                                          <p:stCondLst>
+                                            <p:cond delay="499"/>
+                                          </p:stCondLst>
+                                        </p:cTn>
+                                        <p:tgtEl>
+                                          <p:spTgt spid="2"/>
+                                        </p:tgtEl>
+                                        <p:attrNameLst>
+                                          <p:attrName>style.visibility</p:attrName>
+                                        </p:attrNameLst>
+                                      </p:cBhvr>
+                                      <p:to>
+                                        <p:strVal val="hidden"/>
+                                      </p:to>
+                                    </p:set>
+                                  </p:childTnLst>
+                                </p:cTn>
+                              </p:par>
+                            </p:childTnLst>
+                          </p:cTn>
+                        </p:par>
+                      </p:childTnLst>
+                    </p:cTn>
+                  </p:par>
+                </p:childTnLst>
+              </p:cTn>
+              <p:prevCondLst>
+                <p:cond evt="onPrev" delay="0">
+                  <p:tgtEl>
+                    <p:sldTgt/>
+                  </p:tgtEl>
+                </p:cond>
+              </p:prevCondLst>
+              <p:nextCondLst>
+                <p:cond evt="onNext" delay="0">
+                  <p:tgtEl>
+                    <p:sldTgt/>
+                  </p:tgtEl>
+                </p:cond>
+              </p:nextCondLst>
+            </p:seq>
+          </p:childTnLst>
+        </p:cTn>
+      </p:par>
+    </p:tnLst>
+    <p:bldLst>
+      <p:bldP spid="2" grpId="0"/>
+      <p:bldP spid="3" grpId="0" build="p"/>
+    </p:bldLst>
+  </p:timing>
+</p:sld>
+</file>
+
+<file path=ppt/slides/slide11.xml><?xml version="1.0" encoding="utf-8"?>
+<p:sld xmlns:a="http://schemas.openxmlformats.org/drawingml/2006/main" xmlns:r="http://schemas.openxmlformats.org/officeDocument/2006/relationships" xmlns:p="http://schemas.openxmlformats.org/presentationml/2006/main">
+  <p:cSld>
+    <p:spTree>
+      <p:nvGrpSpPr>
+        <p:cNvPr id="1" name=""/>
+        <p:cNvGrpSpPr/>
+        <p:nvPr/>
+      </p:nvGrpSpPr>
+      <p:grpSpPr>
+        <a:xfrm>
+          <a:off x="0" y="0"/>
+          <a:ext cx="0" cy="0"/>
+          <a:chOff x="0" y="0"/>
+          <a:chExt cx="0" cy="0"/>
+        </a:xfrm>
+      </p:grpSpPr>
+      <p:sp>
+        <p:nvSpPr>
+          <p:cNvPr id="2" name="1 Título"/>
+          <p:cNvSpPr>
+            <a:spLocks noGrp="1"/>
+          </p:cNvSpPr>
+          <p:nvPr>
+            <p:ph type="title"/>
+          </p:nvPr>
+        </p:nvSpPr>
+        <p:spPr/>
+        <p:txBody>
+          <a:bodyPr/>
+          <a:lstStyle/>
+          <a:p>
+            <a:r>
+              <a:rPr lang="en-US" dirty="0" smtClean="0"/>
+              <a:t>Information Sources</a:t>
+            </a:r>
+            <a:endParaRPr lang="en-US" dirty="0"/>
+          </a:p>
+        </p:txBody>
+      </p:sp>
+      <p:sp>
+        <p:nvSpPr>
+          <p:cNvPr id="3" name="2 Marcador de contenido"/>
+          <p:cNvSpPr>
+            <a:spLocks noGrp="1"/>
+          </p:cNvSpPr>
+          <p:nvPr>
+            <p:ph idx="1"/>
+          </p:nvPr>
+        </p:nvSpPr>
+        <p:spPr/>
+        <p:txBody>
+          <a:bodyPr/>
+          <a:lstStyle/>
+          <a:p>
+            <a:r>
+              <a:rPr lang="en-US" sz="2000" dirty="0" err="1" smtClean="0"/>
+              <a:t>Escrich</a:t>
+            </a:r>
+            <a:r>
+              <a:rPr lang="en-US" sz="2000" dirty="0" smtClean="0"/>
+              <a:t>, P. (2012, January). Quick deployment network using MANET. Retrieved March </a:t>
+            </a:r>
+            <a:r>
+              <a:rPr lang="en-US" sz="2000" dirty="0" smtClean="0"/>
+              <a:t>4, </a:t>
+            </a:r>
+            <a:r>
+              <a:rPr lang="en-US" sz="2000" dirty="0" smtClean="0"/>
+              <a:t>2013</a:t>
+            </a:r>
+          </a:p>
+          <a:p>
+            <a:r>
+              <a:rPr lang="es-ES" sz="2000" dirty="0" err="1" smtClean="0"/>
+              <a:t>Escrich</a:t>
+            </a:r>
+            <a:r>
+              <a:rPr lang="es-ES" sz="2000" dirty="0" smtClean="0"/>
+              <a:t>, P. (2012, </a:t>
+            </a:r>
+            <a:r>
+              <a:rPr lang="es-ES" sz="2000" dirty="0" err="1" smtClean="0"/>
+              <a:t>November</a:t>
+            </a:r>
+            <a:r>
+              <a:rPr lang="es-ES" sz="2000" dirty="0" smtClean="0"/>
+              <a:t> 17). </a:t>
+            </a:r>
+            <a:r>
+              <a:rPr lang="es-ES" sz="2000" dirty="0" err="1" smtClean="0"/>
+              <a:t>Xarxes</a:t>
+            </a:r>
+            <a:r>
+              <a:rPr lang="es-ES" sz="2000" dirty="0" smtClean="0"/>
+              <a:t> </a:t>
+            </a:r>
+            <a:r>
+              <a:rPr lang="es-ES" sz="2000" dirty="0" err="1" smtClean="0"/>
+              <a:t>Mesh</a:t>
+            </a:r>
+            <a:r>
+              <a:rPr lang="es-ES" sz="2000" dirty="0" smtClean="0"/>
+              <a:t>. </a:t>
+            </a:r>
+            <a:r>
+              <a:rPr lang="es-ES" sz="2000" dirty="0" err="1" smtClean="0"/>
+              <a:t>Curs</a:t>
+            </a:r>
+            <a:r>
+              <a:rPr lang="es-ES" sz="2000" dirty="0" smtClean="0"/>
+              <a:t> Guifi.net 2012. </a:t>
+            </a:r>
+            <a:r>
+              <a:rPr lang="es-ES" sz="2000" dirty="0" err="1" smtClean="0"/>
+              <a:t>Retrieved</a:t>
+            </a:r>
+            <a:r>
+              <a:rPr lang="es-ES" sz="2000" dirty="0" smtClean="0"/>
+              <a:t> </a:t>
+            </a:r>
+            <a:r>
+              <a:rPr lang="es-ES" sz="2000" dirty="0" err="1" smtClean="0"/>
+              <a:t>March</a:t>
+            </a:r>
+            <a:r>
+              <a:rPr lang="es-ES" sz="2000" dirty="0" smtClean="0"/>
+              <a:t> 5, </a:t>
+            </a:r>
+            <a:r>
+              <a:rPr lang="es-ES" sz="2000" dirty="0" smtClean="0"/>
+              <a:t>2013</a:t>
+            </a:r>
+          </a:p>
+          <a:p>
+            <a:r>
+              <a:rPr lang="en-US" sz="2000" dirty="0" smtClean="0"/>
+              <a:t>Mobile ad hoc network. (</a:t>
+            </a:r>
+            <a:r>
+              <a:rPr lang="en-US" sz="2000" dirty="0" err="1" smtClean="0"/>
+              <a:t>n.d</a:t>
+            </a:r>
+            <a:r>
+              <a:rPr lang="en-US" sz="2000" dirty="0" smtClean="0"/>
+              <a:t>.). In </a:t>
+            </a:r>
+            <a:r>
+              <a:rPr lang="en-US" sz="2000" i="1" dirty="0" smtClean="0"/>
+              <a:t>Wikipedia</a:t>
+            </a:r>
+            <a:r>
+              <a:rPr lang="en-US" sz="2000" dirty="0" smtClean="0"/>
+              <a:t>. Retrieved March </a:t>
+            </a:r>
+            <a:r>
+              <a:rPr lang="en-US" sz="2000" dirty="0" smtClean="0"/>
+              <a:t>4, </a:t>
+            </a:r>
+            <a:r>
+              <a:rPr lang="en-US" sz="2000" dirty="0" smtClean="0"/>
+              <a:t>2013, </a:t>
+            </a:r>
+            <a:r>
+              <a:rPr lang="en-US" sz="2000" dirty="0" smtClean="0"/>
+              <a:t>from http</a:t>
+            </a:r>
+            <a:r>
+              <a:rPr lang="en-US" sz="2000" dirty="0" smtClean="0"/>
+              <a:t>://</a:t>
+            </a:r>
+            <a:r>
+              <a:rPr lang="en-US" sz="2000" dirty="0" smtClean="0"/>
+              <a:t>en.wikipedia.org/wiki/Mobile_ad_hoc_network</a:t>
+            </a:r>
+          </a:p>
+          <a:p>
+            <a:r>
+              <a:rPr lang="en-US" sz="2000" dirty="0" smtClean="0"/>
+              <a:t>Starting a Community. (2013, January 11). In </a:t>
+            </a:r>
+            <a:r>
+              <a:rPr lang="en-US" sz="2000" i="1" dirty="0" smtClean="0"/>
+              <a:t>Quick Mesh Project</a:t>
+            </a:r>
+            <a:r>
+              <a:rPr lang="en-US" sz="2000" dirty="0" smtClean="0"/>
+              <a:t>. Retrieved March 5, 2013, from http://qmp.cat/projects/qmp/wiki/Starting </a:t>
+            </a:r>
+            <a:endParaRPr lang="en-US" sz="2000" dirty="0" smtClean="0"/>
+          </a:p>
+          <a:p>
+            <a:r>
+              <a:rPr lang="en-US" sz="2000" dirty="0" smtClean="0"/>
+              <a:t>Roaming-Community/Collaborative. (2012, June 26). In </a:t>
+            </a:r>
+            <a:r>
+              <a:rPr lang="en-US" sz="2000" i="1" dirty="0" smtClean="0"/>
+              <a:t>Quick Mesh Project</a:t>
+            </a:r>
+            <a:r>
+              <a:rPr lang="en-US" sz="2000" dirty="0" smtClean="0"/>
+              <a:t>. Retrieved March 5, 2013, from http://qmp.cat/projects/qmp/wiki/Roaming-Collaborative </a:t>
+            </a:r>
+            <a:r>
+              <a:rPr lang="en-US" dirty="0" smtClean="0"/>
+              <a:t/>
+            </a:r>
+            <a:br>
+              <a:rPr lang="en-US" dirty="0" smtClean="0"/>
+            </a:br>
+            <a:endParaRPr lang="es-ES" dirty="0"/>
+          </a:p>
+        </p:txBody>
+      </p:sp>
+      <p:sp>
+        <p:nvSpPr>
+          <p:cNvPr id="4" name="3 Marcador de número de diapositiva"/>
+          <p:cNvSpPr>
+            <a:spLocks noGrp="1"/>
+          </p:cNvSpPr>
+          <p:nvPr>
+            <p:ph type="sldNum" sz="quarter" idx="12"/>
+          </p:nvPr>
+        </p:nvSpPr>
+        <p:spPr/>
+        <p:txBody>
+          <a:bodyPr/>
+          <a:lstStyle/>
+          <a:p>
+            <a:fld id="{DA3FA644-4273-4B12-888A-E74B32B8A478}" type="slidenum">
+              <a:rPr lang="ru-RU" smtClean="0"/>
+              <a:pPr/>
+              <a:t>11</a:t>
+            </a:fld>
+            <a:endParaRPr lang="ru-RU"/>
+          </a:p>
+        </p:txBody>
+      </p:sp>
+    </p:spTree>
+  </p:cSld>
+  <p:clrMapOvr>
+    <a:masterClrMapping/>
+  </p:clrMapOvr>
+  <p:timing>
+    <p:tnLst>
+      <p:par>
+        <p:cTn id="1" dur="indefinite" restart="never" nodeType="tmRoot"/>
+      </p:par>
+    </p:tnLst>
+  </p:timing>
+</p:sld>
+</file>
+
+<file path=ppt/slides/slide12.xml><?xml version="1.0" encoding="utf-8"?>
+<p:sld xmlns:a="http://schemas.openxmlformats.org/drawingml/2006/main" xmlns:r="http://schemas.openxmlformats.org/officeDocument/2006/relationships" xmlns:p="http://schemas.openxmlformats.org/presentationml/2006/main">
+  <p:cSld>
+    <p:spTree>
+      <p:nvGrpSpPr>
+        <p:cNvPr id="1" name=""/>
+        <p:cNvGrpSpPr/>
+        <p:nvPr/>
+      </p:nvGrpSpPr>
+      <p:grpSpPr>
+        <a:xfrm>
+          <a:off x="0" y="0"/>
+          <a:ext cx="0" cy="0"/>
+          <a:chOff x="0" y="0"/>
+          <a:chExt cx="0" cy="0"/>
+        </a:xfrm>
+      </p:grpSpPr>
+      <p:sp>
+        <p:nvSpPr>
+          <p:cNvPr id="2" name="Title 1"/>
+          <p:cNvSpPr>
+            <a:spLocks noGrp="1"/>
+          </p:cNvSpPr>
+          <p:nvPr>
+            <p:ph type="title"/>
+          </p:nvPr>
+        </p:nvSpPr>
+        <p:spPr>
+          <a:xfrm>
+            <a:off x="1115616" y="1124744"/>
+            <a:ext cx="7620000" cy="1143000"/>
+          </a:xfrm>
+        </p:spPr>
+        <p:txBody>
+          <a:bodyPr/>
+          <a:lstStyle/>
+          <a:p>
+            <a:r>
+              <a:rPr lang="en-US" dirty="0" smtClean="0"/>
+              <a:t/>
+            </a:r>
+            <a:br>
+              <a:rPr lang="en-US" dirty="0" smtClean="0"/>
+            </a:br>
+            <a:r>
+              <a:rPr lang="en-US" dirty="0"/>
+              <a:t/>
+            </a:r>
+            <a:br>
+              <a:rPr lang="en-US" dirty="0"/>
+            </a:br>
+            <a:r>
+              <a:rPr lang="en-US" dirty="0" smtClean="0"/>
+              <a:t/>
+            </a:r>
+            <a:br>
+              <a:rPr lang="en-US" dirty="0" smtClean="0"/>
+            </a:br>
+            <a:r>
+              <a:rPr lang="en-US" dirty="0" smtClean="0"/>
+              <a:t/>
+            </a:r>
+            <a:br>
+              <a:rPr lang="en-US" dirty="0" smtClean="0"/>
+            </a:br>
+            <a:r>
+              <a:rPr lang="en-US" dirty="0" smtClean="0"/>
+              <a:t>Thank you for your time!</a:t>
+            </a:r>
+            <a:endParaRPr lang="en-US" dirty="0"/>
+          </a:p>
+        </p:txBody>
+      </p:sp>
+      <p:sp>
+        <p:nvSpPr>
+          <p:cNvPr id="4" name="Slide Number Placeholder 3"/>
+          <p:cNvSpPr>
+            <a:spLocks noGrp="1"/>
+          </p:cNvSpPr>
+          <p:nvPr>
+            <p:ph type="sldNum" sz="quarter" idx="12"/>
+          </p:nvPr>
+        </p:nvSpPr>
+        <p:spPr/>
+        <p:txBody>
+          <a:bodyPr/>
+          <a:lstStyle/>
+          <a:p>
+            <a:fld id="{DA3FA644-4273-4B12-888A-E74B32B8A478}" type="slidenum">
+              <a:rPr lang="ru-RU" smtClean="0"/>
+              <a:pPr/>
+              <a:t>12</a:t>
+            </a:fld>
+            <a:endParaRPr lang="ru-RU"/>
+          </a:p>
+        </p:txBody>
+      </p:sp>
+    </p:spTree>
+    <p:extLst>
+      <p:ext uri="{BB962C8B-B14F-4D97-AF65-F5344CB8AC3E}">
+        <p14:creationId xmlns="" xmlns:p14="http://schemas.microsoft.com/office/powerpoint/2010/main" val="1608000149"/>
       </p:ext>
     </p:extLst>
   </p:cSld>
@@ -3744,7 +5203,6 @@
               <a:rPr lang="en-US" dirty="0" smtClean="0"/>
               <a:t> Networks</a:t>
             </a:r>
-            <a:endParaRPr lang="en-US" dirty="0" smtClean="0"/>
           </a:p>
           <a:p>
             <a:r>
@@ -3758,67 +5216,47 @@
               <a:rPr lang="en-US" dirty="0" smtClean="0"/>
               <a:t>Main features</a:t>
             </a:r>
+          </a:p>
+          <a:p>
+            <a:pPr lvl="1"/>
+            <a:r>
+              <a:rPr lang="en-US" dirty="0" smtClean="0"/>
+              <a:t>Quick deployments</a:t>
+            </a:r>
+          </a:p>
+          <a:p>
+            <a:pPr lvl="1"/>
+            <a:r>
+              <a:rPr lang="en-US" dirty="0" smtClean="0"/>
+              <a:t>Addressing</a:t>
+            </a:r>
             <a:endParaRPr lang="en-US" dirty="0" smtClean="0"/>
           </a:p>
           <a:p>
             <a:pPr lvl="1"/>
             <a:r>
-              <a:rPr lang="ca-ES" dirty="0"/>
-              <a:t>Q</a:t>
-            </a:r>
-            <a:r>
-              <a:rPr lang="ca-ES" dirty="0" smtClean="0"/>
-              <a:t>uick deployments</a:t>
-            </a:r>
-            <a:endParaRPr lang="en-US" dirty="0" smtClean="0"/>
+              <a:rPr lang="en-US" dirty="0" smtClean="0"/>
+              <a:t>Dynamic Routing Protocol</a:t>
+            </a:r>
           </a:p>
           <a:p>
             <a:pPr lvl="1"/>
             <a:r>
-              <a:rPr lang="ca-ES" dirty="0"/>
-              <a:t>D</a:t>
-            </a:r>
-            <a:r>
-              <a:rPr lang="ca-ES" dirty="0" smtClean="0"/>
-              <a:t>ynamic </a:t>
-            </a:r>
-            <a:r>
-              <a:rPr lang="ca-ES" dirty="0"/>
-              <a:t>R</a:t>
-            </a:r>
-            <a:r>
-              <a:rPr lang="ca-ES" dirty="0" smtClean="0"/>
-              <a:t>outing Protocol</a:t>
-            </a:r>
-          </a:p>
-          <a:p>
-            <a:pPr lvl="1"/>
-            <a:r>
-              <a:rPr lang="ca-ES" dirty="0" smtClean="0"/>
+              <a:rPr lang="en-US" dirty="0" smtClean="0"/>
               <a:t>BMX6</a:t>
             </a:r>
           </a:p>
           <a:p>
             <a:r>
-              <a:rPr lang="ca-ES" dirty="0" smtClean="0"/>
+              <a:rPr lang="en-US" dirty="0" smtClean="0"/>
               <a:t>Mobile Node</a:t>
             </a:r>
-            <a:endParaRPr lang="ca-ES" dirty="0" smtClean="0"/>
-          </a:p>
-          <a:p>
-            <a:r>
-              <a:rPr lang="ca-ES" dirty="0" err="1" smtClean="0"/>
-              <a:t>Information</a:t>
-            </a:r>
-            <a:r>
-              <a:rPr lang="ca-ES" dirty="0" smtClean="0"/>
-              <a:t> </a:t>
-            </a:r>
-            <a:r>
-              <a:rPr lang="ca-ES" dirty="0" err="1" smtClean="0"/>
-              <a:t>sources</a:t>
-            </a:r>
-            <a:endParaRPr lang="ca-ES" dirty="0" smtClean="0"/>
+          </a:p>
+          <a:p>
+            <a:r>
+              <a:rPr lang="en-US" dirty="0" smtClean="0"/>
+              <a:t>Information sources</a:t>
+            </a:r>
           </a:p>
           <a:p>
             <a:endParaRPr lang="en-US" dirty="0"/>
@@ -3852,7 +5290,7 @@
     </p:spTree>
     <p:extLst>
       <p:ext uri="{BB962C8B-B14F-4D97-AF65-F5344CB8AC3E}">
-        <p14:creationId xmlns:p14="http://schemas.microsoft.com/office/powerpoint/2010/main" xmlns="" val="2734673611"/>
+        <p14:creationId xmlns="" xmlns:p14="http://schemas.microsoft.com/office/powerpoint/2010/main" val="2734673611"/>
       </p:ext>
     </p:extLst>
   </p:cSld>
@@ -3972,7 +5410,7 @@
           <a:blip r:embed="rId2" cstate="print">
             <a:extLst>
               <a:ext uri="{28A0092B-C50C-407E-A947-70E740481C1C}">
-                <a14:useLocalDpi xmlns:a14="http://schemas.microsoft.com/office/drawing/2010/main" xmlns="" val="0"/>
+                <a14:useLocalDpi xmlns="" xmlns:a14="http://schemas.microsoft.com/office/drawing/2010/main" val="0"/>
               </a:ext>
             </a:extLst>
           </a:blip>
@@ -3992,7 +5430,7 @@
           <a:noFill/>
           <a:extLst>
             <a:ext uri="{909E8E84-426E-40DD-AFC4-6F175D3DCCD1}">
-              <a14:hiddenFill xmlns:a14="http://schemas.microsoft.com/office/drawing/2010/main" xmlns="">
+              <a14:hiddenFill xmlns="" xmlns:a14="http://schemas.microsoft.com/office/drawing/2010/main">
                 <a:solidFill>
                   <a:srgbClr val="FFFFFF"/>
                 </a:solidFill>
@@ -4004,7 +5442,7 @@
     </p:spTree>
     <p:extLst>
       <p:ext uri="{BB962C8B-B14F-4D97-AF65-F5344CB8AC3E}">
-        <p14:creationId xmlns:p14="http://schemas.microsoft.com/office/powerpoint/2010/main" xmlns="" val="1347604916"/>
+        <p14:creationId xmlns="" xmlns:p14="http://schemas.microsoft.com/office/powerpoint/2010/main" val="1347604916"/>
       </p:ext>
     </p:extLst>
   </p:cSld>
@@ -4120,15 +5558,7 @@
             <a:pPr lvl="1" algn="just"/>
             <a:r>
               <a:rPr lang="en-US" dirty="0" smtClean="0"/>
-              <a:t>A </a:t>
-            </a:r>
-            <a:r>
-              <a:rPr lang="en-US" dirty="0" smtClean="0"/>
-              <a:t>m</a:t>
-            </a:r>
-            <a:r>
-              <a:rPr lang="en-US" dirty="0" smtClean="0"/>
-              <a:t>esh network is a network where all the participants are also routers. They are level 3 networks (Network layer).</a:t>
+              <a:t>A mesh network is a network where all the participants are also routers. They are level 3 networks (Network layer).</a:t>
             </a:r>
           </a:p>
           <a:p>
@@ -4142,13 +5572,8 @@
             <a:pPr lvl="1" algn="just"/>
             <a:r>
               <a:rPr lang="en-US" dirty="0" smtClean="0"/>
-              <a:t>It is not strictly necessary that this kind of networks use the Ad-hoc mode, </a:t>
-            </a:r>
-            <a:r>
-              <a:rPr lang="en-US" dirty="0" smtClean="0"/>
-              <a:t>they can use infrastructure mode too, although it is useless in many cases.</a:t>
-            </a:r>
-            <a:endParaRPr lang="en-US" dirty="0" smtClean="0"/>
+              <a:t>It is not strictly necessary that this kind of networks use the Ad-hoc mode, they can use infrastructure mode too, although it is useless in many cases.</a:t>
+            </a:r>
           </a:p>
         </p:txBody>
       </p:sp>
@@ -4219,7 +5644,7 @@
     </p:spTree>
     <p:extLst>
       <p:ext uri="{BB962C8B-B14F-4D97-AF65-F5344CB8AC3E}">
-        <p14:creationId xmlns:p14="http://schemas.microsoft.com/office/powerpoint/2010/main" xmlns="" val="4024328202"/>
+        <p14:creationId xmlns="" xmlns:p14="http://schemas.microsoft.com/office/powerpoint/2010/main" val="4024328202"/>
       </p:ext>
     </p:extLst>
   </p:cSld>
@@ -4282,11 +5707,7 @@
             </a:r>
             <a:r>
               <a:rPr lang="ca-ES" dirty="0" smtClean="0"/>
-              <a:t> Networks (</a:t>
-            </a:r>
-            <a:r>
-              <a:rPr lang="ca-ES" dirty="0" smtClean="0"/>
-              <a:t>II)</a:t>
+              <a:t> Networks (II)</a:t>
             </a:r>
             <a:endParaRPr lang="es-ES" dirty="0"/>
           </a:p>
@@ -4310,15 +5731,7 @@
             <a:pPr algn="just"/>
             <a:r>
               <a:rPr lang="en-US" dirty="0" smtClean="0"/>
-              <a:t>When we have a mesh network which uses a wireless system to interconnect the nodes and is built in Ad-hoc mode, we talk about MANET (Mobile </a:t>
-            </a:r>
-            <a:r>
-              <a:rPr lang="en-US" dirty="0" smtClean="0"/>
-              <a:t>A</a:t>
-            </a:r>
-            <a:r>
-              <a:rPr lang="en-US" dirty="0" smtClean="0"/>
-              <a:t>d-hoc Network).</a:t>
+              <a:t>When we have a mesh network which uses a wireless system to interconnect the nodes and is built in Ad-hoc mode, we talk about MANET (Mobile Ad-hoc Network).</a:t>
             </a:r>
           </a:p>
           <a:p>
@@ -4591,7 +6004,7 @@
           <a:blip r:embed="rId2" cstate="print">
             <a:extLst>
               <a:ext uri="{28A0092B-C50C-407E-A947-70E740481C1C}">
-                <a14:useLocalDpi xmlns:a14="http://schemas.microsoft.com/office/drawing/2010/main" xmlns="" val="0"/>
+                <a14:useLocalDpi xmlns="" xmlns:a14="http://schemas.microsoft.com/office/drawing/2010/main" val="0"/>
               </a:ext>
             </a:extLst>
           </a:blip>
@@ -4611,7 +6024,7 @@
           <a:noFill/>
           <a:extLst>
             <a:ext uri="{909E8E84-426E-40DD-AFC4-6F175D3DCCD1}">
-              <a14:hiddenFill xmlns:a14="http://schemas.microsoft.com/office/drawing/2010/main" xmlns="">
+              <a14:hiddenFill xmlns="" xmlns:a14="http://schemas.microsoft.com/office/drawing/2010/main">
                 <a:solidFill>
                   <a:srgbClr val="FFFFFF"/>
                 </a:solidFill>
@@ -4625,6 +6038,13 @@
   <p:clrMapOvr>
     <a:masterClrMapping/>
   </p:clrMapOvr>
+  <p:timing>
+    <p:tnLst>
+      <p:par>
+        <p:cTn id="1" dur="indefinite" restart="never" nodeType="tmRoot"/>
+      </p:par>
+    </p:tnLst>
+  </p:timing>
 </p:sld>
 </file>
 
@@ -4647,7 +6067,7 @@
       </p:grpSpPr>
       <p:sp>
         <p:nvSpPr>
-          <p:cNvPr id="2" name="1 Título"/>
+          <p:cNvPr id="2" name="Title 1"/>
           <p:cNvSpPr>
             <a:spLocks noGrp="1"/>
           </p:cNvSpPr>
@@ -4664,41 +6084,13 @@
               <a:rPr lang="es-ES" dirty="0" smtClean="0"/>
               <a:t>QMP</a:t>
             </a:r>
-            <a:endParaRPr lang="es-ES" dirty="0"/>
-          </a:p>
-        </p:txBody>
-      </p:sp>
-      <p:sp>
-        <p:nvSpPr>
-          <p:cNvPr id="3" name="2 Marcador de contenido"/>
-          <p:cNvSpPr>
-            <a:spLocks noGrp="1"/>
-          </p:cNvSpPr>
-          <p:nvPr>
-            <p:ph idx="1"/>
-          </p:nvPr>
-        </p:nvSpPr>
-        <p:spPr/>
-        <p:txBody>
-          <a:bodyPr/>
-          <a:lstStyle/>
-          <a:p>
-            <a:pPr>
-              <a:buNone/>
-            </a:pPr>
-            <a:r>
-              <a:rPr lang="en-US" b="1" smtClean="0"/>
-              <a:t>Quick Deployments</a:t>
-            </a:r>
-          </a:p>
-          <a:p>
             <a:endParaRPr lang="en-US" dirty="0"/>
           </a:p>
         </p:txBody>
       </p:sp>
       <p:sp>
         <p:nvSpPr>
-          <p:cNvPr id="4" name="3 Marcador de número de diapositiva"/>
+          <p:cNvPr id="4" name="Slide Number Placeholder 3"/>
           <p:cNvSpPr>
             <a:spLocks noGrp="1"/>
           </p:cNvSpPr>
@@ -4720,11 +6112,154 @@
           </a:p>
         </p:txBody>
       </p:sp>
+      <p:sp>
+        <p:nvSpPr>
+          <p:cNvPr id="10" name="Content Placeholder 2"/>
+          <p:cNvSpPr>
+            <a:spLocks noGrp="1"/>
+          </p:cNvSpPr>
+          <p:nvPr>
+            <p:ph idx="1"/>
+          </p:nvPr>
+        </p:nvSpPr>
+        <p:spPr>
+          <a:xfrm>
+            <a:off x="467544" y="1412776"/>
+            <a:ext cx="7620000" cy="4800600"/>
+          </a:xfrm>
+        </p:spPr>
+        <p:txBody>
+          <a:bodyPr/>
+          <a:lstStyle/>
+          <a:p>
+            <a:pPr>
+              <a:buNone/>
+            </a:pPr>
+            <a:r>
+              <a:rPr lang="en-US" b="1" dirty="0" smtClean="0"/>
+              <a:t>Quick </a:t>
+            </a:r>
+            <a:r>
+              <a:rPr lang="en-US" b="1" dirty="0" smtClean="0"/>
+              <a:t>Deployments</a:t>
+            </a:r>
+            <a:endParaRPr lang="en-US" dirty="0" smtClean="0"/>
+          </a:p>
+          <a:p>
+            <a:r>
+              <a:rPr lang="en-US" dirty="0" smtClean="0"/>
+              <a:t>One </a:t>
+            </a:r>
+            <a:r>
+              <a:rPr lang="en-US" dirty="0" smtClean="0"/>
+              <a:t>of the scenarios QMP has been developed for is: Quick deployments.</a:t>
+            </a:r>
+          </a:p>
+          <a:p>
+            <a:r>
+              <a:rPr lang="ca-ES" dirty="0" smtClean="0"/>
+              <a:t>Achieve </a:t>
+            </a:r>
+            <a:r>
+              <a:rPr lang="ca-ES" dirty="0"/>
+              <a:t>the </a:t>
+            </a:r>
+            <a:r>
+              <a:rPr lang="ca-ES" dirty="0" smtClean="0"/>
+              <a:t>following requirements</a:t>
+            </a:r>
+            <a:r>
+              <a:rPr lang="ca-ES" dirty="0"/>
+              <a:t>:</a:t>
+            </a:r>
+          </a:p>
+          <a:p>
+            <a:pPr lvl="1"/>
+            <a:r>
+              <a:rPr lang="en-US" dirty="0"/>
+              <a:t> The deployment must be performed as fast as possible.</a:t>
+            </a:r>
+          </a:p>
+          <a:p>
+            <a:pPr lvl="1"/>
+            <a:r>
+              <a:rPr lang="en-US" dirty="0"/>
+              <a:t> It must be able to be done by non-technical people.</a:t>
+            </a:r>
+          </a:p>
+          <a:p>
+            <a:pPr lvl="1"/>
+            <a:r>
+              <a:rPr lang="en-US" dirty="0"/>
+              <a:t> It must be possible in most </a:t>
+            </a:r>
+            <a:r>
+              <a:rPr lang="en-US" dirty="0" smtClean="0"/>
+              <a:t>situations.</a:t>
+            </a:r>
+            <a:endParaRPr lang="en-US" dirty="0"/>
+          </a:p>
+          <a:p>
+            <a:pPr lvl="1"/>
+            <a:endParaRPr lang="en-US" dirty="0" smtClean="0"/>
+          </a:p>
+          <a:p>
+            <a:pPr marL="411480" lvl="1" indent="0">
+              <a:buNone/>
+            </a:pPr>
+            <a:endParaRPr lang="en-US" dirty="0"/>
+          </a:p>
+        </p:txBody>
+      </p:sp>
+      <p:pic>
+        <p:nvPicPr>
+          <p:cNvPr id="1026" name="Picture 2"/>
+          <p:cNvPicPr>
+            <a:picLocks noChangeAspect="1" noChangeArrowheads="1"/>
+          </p:cNvPicPr>
+          <p:nvPr/>
+        </p:nvPicPr>
+        <p:blipFill>
+          <a:blip r:embed="rId2" cstate="print"/>
+          <a:srcRect/>
+          <a:stretch>
+            <a:fillRect/>
+          </a:stretch>
+        </p:blipFill>
+        <p:spPr bwMode="auto">
+          <a:xfrm>
+            <a:off x="5004048" y="4067175"/>
+            <a:ext cx="3438525" cy="2790825"/>
+          </a:xfrm>
+          <a:prstGeom prst="rect">
+            <a:avLst/>
+          </a:prstGeom>
+          <a:noFill/>
+          <a:ln w="9525">
+            <a:noFill/>
+            <a:miter lim="800000"/>
+            <a:headEnd/>
+            <a:tailEnd/>
+          </a:ln>
+        </p:spPr>
+      </p:pic>
     </p:spTree>
+    <p:extLst>
+      <p:ext uri="{BB962C8B-B14F-4D97-AF65-F5344CB8AC3E}">
+        <p14:creationId xmlns:p14="http://schemas.microsoft.com/office/powerpoint/2010/main" xmlns="" val="4024328202"/>
+      </p:ext>
+    </p:extLst>
   </p:cSld>
   <p:clrMapOvr>
     <a:masterClrMapping/>
   </p:clrMapOvr>
+  <p:timing>
+    <p:tnLst>
+      <p:par>
+        <p:cTn id="1" dur="indefinite" restart="never" nodeType="tmRoot"/>
+      </p:par>
+    </p:tnLst>
+  </p:timing>
 </p:sld>
 </file>
 
@@ -4747,7 +6282,7 @@
       </p:grpSpPr>
       <p:sp>
         <p:nvSpPr>
-          <p:cNvPr id="2" name="Title 1"/>
+          <p:cNvPr id="2" name="1 Título"/>
           <p:cNvSpPr>
             <a:spLocks noGrp="1"/>
           </p:cNvSpPr>
@@ -4755,55 +6290,81 @@
             <p:ph type="title"/>
           </p:nvPr>
         </p:nvSpPr>
-        <p:spPr>
-          <a:xfrm>
-            <a:off x="1115616" y="1124744"/>
-            <a:ext cx="7620000" cy="1143000"/>
-          </a:xfrm>
-        </p:spPr>
-        <p:txBody>
-          <a:bodyPr/>
-          <a:lstStyle/>
-          <a:p>
+        <p:spPr/>
+        <p:txBody>
+          <a:bodyPr/>
+          <a:lstStyle/>
+          <a:p>
+            <a:r>
+              <a:rPr lang="es-ES" dirty="0" smtClean="0"/>
+              <a:t>QMP</a:t>
+            </a:r>
+            <a:endParaRPr lang="es-ES" dirty="0"/>
+          </a:p>
+        </p:txBody>
+      </p:sp>
+      <p:sp>
+        <p:nvSpPr>
+          <p:cNvPr id="3" name="2 Marcador de contenido"/>
+          <p:cNvSpPr>
+            <a:spLocks noGrp="1"/>
+          </p:cNvSpPr>
+          <p:nvPr>
+            <p:ph idx="1"/>
+          </p:nvPr>
+        </p:nvSpPr>
+        <p:spPr/>
+        <p:txBody>
+          <a:bodyPr/>
+          <a:lstStyle/>
+          <a:p>
+            <a:pPr>
+              <a:buNone/>
+            </a:pPr>
+            <a:r>
+              <a:rPr lang="en-US" b="1" dirty="0" smtClean="0"/>
+              <a:t>Addressing</a:t>
+            </a:r>
+          </a:p>
+          <a:p>
+            <a:r>
+              <a:rPr lang="en-US" dirty="0" err="1" smtClean="0"/>
+              <a:t>Qmp</a:t>
+            </a:r>
             <a:r>
               <a:rPr lang="en-US" dirty="0" smtClean="0"/>
-              <a:t/>
-            </a:r>
-            <a:br>
+              <a:t> uses three different kind of IP addresses:</a:t>
+            </a:r>
+          </a:p>
+          <a:p>
+            <a:pPr lvl="1"/>
+            <a:r>
               <a:rPr lang="en-US" dirty="0" smtClean="0"/>
-            </a:br>
-            <a:r>
-              <a:rPr lang="en-US" dirty="0"/>
-              <a:t/>
-            </a:r>
-            <a:br>
-              <a:rPr lang="en-US" dirty="0"/>
-            </a:br>
+              <a:t>IPv6 ULA: IPv6 private range to be used internally in the mesh</a:t>
+            </a:r>
+          </a:p>
+          <a:p>
+            <a:pPr lvl="1"/>
             <a:r>
               <a:rPr lang="en-US" dirty="0" smtClean="0"/>
-              <a:t/>
-            </a:r>
-            <a:br>
+              <a:t>IPv6 RIPE: IPv6 public IPs range (6to6 tunneling)</a:t>
+            </a:r>
+          </a:p>
+          <a:p>
+            <a:pPr lvl="1"/>
+            <a:r>
               <a:rPr lang="en-US" dirty="0" smtClean="0"/>
-            </a:br>
-            <a:r>
-              <a:rPr lang="en-US" dirty="0" smtClean="0"/>
-              <a:t/>
-            </a:r>
-            <a:br>
-              <a:rPr lang="en-US" dirty="0" smtClean="0"/>
-            </a:br>
-            <a:r>
-              <a:rPr lang="en-US" dirty="0" smtClean="0"/>
-              <a:t>Thank you for your time!</a:t>
-            </a:r>
-            <a:endParaRPr lang="en-US" dirty="0"/>
-          </a:p>
-        </p:txBody>
-      </p:sp>
-      <p:sp>
-        <p:nvSpPr>
-          <p:cNvPr id="4" name="Slide Number Placeholder 3"/>
+              <a:t>IPv4: IPv4 private range to connect with the final user (4to6 tunneling)</a:t>
+            </a:r>
+          </a:p>
+          <a:p>
+            <a:endParaRPr lang="es-ES" dirty="0"/>
+          </a:p>
+        </p:txBody>
+      </p:sp>
+      <p:sp>
+        <p:nvSpPr>
+          <p:cNvPr id="4" name="3 Marcador de número de diapositiva"/>
           <p:cNvSpPr>
             <a:spLocks noGrp="1"/>
           </p:cNvSpPr>
@@ -4826,11 +6387,253 @@
         </p:txBody>
       </p:sp>
     </p:spTree>
-    <p:extLst>
-      <p:ext uri="{BB962C8B-B14F-4D97-AF65-F5344CB8AC3E}">
-        <p14:creationId xmlns:p14="http://schemas.microsoft.com/office/powerpoint/2010/main" xmlns="" val="1608000149"/>
-      </p:ext>
-    </p:extLst>
+  </p:cSld>
+  <p:clrMapOvr>
+    <a:masterClrMapping/>
+  </p:clrMapOvr>
+  <p:timing>
+    <p:tnLst>
+      <p:par>
+        <p:cTn id="1" dur="indefinite" restart="never" nodeType="tmRoot"/>
+      </p:par>
+    </p:tnLst>
+  </p:timing>
+</p:sld>
+</file>
+
+<file path=ppt/slides/slide9.xml><?xml version="1.0" encoding="utf-8"?>
+<p:sld xmlns:a="http://schemas.openxmlformats.org/drawingml/2006/main" xmlns:r="http://schemas.openxmlformats.org/officeDocument/2006/relationships" xmlns:p="http://schemas.openxmlformats.org/presentationml/2006/main">
+  <p:cSld>
+    <p:spTree>
+      <p:nvGrpSpPr>
+        <p:cNvPr id="1" name=""/>
+        <p:cNvGrpSpPr/>
+        <p:nvPr/>
+      </p:nvGrpSpPr>
+      <p:grpSpPr>
+        <a:xfrm>
+          <a:off x="0" y="0"/>
+          <a:ext cx="0" cy="0"/>
+          <a:chOff x="0" y="0"/>
+          <a:chExt cx="0" cy="0"/>
+        </a:xfrm>
+      </p:grpSpPr>
+      <p:sp>
+        <p:nvSpPr>
+          <p:cNvPr id="2" name="1 Título"/>
+          <p:cNvSpPr>
+            <a:spLocks noGrp="1"/>
+          </p:cNvSpPr>
+          <p:nvPr>
+            <p:ph type="title"/>
+          </p:nvPr>
+        </p:nvSpPr>
+        <p:spPr/>
+        <p:txBody>
+          <a:bodyPr/>
+          <a:lstStyle/>
+          <a:p>
+            <a:r>
+              <a:rPr lang="es-ES" dirty="0" smtClean="0"/>
+              <a:t>QMP</a:t>
+            </a:r>
+            <a:endParaRPr lang="es-ES" dirty="0"/>
+          </a:p>
+        </p:txBody>
+      </p:sp>
+      <p:sp>
+        <p:nvSpPr>
+          <p:cNvPr id="3" name="2 Marcador de contenido"/>
+          <p:cNvSpPr>
+            <a:spLocks noGrp="1"/>
+          </p:cNvSpPr>
+          <p:nvPr>
+            <p:ph idx="1"/>
+          </p:nvPr>
+        </p:nvSpPr>
+        <p:spPr/>
+        <p:txBody>
+          <a:bodyPr/>
+          <a:lstStyle/>
+          <a:p>
+            <a:pPr>
+              <a:buNone/>
+            </a:pPr>
+            <a:r>
+              <a:rPr lang="en-US" b="1" dirty="0" smtClean="0"/>
+              <a:t>Dynamic </a:t>
+            </a:r>
+            <a:r>
+              <a:rPr lang="en-US" b="1" dirty="0" smtClean="0"/>
+              <a:t>R</a:t>
+            </a:r>
+            <a:r>
+              <a:rPr lang="en-US" b="1" dirty="0" smtClean="0"/>
+              <a:t>outing Protocol</a:t>
+            </a:r>
+          </a:p>
+          <a:p>
+            <a:r>
+              <a:rPr lang="en-US" dirty="0" smtClean="0"/>
+              <a:t>The </a:t>
+            </a:r>
+            <a:r>
+              <a:rPr lang="en-US" dirty="0" smtClean="0"/>
+              <a:t>QMP firmware, uses the following protocols:</a:t>
+            </a:r>
+          </a:p>
+          <a:p>
+            <a:pPr lvl="1"/>
+            <a:r>
+              <a:rPr lang="en-US" dirty="0" smtClean="0"/>
+              <a:t> </a:t>
+            </a:r>
+            <a:r>
+              <a:rPr lang="en-US" dirty="0" smtClean="0"/>
+              <a:t>BMX6 as the main DRP.</a:t>
+            </a:r>
+          </a:p>
+          <a:p>
+            <a:pPr lvl="1"/>
+            <a:r>
+              <a:rPr lang="en-US" dirty="0" smtClean="0"/>
+              <a:t> OLSR6 as a backup DRP.</a:t>
+            </a:r>
+          </a:p>
+          <a:p>
+            <a:pPr lvl="1"/>
+            <a:r>
+              <a:rPr lang="en-US" dirty="0" smtClean="0"/>
+              <a:t> </a:t>
+            </a:r>
+            <a:r>
+              <a:rPr lang="en-US" dirty="0" smtClean="0"/>
+              <a:t>Babel as a backup DRP but optional.</a:t>
+            </a:r>
+          </a:p>
+          <a:p>
+            <a:endParaRPr lang="en-US" dirty="0" smtClean="0"/>
+          </a:p>
+          <a:p>
+            <a:r>
+              <a:rPr lang="en-US" dirty="0" smtClean="0"/>
+              <a:t>All three use IPv</a:t>
+            </a:r>
+            <a:r>
+              <a:rPr lang="en-US" dirty="0" smtClean="0"/>
+              <a:t>6 ULA to talk to other nodes and are isolated at the link layer (MAC) using VLANs.</a:t>
+            </a:r>
+            <a:endParaRPr lang="en-US" dirty="0"/>
+          </a:p>
+        </p:txBody>
+      </p:sp>
+      <p:sp>
+        <p:nvSpPr>
+          <p:cNvPr id="4" name="3 Marcador de número de diapositiva"/>
+          <p:cNvSpPr>
+            <a:spLocks noGrp="1"/>
+          </p:cNvSpPr>
+          <p:nvPr>
+            <p:ph type="sldNum" sz="quarter" idx="12"/>
+          </p:nvPr>
+        </p:nvSpPr>
+        <p:spPr/>
+        <p:txBody>
+          <a:bodyPr/>
+          <a:lstStyle/>
+          <a:p>
+            <a:fld id="{DA3FA644-4273-4B12-888A-E74B32B8A478}" type="slidenum">
+              <a:rPr lang="ru-RU" smtClean="0"/>
+              <a:pPr/>
+              <a:t>9</a:t>
+            </a:fld>
+            <a:endParaRPr lang="ru-RU"/>
+          </a:p>
+        </p:txBody>
+      </p:sp>
+      <p:pic>
+        <p:nvPicPr>
+          <p:cNvPr id="5" name="Picture 2" descr="http://qmp.cat/attachments/download/111"/>
+          <p:cNvPicPr>
+            <a:picLocks noChangeAspect="1" noChangeArrowheads="1"/>
+          </p:cNvPicPr>
+          <p:nvPr/>
+        </p:nvPicPr>
+        <p:blipFill>
+          <a:blip r:embed="rId2" cstate="print">
+            <a:extLst>
+              <a:ext uri="{28A0092B-C50C-407E-A947-70E740481C1C}">
+                <a14:useLocalDpi xmlns:a14="http://schemas.microsoft.com/office/drawing/2010/main" xmlns="" val="0"/>
+              </a:ext>
+            </a:extLst>
+          </a:blip>
+          <a:srcRect/>
+          <a:stretch>
+            <a:fillRect/>
+          </a:stretch>
+        </p:blipFill>
+        <p:spPr bwMode="auto">
+          <a:xfrm>
+            <a:off x="1259632" y="4889599"/>
+            <a:ext cx="1228725" cy="495301"/>
+          </a:xfrm>
+          <a:prstGeom prst="rect">
+            <a:avLst/>
+          </a:prstGeom>
+          <a:noFill/>
+          <a:extLst>
+            <a:ext uri="{909E8E84-426E-40DD-AFC4-6F175D3DCCD1}">
+              <a14:hiddenFill xmlns:a14="http://schemas.microsoft.com/office/drawing/2010/main" xmlns="">
+                <a:solidFill>
+                  <a:srgbClr val="FFFFFF"/>
+                </a:solidFill>
+              </a14:hiddenFill>
+            </a:ext>
+          </a:extLst>
+        </p:spPr>
+      </p:pic>
+      <p:pic>
+        <p:nvPicPr>
+          <p:cNvPr id="6" name="Picture 4" descr="http://t3.gstatic.com/images?q=tbn:ANd9GcRreIec2F02Y2Khun7hhgkCqiioKGp6jpJRS2qSvXjA3HG8KCWBSNz4OBo"/>
+          <p:cNvPicPr>
+            <a:picLocks noChangeAspect="1" noChangeArrowheads="1"/>
+          </p:cNvPicPr>
+          <p:nvPr/>
+        </p:nvPicPr>
+        <p:blipFill>
+          <a:blip r:embed="rId3" cstate="print">
+            <a:extLst>
+              <a:ext uri="{28A0092B-C50C-407E-A947-70E740481C1C}">
+                <a14:useLocalDpi xmlns:a14="http://schemas.microsoft.com/office/drawing/2010/main" xmlns="" val="0"/>
+              </a:ext>
+            </a:extLst>
+          </a:blip>
+          <a:srcRect/>
+          <a:stretch>
+            <a:fillRect/>
+          </a:stretch>
+        </p:blipFill>
+        <p:spPr bwMode="auto">
+          <a:xfrm>
+            <a:off x="3131840" y="5661248"/>
+            <a:ext cx="4914900" cy="657226"/>
+          </a:xfrm>
+          <a:prstGeom prst="rect">
+            <a:avLst/>
+          </a:prstGeom>
+          <a:noFill/>
+          <a:extLst>
+            <a:ext uri="{909E8E84-426E-40DD-AFC4-6F175D3DCCD1}">
+              <a14:hiddenFill xmlns:a14="http://schemas.microsoft.com/office/drawing/2010/main" xmlns="">
+                <a:solidFill>
+                  <a:srgbClr val="FFFFFF"/>
+                </a:solidFill>
+              </a14:hiddenFill>
+            </a:ext>
+          </a:extLst>
+        </p:spPr>
+      </p:pic>
+    </p:spTree>
   </p:cSld>
   <p:clrMapOvr>
     <a:masterClrMapping/>

</xml_diff>

<commit_message>
new file:   Presentation-demo/MN_QMP_Demo.odp 	modified:   Presentation-demo/MN_QMP_Demo.pptx
</commit_message>
<xml_diff>
--- a/Presentation-demo/MN_QMP_Demo.pptx
+++ b/Presentation-demo/MN_QMP_Demo.pptx
@@ -5,7 +5,7 @@
     <p:sldMasterId id="2147483660" r:id="rId1"/>
   </p:sldMasterIdLst>
   <p:notesMasterIdLst>
-    <p:notesMasterId r:id="rId14"/>
+    <p:notesMasterId r:id="rId16"/>
   </p:notesMasterIdLst>
   <p:sldIdLst>
     <p:sldId id="256" r:id="rId2"/>
@@ -16,10 +16,12 @@
     <p:sldId id="268" r:id="rId7"/>
     <p:sldId id="271" r:id="rId8"/>
     <p:sldId id="273" r:id="rId9"/>
-    <p:sldId id="269" r:id="rId10"/>
-    <p:sldId id="272" r:id="rId11"/>
-    <p:sldId id="270" r:id="rId12"/>
-    <p:sldId id="262" r:id="rId13"/>
+    <p:sldId id="274" r:id="rId10"/>
+    <p:sldId id="269" r:id="rId11"/>
+    <p:sldId id="272" r:id="rId12"/>
+    <p:sldId id="275" r:id="rId13"/>
+    <p:sldId id="270" r:id="rId14"/>
+    <p:sldId id="262" r:id="rId15"/>
   </p:sldIdLst>
   <p:sldSz cx="9144000" cy="6858000" type="screen4x3"/>
   <p:notesSz cx="6858000" cy="9144000"/>
@@ -204,7 +206,7 @@
             <a:fld id="{55E5443F-E353-429A-B0E4-7B65604E2DF0}" type="datetimeFigureOut">
               <a:rPr lang="ru-RU" smtClean="0"/>
               <a:pPr/>
-              <a:t>05.03.2013</a:t>
+              <a:t>06.03.2013</a:t>
             </a:fld>
             <a:endParaRPr lang="ru-RU"/>
           </a:p>
@@ -373,7 +375,7 @@
     </p:spTree>
     <p:extLst>
       <p:ext uri="{BB962C8B-B14F-4D97-AF65-F5344CB8AC3E}">
-        <p14:creationId xmlns="" xmlns:p14="http://schemas.microsoft.com/office/powerpoint/2010/main" val="2089319304"/>
+        <p14:creationId xmlns:p14="http://schemas.microsoft.com/office/powerpoint/2010/main" xmlns="" val="2089319304"/>
       </p:ext>
     </p:extLst>
   </p:cSld>
@@ -668,7 +670,7 @@
             <a:fld id="{65D1C55E-B11D-438C-8012-585487039BCD}" type="datetime1">
               <a:rPr lang="ru-RU" smtClean="0"/>
               <a:pPr/>
-              <a:t>05.03.2013</a:t>
+              <a:t>06.03.2013</a:t>
             </a:fld>
             <a:endParaRPr lang="ru-RU"/>
           </a:p>
@@ -835,7 +837,7 @@
             <a:fld id="{D43CF458-E8BA-4D11-B660-B7EDE58252C2}" type="datetime1">
               <a:rPr lang="ru-RU" smtClean="0"/>
               <a:pPr/>
-              <a:t>05.03.2013</a:t>
+              <a:t>06.03.2013</a:t>
             </a:fld>
             <a:endParaRPr lang="ru-RU"/>
           </a:p>
@@ -1012,7 +1014,7 @@
             <a:fld id="{D76480F4-9944-4231-A2FC-ACBF0C541F07}" type="datetime1">
               <a:rPr lang="ru-RU" smtClean="0"/>
               <a:pPr/>
-              <a:t>05.03.2013</a:t>
+              <a:t>06.03.2013</a:t>
             </a:fld>
             <a:endParaRPr lang="ru-RU"/>
           </a:p>
@@ -1179,7 +1181,7 @@
             <a:fld id="{0ABA554F-15B7-4471-954B-B09B3D6EBBF1}" type="datetime1">
               <a:rPr lang="ru-RU" smtClean="0"/>
               <a:pPr/>
-              <a:t>05.03.2013</a:t>
+              <a:t>06.03.2013</a:t>
             </a:fld>
             <a:endParaRPr lang="ru-RU"/>
           </a:p>
@@ -1422,7 +1424,7 @@
             <a:fld id="{193206D4-02DB-42E0-93CE-7D2D2568A31F}" type="datetime1">
               <a:rPr lang="ru-RU" smtClean="0"/>
               <a:pPr/>
-              <a:t>05.03.2013</a:t>
+              <a:t>06.03.2013</a:t>
             </a:fld>
             <a:endParaRPr lang="ru-RU"/>
           </a:p>
@@ -1707,7 +1709,7 @@
             <a:fld id="{626C50A8-49AA-42C6-A936-43CA5B1F5E8C}" type="datetime1">
               <a:rPr lang="ru-RU" smtClean="0"/>
               <a:pPr/>
-              <a:t>05.03.2013</a:t>
+              <a:t>06.03.2013</a:t>
             </a:fld>
             <a:endParaRPr lang="ru-RU"/>
           </a:p>
@@ -2138,7 +2140,7 @@
             <a:fld id="{BCAD40CC-8075-46F1-8DC6-60D6F6E6F283}" type="datetime1">
               <a:rPr lang="ru-RU" smtClean="0"/>
               <a:pPr/>
-              <a:t>05.03.2013</a:t>
+              <a:t>06.03.2013</a:t>
             </a:fld>
             <a:endParaRPr lang="ru-RU"/>
           </a:p>
@@ -2253,7 +2255,7 @@
             <a:fld id="{273125D8-D6B7-4598-A720-622DD29B88E5}" type="datetime1">
               <a:rPr lang="ru-RU" smtClean="0"/>
               <a:pPr/>
-              <a:t>05.03.2013</a:t>
+              <a:t>06.03.2013</a:t>
             </a:fld>
             <a:endParaRPr lang="ru-RU"/>
           </a:p>
@@ -2345,7 +2347,7 @@
             <a:fld id="{F96B8079-F953-4D97-9271-6C73546CD683}" type="datetime1">
               <a:rPr lang="ru-RU" smtClean="0"/>
               <a:pPr/>
-              <a:t>05.03.2013</a:t>
+              <a:t>06.03.2013</a:t>
             </a:fld>
             <a:endParaRPr lang="ru-RU"/>
           </a:p>
@@ -2536,7 +2538,7 @@
             <a:fld id="{D3BC4E32-C344-47BA-8C91-74F8F7BE8607}" type="datetime1">
               <a:rPr lang="ru-RU" smtClean="0"/>
               <a:pPr/>
-              <a:t>05.03.2013</a:t>
+              <a:t>06.03.2013</a:t>
             </a:fld>
             <a:endParaRPr lang="ru-RU"/>
           </a:p>
@@ -2856,7 +2858,7 @@
             <a:fld id="{56E44682-18C2-4899-90E2-EA3C96A5D216}" type="datetime1">
               <a:rPr lang="ru-RU" smtClean="0"/>
               <a:pPr/>
-              <a:t>05.03.2013</a:t>
+              <a:t>06.03.2013</a:t>
             </a:fld>
             <a:endParaRPr lang="ru-RU"/>
           </a:p>
@@ -3238,7 +3240,7 @@
             <a:fld id="{366EE1AE-826B-4213-A73B-DC4CAF3252C2}" type="datetime1">
               <a:rPr lang="ru-RU" smtClean="0"/>
               <a:pPr/>
-              <a:t>05.03.2013</a:t>
+              <a:t>06.03.2013</a:t>
             </a:fld>
             <a:endParaRPr lang="ru-RU"/>
           </a:p>
@@ -3649,7 +3651,7 @@
     </p:spTree>
     <p:extLst>
       <p:ext uri="{BB962C8B-B14F-4D97-AF65-F5344CB8AC3E}">
-        <p14:creationId xmlns="" xmlns:p14="http://schemas.microsoft.com/office/powerpoint/2010/main" val="1584798069"/>
+        <p14:creationId xmlns:p14="http://schemas.microsoft.com/office/powerpoint/2010/main" xmlns="" val="1584798069"/>
       </p:ext>
     </p:extLst>
   </p:cSld>
@@ -3721,36 +3723,50 @@
           <a:bodyPr/>
           <a:lstStyle/>
           <a:p>
-            <a:pPr algn="just">
-              <a:buNone/>
-            </a:pPr>
-            <a:r>
-              <a:rPr lang="en-US" b="1" dirty="0" smtClean="0"/>
-              <a:t>BMX6</a:t>
-            </a:r>
-          </a:p>
-          <a:p>
-            <a:pPr algn="just"/>
-            <a:r>
-              <a:rPr lang="en-US" dirty="0" smtClean="0"/>
-              <a:t>Pro-active: Uses UDP flooding to periodically send Originator Messages (OGM) and build a routing table.</a:t>
-            </a:r>
-          </a:p>
-          <a:p>
-            <a:pPr algn="just"/>
-            <a:r>
-              <a:rPr lang="en-US" dirty="0" smtClean="0"/>
-              <a:t>Destination-sequenced, Distance-vector (DSDV): Every node just knows which neighbor is better to reach another, namely, they do not need to know the entire topology, just the best paths.</a:t>
-            </a:r>
-          </a:p>
-          <a:p>
-            <a:endParaRPr lang="es-ES" dirty="0" smtClean="0"/>
-          </a:p>
-          <a:p>
             <a:pPr>
               <a:buNone/>
             </a:pPr>
-            <a:endParaRPr lang="es-ES" b="1" dirty="0"/>
+            <a:r>
+              <a:rPr lang="en-US" b="1" dirty="0" smtClean="0"/>
+              <a:t>Dynamic Routing Protocol</a:t>
+            </a:r>
+          </a:p>
+          <a:p>
+            <a:r>
+              <a:rPr lang="en-US" dirty="0" smtClean="0"/>
+              <a:t>The QMP firmware, uses the following protocols:</a:t>
+            </a:r>
+          </a:p>
+          <a:p>
+            <a:pPr lvl="1"/>
+            <a:r>
+              <a:rPr lang="en-US" dirty="0" smtClean="0"/>
+              <a:t> BMX6 as the main DRP.</a:t>
+            </a:r>
+          </a:p>
+          <a:p>
+            <a:pPr lvl="1"/>
+            <a:r>
+              <a:rPr lang="en-US" dirty="0" smtClean="0"/>
+              <a:t> OLSR6 as a backup DRP.</a:t>
+            </a:r>
+          </a:p>
+          <a:p>
+            <a:pPr lvl="1"/>
+            <a:r>
+              <a:rPr lang="en-US" dirty="0" smtClean="0"/>
+              <a:t> Babel as a backup DRP but optional.</a:t>
+            </a:r>
+          </a:p>
+          <a:p>
+            <a:endParaRPr lang="en-US" dirty="0" smtClean="0"/>
+          </a:p>
+          <a:p>
+            <a:r>
+              <a:rPr lang="en-US" dirty="0" smtClean="0"/>
+              <a:t>All three use IPv6 ULA to talk to other nodes and are isolated at the link layer (MAC) using VLANs.</a:t>
+            </a:r>
+            <a:endParaRPr lang="en-US" dirty="0"/>
           </a:p>
         </p:txBody>
       </p:sp>
@@ -3778,6 +3794,120 @@
           </a:p>
         </p:txBody>
       </p:sp>
+      <p:pic>
+        <p:nvPicPr>
+          <p:cNvPr id="5" name="Picture 2" descr="http://qmp.cat/attachments/download/111"/>
+          <p:cNvPicPr>
+            <a:picLocks noChangeAspect="1" noChangeArrowheads="1"/>
+          </p:cNvPicPr>
+          <p:nvPr/>
+        </p:nvPicPr>
+        <p:blipFill>
+          <a:blip r:embed="rId2" cstate="print">
+            <a:extLst>
+              <a:ext uri="{28A0092B-C50C-407E-A947-70E740481C1C}">
+                <a14:useLocalDpi xmlns="" xmlns:a14="http://schemas.microsoft.com/office/drawing/2010/main" val="0"/>
+              </a:ext>
+            </a:extLst>
+          </a:blip>
+          <a:srcRect/>
+          <a:stretch>
+            <a:fillRect/>
+          </a:stretch>
+        </p:blipFill>
+        <p:spPr bwMode="auto">
+          <a:xfrm>
+            <a:off x="1259632" y="4889599"/>
+            <a:ext cx="1228725" cy="495301"/>
+          </a:xfrm>
+          <a:prstGeom prst="rect">
+            <a:avLst/>
+          </a:prstGeom>
+          <a:noFill/>
+          <a:extLst>
+            <a:ext uri="{909E8E84-426E-40DD-AFC4-6F175D3DCCD1}">
+              <a14:hiddenFill xmlns="" xmlns:a14="http://schemas.microsoft.com/office/drawing/2010/main">
+                <a:solidFill>
+                  <a:srgbClr val="FFFFFF"/>
+                </a:solidFill>
+              </a14:hiddenFill>
+            </a:ext>
+          </a:extLst>
+        </p:spPr>
+      </p:pic>
+      <p:pic>
+        <p:nvPicPr>
+          <p:cNvPr id="6" name="Picture 4" descr="http://t3.gstatic.com/images?q=tbn:ANd9GcRreIec2F02Y2Khun7hhgkCqiioKGp6jpJRS2qSvXjA3HG8KCWBSNz4OBo"/>
+          <p:cNvPicPr>
+            <a:picLocks noChangeAspect="1" noChangeArrowheads="1"/>
+          </p:cNvPicPr>
+          <p:nvPr/>
+        </p:nvPicPr>
+        <p:blipFill>
+          <a:blip r:embed="rId3" cstate="print">
+            <a:extLst>
+              <a:ext uri="{28A0092B-C50C-407E-A947-70E740481C1C}">
+                <a14:useLocalDpi xmlns="" xmlns:a14="http://schemas.microsoft.com/office/drawing/2010/main" val="0"/>
+              </a:ext>
+            </a:extLst>
+          </a:blip>
+          <a:srcRect/>
+          <a:stretch>
+            <a:fillRect/>
+          </a:stretch>
+        </p:blipFill>
+        <p:spPr bwMode="auto">
+          <a:xfrm>
+            <a:off x="3131840" y="5661248"/>
+            <a:ext cx="4914900" cy="657226"/>
+          </a:xfrm>
+          <a:prstGeom prst="rect">
+            <a:avLst/>
+          </a:prstGeom>
+          <a:noFill/>
+          <a:extLst>
+            <a:ext uri="{909E8E84-426E-40DD-AFC4-6F175D3DCCD1}">
+              <a14:hiddenFill xmlns="" xmlns:a14="http://schemas.microsoft.com/office/drawing/2010/main">
+                <a:solidFill>
+                  <a:srgbClr val="FFFFFF"/>
+                </a:solidFill>
+              </a14:hiddenFill>
+            </a:ext>
+          </a:extLst>
+        </p:spPr>
+      </p:pic>
+    </p:spTree>
+  </p:cSld>
+  <p:clrMapOvr>
+    <a:masterClrMapping/>
+  </p:clrMapOvr>
+  <p:timing>
+    <p:tnLst>
+      <p:par>
+        <p:cTn id="1" dur="indefinite" restart="never" nodeType="tmRoot"/>
+      </p:par>
+    </p:tnLst>
+  </p:timing>
+</p:sld>
+</file>
+
+<file path=ppt/slides/slide11.xml><?xml version="1.0" encoding="utf-8"?>
+<p:sld xmlns:a="http://schemas.openxmlformats.org/drawingml/2006/main" xmlns:r="http://schemas.openxmlformats.org/officeDocument/2006/relationships" xmlns:p="http://schemas.openxmlformats.org/presentationml/2006/main">
+  <p:cSld>
+    <p:spTree>
+      <p:nvGrpSpPr>
+        <p:cNvPr id="1" name=""/>
+        <p:cNvGrpSpPr/>
+        <p:nvPr/>
+      </p:nvGrpSpPr>
+      <p:grpSpPr>
+        <a:xfrm>
+          <a:off x="0" y="0"/>
+          <a:ext cx="0" cy="0"/>
+          <a:chOff x="0" y="0"/>
+          <a:chExt cx="0" cy="0"/>
+        </a:xfrm>
+      </p:grpSpPr>
       <p:pic>
         <p:nvPicPr>
           <p:cNvPr id="2051" name="Picture 3"/>
@@ -4304,6 +4434,149 @@
           </a:graphicData>
         </a:graphic>
       </p:graphicFrame>
+      <p:sp>
+        <p:nvSpPr>
+          <p:cNvPr id="2" name="1 Título"/>
+          <p:cNvSpPr>
+            <a:spLocks noGrp="1"/>
+          </p:cNvSpPr>
+          <p:nvPr>
+            <p:ph type="title"/>
+          </p:nvPr>
+        </p:nvSpPr>
+        <p:spPr/>
+        <p:txBody>
+          <a:bodyPr/>
+          <a:lstStyle/>
+          <a:p>
+            <a:r>
+              <a:rPr lang="es-ES" dirty="0" smtClean="0"/>
+              <a:t>QMP</a:t>
+            </a:r>
+            <a:endParaRPr lang="es-ES" dirty="0"/>
+          </a:p>
+        </p:txBody>
+      </p:sp>
+      <p:sp>
+        <p:nvSpPr>
+          <p:cNvPr id="3" name="2 Marcador de contenido"/>
+          <p:cNvSpPr>
+            <a:spLocks noGrp="1"/>
+          </p:cNvSpPr>
+          <p:nvPr>
+            <p:ph idx="1"/>
+          </p:nvPr>
+        </p:nvSpPr>
+        <p:spPr/>
+        <p:txBody>
+          <a:bodyPr/>
+          <a:lstStyle/>
+          <a:p>
+            <a:pPr algn="just">
+              <a:buNone/>
+            </a:pPr>
+            <a:r>
+              <a:rPr lang="en-US" b="1" dirty="0" smtClean="0"/>
+              <a:t>BMX6</a:t>
+            </a:r>
+          </a:p>
+          <a:p>
+            <a:pPr algn="just"/>
+            <a:r>
+              <a:rPr lang="en-US" dirty="0" smtClean="0"/>
+              <a:t>Pro-active: Uses UDP flooding to periodically send Originator Messages (OGM) and build a routing table.</a:t>
+            </a:r>
+          </a:p>
+          <a:p>
+            <a:pPr algn="just"/>
+            <a:r>
+              <a:rPr lang="en-US" dirty="0" smtClean="0"/>
+              <a:t>Destination-sequenced, Distance-vector (DSDV): Every node just knows which neighbor is better to reach another, namely, they do not need to know the entire topology, just the best paths.</a:t>
+            </a:r>
+          </a:p>
+          <a:p>
+            <a:pPr algn="just"/>
+            <a:r>
+              <a:rPr lang="en-US" dirty="0" smtClean="0"/>
+              <a:t>Does not use IP as node identifier, it uses global identifiers using SHA2 hashing. </a:t>
+            </a:r>
+          </a:p>
+          <a:p>
+            <a:endParaRPr lang="es-ES" dirty="0" smtClean="0"/>
+          </a:p>
+          <a:p>
+            <a:pPr>
+              <a:buNone/>
+            </a:pPr>
+            <a:endParaRPr lang="es-ES" b="1" dirty="0"/>
+          </a:p>
+        </p:txBody>
+      </p:sp>
+      <p:sp>
+        <p:nvSpPr>
+          <p:cNvPr id="4" name="3 Marcador de número de diapositiva"/>
+          <p:cNvSpPr>
+            <a:spLocks noGrp="1"/>
+          </p:cNvSpPr>
+          <p:nvPr>
+            <p:ph type="sldNum" sz="quarter" idx="12"/>
+          </p:nvPr>
+        </p:nvSpPr>
+        <p:spPr/>
+        <p:txBody>
+          <a:bodyPr/>
+          <a:lstStyle/>
+          <a:p>
+            <a:fld id="{DA3FA644-4273-4B12-888A-E74B32B8A478}" type="slidenum">
+              <a:rPr lang="ru-RU" smtClean="0"/>
+              <a:pPr/>
+              <a:t>11</a:t>
+            </a:fld>
+            <a:endParaRPr lang="ru-RU"/>
+          </a:p>
+        </p:txBody>
+      </p:sp>
+      <p:pic>
+        <p:nvPicPr>
+          <p:cNvPr id="7" name="Picture 2" descr="C:\Users\Fernando\Pictures\TFG\BMX6 Frames.png"/>
+          <p:cNvPicPr>
+            <a:picLocks noChangeAspect="1" noChangeArrowheads="1"/>
+          </p:cNvPicPr>
+          <p:nvPr/>
+        </p:nvPicPr>
+        <p:blipFill>
+          <a:blip r:embed="rId3" cstate="print">
+            <a:extLst>
+              <a:ext uri="{28A0092B-C50C-407E-A947-70E740481C1C}">
+                <a14:useLocalDpi xmlns="" xmlns:a14="http://schemas.microsoft.com/office/drawing/2010/main" val="0"/>
+              </a:ext>
+            </a:extLst>
+          </a:blip>
+          <a:srcRect/>
+          <a:stretch>
+            <a:fillRect/>
+          </a:stretch>
+        </p:blipFill>
+        <p:spPr bwMode="auto">
+          <a:xfrm>
+            <a:off x="1115616" y="1268760"/>
+            <a:ext cx="6552728" cy="4435511"/>
+          </a:xfrm>
+          <a:prstGeom prst="rect">
+            <a:avLst/>
+          </a:prstGeom>
+          <a:noFill/>
+          <a:extLst>
+            <a:ext uri="{909E8E84-426E-40DD-AFC4-6F175D3DCCD1}">
+              <a14:hiddenFill xmlns="" xmlns:a14="http://schemas.microsoft.com/office/drawing/2010/main">
+                <a:solidFill>
+                  <a:srgbClr val="FFFFFF"/>
+                </a:solidFill>
+              </a14:hiddenFill>
+            </a:ext>
+          </a:extLst>
+        </p:spPr>
+      </p:pic>
     </p:spTree>
   </p:cSld>
   <p:clrMapOvr>
@@ -4561,13 +4834,13 @@
                                 </p:cTn>
                               </p:par>
                               <p:par>
-                                <p:cTn id="17" presetID="4" presetClass="exit" presetSubtype="16" fill="hold" grpId="0" nodeType="withEffect">
+                                <p:cTn id="17" presetID="2" presetClass="exit" presetSubtype="4" fill="hold" grpId="0" nodeType="withEffect">
                                   <p:stCondLst>
                                     <p:cond delay="0"/>
                                   </p:stCondLst>
                                   <p:childTnLst>
-                                    <p:animEffect transition="out" filter="box(in)">
-                                      <p:cBhvr>
+                                    <p:anim calcmode="lin" valueType="num">
+                                      <p:cBhvr additive="base">
                                         <p:cTn id="18" dur="500"/>
                                         <p:tgtEl>
                                           <p:spTgt spid="3">
@@ -4576,11 +4849,53 @@
                                             </p:txEl>
                                           </p:spTgt>
                                         </p:tgtEl>
-                                      </p:cBhvr>
-                                    </p:animEffect>
+                                        <p:attrNameLst>
+                                          <p:attrName>ppt_x</p:attrName>
+                                        </p:attrNameLst>
+                                      </p:cBhvr>
+                                      <p:tavLst>
+                                        <p:tav tm="0">
+                                          <p:val>
+                                            <p:strVal val="ppt_x"/>
+                                          </p:val>
+                                        </p:tav>
+                                        <p:tav tm="100000">
+                                          <p:val>
+                                            <p:strVal val="ppt_x"/>
+                                          </p:val>
+                                        </p:tav>
+                                      </p:tavLst>
+                                    </p:anim>
+                                    <p:anim calcmode="lin" valueType="num">
+                                      <p:cBhvr additive="base">
+                                        <p:cTn id="19" dur="500"/>
+                                        <p:tgtEl>
+                                          <p:spTgt spid="3">
+                                            <p:txEl>
+                                              <p:pRg st="0" end="0"/>
+                                            </p:txEl>
+                                          </p:spTgt>
+                                        </p:tgtEl>
+                                        <p:attrNameLst>
+                                          <p:attrName>ppt_y</p:attrName>
+                                        </p:attrNameLst>
+                                      </p:cBhvr>
+                                      <p:tavLst>
+                                        <p:tav tm="0">
+                                          <p:val>
+                                            <p:strVal val="ppt_y"/>
+                                          </p:val>
+                                        </p:tav>
+                                        <p:tav tm="100000">
+                                          <p:val>
+                                            <p:strVal val="1+ppt_h/2"/>
+                                          </p:val>
+                                        </p:tav>
+                                      </p:tavLst>
+                                    </p:anim>
                                     <p:set>
                                       <p:cBhvr>
-                                        <p:cTn id="19" dur="1" fill="hold">
+                                        <p:cTn id="20" dur="1" fill="hold">
                                           <p:stCondLst>
                                             <p:cond delay="499"/>
                                           </p:stCondLst>
@@ -4604,14 +4919,14 @@
                                 </p:cTn>
                               </p:par>
                               <p:par>
-                                <p:cTn id="20" presetID="4" presetClass="exit" presetSubtype="16" fill="hold" grpId="0" nodeType="withEffect">
+                                <p:cTn id="21" presetID="2" presetClass="exit" presetSubtype="4" fill="hold" grpId="0" nodeType="withEffect">
                                   <p:stCondLst>
                                     <p:cond delay="0"/>
                                   </p:stCondLst>
                                   <p:childTnLst>
-                                    <p:animEffect transition="out" filter="box(in)">
-                                      <p:cBhvr>
-                                        <p:cTn id="21" dur="500"/>
+                                    <p:anim calcmode="lin" valueType="num">
+                                      <p:cBhvr additive="base">
+                                        <p:cTn id="22" dur="500"/>
                                         <p:tgtEl>
                                           <p:spTgt spid="3">
                                             <p:txEl>
@@ -4619,11 +4934,53 @@
                                             </p:txEl>
                                           </p:spTgt>
                                         </p:tgtEl>
-                                      </p:cBhvr>
-                                    </p:animEffect>
+                                        <p:attrNameLst>
+                                          <p:attrName>ppt_x</p:attrName>
+                                        </p:attrNameLst>
+                                      </p:cBhvr>
+                                      <p:tavLst>
+                                        <p:tav tm="0">
+                                          <p:val>
+                                            <p:strVal val="ppt_x"/>
+                                          </p:val>
+                                        </p:tav>
+                                        <p:tav tm="100000">
+                                          <p:val>
+                                            <p:strVal val="ppt_x"/>
+                                          </p:val>
+                                        </p:tav>
+                                      </p:tavLst>
+                                    </p:anim>
+                                    <p:anim calcmode="lin" valueType="num">
+                                      <p:cBhvr additive="base">
+                                        <p:cTn id="23" dur="500"/>
+                                        <p:tgtEl>
+                                          <p:spTgt spid="3">
+                                            <p:txEl>
+                                              <p:pRg st="1" end="1"/>
+                                            </p:txEl>
+                                          </p:spTgt>
+                                        </p:tgtEl>
+                                        <p:attrNameLst>
+                                          <p:attrName>ppt_y</p:attrName>
+                                        </p:attrNameLst>
+                                      </p:cBhvr>
+                                      <p:tavLst>
+                                        <p:tav tm="0">
+                                          <p:val>
+                                            <p:strVal val="ppt_y"/>
+                                          </p:val>
+                                        </p:tav>
+                                        <p:tav tm="100000">
+                                          <p:val>
+                                            <p:strVal val="1+ppt_h/2"/>
+                                          </p:val>
+                                        </p:tav>
+                                      </p:tavLst>
+                                    </p:anim>
                                     <p:set>
                                       <p:cBhvr>
-                                        <p:cTn id="22" dur="1" fill="hold">
+                                        <p:cTn id="24" dur="1" fill="hold">
                                           <p:stCondLst>
                                             <p:cond delay="499"/>
                                           </p:stCondLst>
@@ -4647,14 +5004,14 @@
                                 </p:cTn>
                               </p:par>
                               <p:par>
-                                <p:cTn id="23" presetID="4" presetClass="exit" presetSubtype="16" fill="hold" grpId="0" nodeType="withEffect">
+                                <p:cTn id="25" presetID="2" presetClass="exit" presetSubtype="4" fill="hold" grpId="0" nodeType="withEffect">
                                   <p:stCondLst>
                                     <p:cond delay="0"/>
                                   </p:stCondLst>
                                   <p:childTnLst>
-                                    <p:animEffect transition="out" filter="box(in)">
-                                      <p:cBhvr>
-                                        <p:cTn id="24" dur="500"/>
+                                    <p:anim calcmode="lin" valueType="num">
+                                      <p:cBhvr additive="base">
+                                        <p:cTn id="26" dur="500"/>
                                         <p:tgtEl>
                                           <p:spTgt spid="3">
                                             <p:txEl>
@@ -4662,11 +5019,53 @@
                                             </p:txEl>
                                           </p:spTgt>
                                         </p:tgtEl>
-                                      </p:cBhvr>
-                                    </p:animEffect>
+                                        <p:attrNameLst>
+                                          <p:attrName>ppt_x</p:attrName>
+                                        </p:attrNameLst>
+                                      </p:cBhvr>
+                                      <p:tavLst>
+                                        <p:tav tm="0">
+                                          <p:val>
+                                            <p:strVal val="ppt_x"/>
+                                          </p:val>
+                                        </p:tav>
+                                        <p:tav tm="100000">
+                                          <p:val>
+                                            <p:strVal val="ppt_x"/>
+                                          </p:val>
+                                        </p:tav>
+                                      </p:tavLst>
+                                    </p:anim>
+                                    <p:anim calcmode="lin" valueType="num">
+                                      <p:cBhvr additive="base">
+                                        <p:cTn id="27" dur="500"/>
+                                        <p:tgtEl>
+                                          <p:spTgt spid="3">
+                                            <p:txEl>
+                                              <p:pRg st="2" end="2"/>
+                                            </p:txEl>
+                                          </p:spTgt>
+                                        </p:tgtEl>
+                                        <p:attrNameLst>
+                                          <p:attrName>ppt_y</p:attrName>
+                                        </p:attrNameLst>
+                                      </p:cBhvr>
+                                      <p:tavLst>
+                                        <p:tav tm="0">
+                                          <p:val>
+                                            <p:strVal val="ppt_y"/>
+                                          </p:val>
+                                        </p:tav>
+                                        <p:tav tm="100000">
+                                          <p:val>
+                                            <p:strVal val="1+ppt_h/2"/>
+                                          </p:val>
+                                        </p:tav>
+                                      </p:tavLst>
+                                    </p:anim>
                                     <p:set>
                                       <p:cBhvr>
-                                        <p:cTn id="25" dur="1" fill="hold">
+                                        <p:cTn id="28" dur="1" fill="hold">
                                           <p:stCondLst>
                                             <p:cond delay="499"/>
                                           </p:stCondLst>
@@ -4690,14 +5089,99 @@
                                 </p:cTn>
                               </p:par>
                               <p:par>
-                                <p:cTn id="26" presetID="8" presetClass="exit" presetSubtype="16" fill="hold" grpId="0" nodeType="withEffect">
+                                <p:cTn id="29" presetID="2" presetClass="exit" presetSubtype="4" fill="hold" grpId="0" nodeType="withEffect">
+                                  <p:stCondLst>
+                                    <p:cond delay="0"/>
+                                  </p:stCondLst>
+                                  <p:childTnLst>
+                                    <p:anim calcmode="lin" valueType="num">
+                                      <p:cBhvr additive="base">
+                                        <p:cTn id="30" dur="500"/>
+                                        <p:tgtEl>
+                                          <p:spTgt spid="3">
+                                            <p:txEl>
+                                              <p:pRg st="3" end="3"/>
+                                            </p:txEl>
+                                          </p:spTgt>
+                                        </p:tgtEl>
+                                        <p:attrNameLst>
+                                          <p:attrName>ppt_x</p:attrName>
+                                        </p:attrNameLst>
+                                      </p:cBhvr>
+                                      <p:tavLst>
+                                        <p:tav tm="0">
+                                          <p:val>
+                                            <p:strVal val="ppt_x"/>
+                                          </p:val>
+                                        </p:tav>
+                                        <p:tav tm="100000">
+                                          <p:val>
+                                            <p:strVal val="ppt_x"/>
+                                          </p:val>
+                                        </p:tav>
+                                      </p:tavLst>
+                                    </p:anim>
+                                    <p:anim calcmode="lin" valueType="num">
+                                      <p:cBhvr additive="base">
+                                        <p:cTn id="31" dur="500"/>
+                                        <p:tgtEl>
+                                          <p:spTgt spid="3">
+                                            <p:txEl>
+                                              <p:pRg st="3" end="3"/>
+                                            </p:txEl>
+                                          </p:spTgt>
+                                        </p:tgtEl>
+                                        <p:attrNameLst>
+                                          <p:attrName>ppt_y</p:attrName>
+                                        </p:attrNameLst>
+                                      </p:cBhvr>
+                                      <p:tavLst>
+                                        <p:tav tm="0">
+                                          <p:val>
+                                            <p:strVal val="ppt_y"/>
+                                          </p:val>
+                                        </p:tav>
+                                        <p:tav tm="100000">
+                                          <p:val>
+                                            <p:strVal val="1+ppt_h/2"/>
+                                          </p:val>
+                                        </p:tav>
+                                      </p:tavLst>
+                                    </p:anim>
+                                    <p:set>
+                                      <p:cBhvr>
+                                        <p:cTn id="32" dur="1" fill="hold">
+                                          <p:stCondLst>
+                                            <p:cond delay="499"/>
+                                          </p:stCondLst>
+                                        </p:cTn>
+                                        <p:tgtEl>
+                                          <p:spTgt spid="3">
+                                            <p:txEl>
+                                              <p:pRg st="3" end="3"/>
+                                            </p:txEl>
+                                          </p:spTgt>
+                                        </p:tgtEl>
+                                        <p:attrNameLst>
+                                          <p:attrName>style.visibility</p:attrName>
+                                        </p:attrNameLst>
+                                      </p:cBhvr>
+                                      <p:to>
+                                        <p:strVal val="hidden"/>
+                                      </p:to>
+                                    </p:set>
+                                  </p:childTnLst>
+                                </p:cTn>
+                              </p:par>
+                              <p:par>
+                                <p:cTn id="33" presetID="8" presetClass="exit" presetSubtype="16" fill="hold" grpId="0" nodeType="withEffect">
                                   <p:stCondLst>
                                     <p:cond delay="0"/>
                                   </p:stCondLst>
                                   <p:childTnLst>
                                     <p:animEffect transition="out" filter="diamond(in)">
                                       <p:cBhvr>
-                                        <p:cTn id="27" dur="500"/>
+                                        <p:cTn id="34" dur="500"/>
                                         <p:tgtEl>
                                           <p:spTgt spid="2"/>
                                         </p:tgtEl>
@@ -4705,7 +5189,7 @@
                                     </p:animEffect>
                                     <p:set>
                                       <p:cBhvr>
-                                        <p:cTn id="28" dur="1" fill="hold">
+                                        <p:cTn id="35" dur="1" fill="hold">
                                           <p:stCondLst>
                                             <p:cond delay="499"/>
                                           </p:stCondLst>
@@ -4721,6 +5205,205 @@
                                         <p:strVal val="hidden"/>
                                       </p:to>
                                     </p:set>
+                                  </p:childTnLst>
+                                </p:cTn>
+                              </p:par>
+                            </p:childTnLst>
+                          </p:cTn>
+                        </p:par>
+                      </p:childTnLst>
+                    </p:cTn>
+                  </p:par>
+                  <p:par>
+                    <p:cTn id="36" fill="hold">
+                      <p:stCondLst>
+                        <p:cond delay="indefinite"/>
+                      </p:stCondLst>
+                      <p:childTnLst>
+                        <p:par>
+                          <p:cTn id="37" fill="hold">
+                            <p:stCondLst>
+                              <p:cond delay="0"/>
+                            </p:stCondLst>
+                            <p:childTnLst>
+                              <p:par>
+                                <p:cTn id="38" presetID="2" presetClass="exit" presetSubtype="4" fill="hold" nodeType="clickEffect">
+                                  <p:stCondLst>
+                                    <p:cond delay="0"/>
+                                  </p:stCondLst>
+                                  <p:childTnLst>
+                                    <p:anim calcmode="lin" valueType="num">
+                                      <p:cBhvr additive="base">
+                                        <p:cTn id="39" dur="500"/>
+                                        <p:tgtEl>
+                                          <p:spTgt spid="2051"/>
+                                        </p:tgtEl>
+                                        <p:attrNameLst>
+                                          <p:attrName>ppt_x</p:attrName>
+                                        </p:attrNameLst>
+                                      </p:cBhvr>
+                                      <p:tavLst>
+                                        <p:tav tm="0">
+                                          <p:val>
+                                            <p:strVal val="ppt_x"/>
+                                          </p:val>
+                                        </p:tav>
+                                        <p:tav tm="100000">
+                                          <p:val>
+                                            <p:strVal val="ppt_x"/>
+                                          </p:val>
+                                        </p:tav>
+                                      </p:tavLst>
+                                    </p:anim>
+                                    <p:anim calcmode="lin" valueType="num">
+                                      <p:cBhvr additive="base">
+                                        <p:cTn id="40" dur="500"/>
+                                        <p:tgtEl>
+                                          <p:spTgt spid="2051"/>
+                                        </p:tgtEl>
+                                        <p:attrNameLst>
+                                          <p:attrName>ppt_y</p:attrName>
+                                        </p:attrNameLst>
+                                      </p:cBhvr>
+                                      <p:tavLst>
+                                        <p:tav tm="0">
+                                          <p:val>
+                                            <p:strVal val="ppt_y"/>
+                                          </p:val>
+                                        </p:tav>
+                                        <p:tav tm="100000">
+                                          <p:val>
+                                            <p:strVal val="1+ppt_h/2"/>
+                                          </p:val>
+                                        </p:tav>
+                                      </p:tavLst>
+                                    </p:anim>
+                                    <p:set>
+                                      <p:cBhvr>
+                                        <p:cTn id="41" dur="1" fill="hold">
+                                          <p:stCondLst>
+                                            <p:cond delay="499"/>
+                                          </p:stCondLst>
+                                        </p:cTn>
+                                        <p:tgtEl>
+                                          <p:spTgt spid="2051"/>
+                                        </p:tgtEl>
+                                        <p:attrNameLst>
+                                          <p:attrName>style.visibility</p:attrName>
+                                        </p:attrNameLst>
+                                      </p:cBhvr>
+                                      <p:to>
+                                        <p:strVal val="hidden"/>
+                                      </p:to>
+                                    </p:set>
+                                  </p:childTnLst>
+                                </p:cTn>
+                              </p:par>
+                              <p:par>
+                                <p:cTn id="42" presetID="2" presetClass="exit" presetSubtype="4" fill="hold" nodeType="withEffect">
+                                  <p:stCondLst>
+                                    <p:cond delay="0"/>
+                                  </p:stCondLst>
+                                  <p:childTnLst>
+                                    <p:anim calcmode="lin" valueType="num">
+                                      <p:cBhvr additive="base">
+                                        <p:cTn id="43" dur="500"/>
+                                        <p:tgtEl>
+                                          <p:spTgt spid="19"/>
+                                        </p:tgtEl>
+                                        <p:attrNameLst>
+                                          <p:attrName>ppt_x</p:attrName>
+                                        </p:attrNameLst>
+                                      </p:cBhvr>
+                                      <p:tavLst>
+                                        <p:tav tm="0">
+                                          <p:val>
+                                            <p:strVal val="ppt_x"/>
+                                          </p:val>
+                                        </p:tav>
+                                        <p:tav tm="100000">
+                                          <p:val>
+                                            <p:strVal val="ppt_x"/>
+                                          </p:val>
+                                        </p:tav>
+                                      </p:tavLst>
+                                    </p:anim>
+                                    <p:anim calcmode="lin" valueType="num">
+                                      <p:cBhvr additive="base">
+                                        <p:cTn id="44" dur="500"/>
+                                        <p:tgtEl>
+                                          <p:spTgt spid="19"/>
+                                        </p:tgtEl>
+                                        <p:attrNameLst>
+                                          <p:attrName>ppt_y</p:attrName>
+                                        </p:attrNameLst>
+                                      </p:cBhvr>
+                                      <p:tavLst>
+                                        <p:tav tm="0">
+                                          <p:val>
+                                            <p:strVal val="ppt_y"/>
+                                          </p:val>
+                                        </p:tav>
+                                        <p:tav tm="100000">
+                                          <p:val>
+                                            <p:strVal val="1+ppt_h/2"/>
+                                          </p:val>
+                                        </p:tav>
+                                      </p:tavLst>
+                                    </p:anim>
+                                    <p:set>
+                                      <p:cBhvr>
+                                        <p:cTn id="45" dur="1" fill="hold">
+                                          <p:stCondLst>
+                                            <p:cond delay="499"/>
+                                          </p:stCondLst>
+                                        </p:cTn>
+                                        <p:tgtEl>
+                                          <p:spTgt spid="19"/>
+                                        </p:tgtEl>
+                                        <p:attrNameLst>
+                                          <p:attrName>style.visibility</p:attrName>
+                                        </p:attrNameLst>
+                                      </p:cBhvr>
+                                      <p:to>
+                                        <p:strVal val="hidden"/>
+                                      </p:to>
+                                    </p:set>
+                                  </p:childTnLst>
+                                </p:cTn>
+                              </p:par>
+                              <p:par>
+                                <p:cTn id="46" presetID="8" presetClass="entr" presetSubtype="16" fill="hold" nodeType="withEffect">
+                                  <p:stCondLst>
+                                    <p:cond delay="0"/>
+                                  </p:stCondLst>
+                                  <p:childTnLst>
+                                    <p:set>
+                                      <p:cBhvr>
+                                        <p:cTn id="47" dur="1" fill="hold">
+                                          <p:stCondLst>
+                                            <p:cond delay="0"/>
+                                          </p:stCondLst>
+                                        </p:cTn>
+                                        <p:tgtEl>
+                                          <p:spTgt spid="7"/>
+                                        </p:tgtEl>
+                                        <p:attrNameLst>
+                                          <p:attrName>style.visibility</p:attrName>
+                                        </p:attrNameLst>
+                                      </p:cBhvr>
+                                      <p:to>
+                                        <p:strVal val="visible"/>
+                                      </p:to>
+                                    </p:set>
+                                    <p:animEffect transition="in" filter="diamond(in)">
+                                      <p:cBhvr>
+                                        <p:cTn id="48" dur="500"/>
+                                        <p:tgtEl>
+                                          <p:spTgt spid="7"/>
+                                        </p:tgtEl>
+                                      </p:cBhvr>
+                                    </p:animEffect>
                                   </p:childTnLst>
                                 </p:cTn>
                               </p:par>
@@ -4759,260 +5442,6 @@
 </p:sld>
 </file>
 
-<file path=ppt/slides/slide11.xml><?xml version="1.0" encoding="utf-8"?>
-<p:sld xmlns:a="http://schemas.openxmlformats.org/drawingml/2006/main" xmlns:r="http://schemas.openxmlformats.org/officeDocument/2006/relationships" xmlns:p="http://schemas.openxmlformats.org/presentationml/2006/main">
-  <p:cSld>
-    <p:spTree>
-      <p:nvGrpSpPr>
-        <p:cNvPr id="1" name=""/>
-        <p:cNvGrpSpPr/>
-        <p:nvPr/>
-      </p:nvGrpSpPr>
-      <p:grpSpPr>
-        <a:xfrm>
-          <a:off x="0" y="0"/>
-          <a:ext cx="0" cy="0"/>
-          <a:chOff x="0" y="0"/>
-          <a:chExt cx="0" cy="0"/>
-        </a:xfrm>
-      </p:grpSpPr>
-      <p:sp>
-        <p:nvSpPr>
-          <p:cNvPr id="2" name="1 Título"/>
-          <p:cNvSpPr>
-            <a:spLocks noGrp="1"/>
-          </p:cNvSpPr>
-          <p:nvPr>
-            <p:ph type="title"/>
-          </p:nvPr>
-        </p:nvSpPr>
-        <p:spPr/>
-        <p:txBody>
-          <a:bodyPr/>
-          <a:lstStyle/>
-          <a:p>
-            <a:r>
-              <a:rPr lang="en-US" dirty="0" smtClean="0"/>
-              <a:t>Information Sources</a:t>
-            </a:r>
-            <a:endParaRPr lang="en-US" dirty="0"/>
-          </a:p>
-        </p:txBody>
-      </p:sp>
-      <p:sp>
-        <p:nvSpPr>
-          <p:cNvPr id="3" name="2 Marcador de contenido"/>
-          <p:cNvSpPr>
-            <a:spLocks noGrp="1"/>
-          </p:cNvSpPr>
-          <p:nvPr>
-            <p:ph idx="1"/>
-          </p:nvPr>
-        </p:nvSpPr>
-        <p:spPr/>
-        <p:txBody>
-          <a:bodyPr/>
-          <a:lstStyle/>
-          <a:p>
-            <a:r>
-              <a:rPr lang="en-US" sz="2000" dirty="0" err="1" smtClean="0"/>
-              <a:t>Escrich</a:t>
-            </a:r>
-            <a:r>
-              <a:rPr lang="en-US" sz="2000" dirty="0" smtClean="0"/>
-              <a:t>, P. (2012, January). Quick deployment network using MANET. Retrieved March </a:t>
-            </a:r>
-            <a:r>
-              <a:rPr lang="en-US" sz="2000" dirty="0" smtClean="0"/>
-              <a:t>4, </a:t>
-            </a:r>
-            <a:r>
-              <a:rPr lang="en-US" sz="2000" dirty="0" smtClean="0"/>
-              <a:t>2013</a:t>
-            </a:r>
-          </a:p>
-          <a:p>
-            <a:r>
-              <a:rPr lang="es-ES" sz="2000" dirty="0" err="1" smtClean="0"/>
-              <a:t>Escrich</a:t>
-            </a:r>
-            <a:r>
-              <a:rPr lang="es-ES" sz="2000" dirty="0" smtClean="0"/>
-              <a:t>, P. (2012, </a:t>
-            </a:r>
-            <a:r>
-              <a:rPr lang="es-ES" sz="2000" dirty="0" err="1" smtClean="0"/>
-              <a:t>November</a:t>
-            </a:r>
-            <a:r>
-              <a:rPr lang="es-ES" sz="2000" dirty="0" smtClean="0"/>
-              <a:t> 17). </a:t>
-            </a:r>
-            <a:r>
-              <a:rPr lang="es-ES" sz="2000" dirty="0" err="1" smtClean="0"/>
-              <a:t>Xarxes</a:t>
-            </a:r>
-            <a:r>
-              <a:rPr lang="es-ES" sz="2000" dirty="0" smtClean="0"/>
-              <a:t> </a:t>
-            </a:r>
-            <a:r>
-              <a:rPr lang="es-ES" sz="2000" dirty="0" err="1" smtClean="0"/>
-              <a:t>Mesh</a:t>
-            </a:r>
-            <a:r>
-              <a:rPr lang="es-ES" sz="2000" dirty="0" smtClean="0"/>
-              <a:t>. </a:t>
-            </a:r>
-            <a:r>
-              <a:rPr lang="es-ES" sz="2000" dirty="0" err="1" smtClean="0"/>
-              <a:t>Curs</a:t>
-            </a:r>
-            <a:r>
-              <a:rPr lang="es-ES" sz="2000" dirty="0" smtClean="0"/>
-              <a:t> Guifi.net 2012. </a:t>
-            </a:r>
-            <a:r>
-              <a:rPr lang="es-ES" sz="2000" dirty="0" err="1" smtClean="0"/>
-              <a:t>Retrieved</a:t>
-            </a:r>
-            <a:r>
-              <a:rPr lang="es-ES" sz="2000" dirty="0" smtClean="0"/>
-              <a:t> </a:t>
-            </a:r>
-            <a:r>
-              <a:rPr lang="es-ES" sz="2000" dirty="0" err="1" smtClean="0"/>
-              <a:t>March</a:t>
-            </a:r>
-            <a:r>
-              <a:rPr lang="es-ES" sz="2000" dirty="0" smtClean="0"/>
-              <a:t> 5, </a:t>
-            </a:r>
-            <a:r>
-              <a:rPr lang="es-ES" sz="2000" dirty="0" smtClean="0"/>
-              <a:t>2013</a:t>
-            </a:r>
-          </a:p>
-          <a:p>
-            <a:r>
-              <a:rPr lang="en-US" sz="2000" dirty="0" smtClean="0"/>
-              <a:t>Mobile ad hoc network. (</a:t>
-            </a:r>
-            <a:r>
-              <a:rPr lang="en-US" sz="2000" dirty="0" err="1" smtClean="0"/>
-              <a:t>n.d</a:t>
-            </a:r>
-            <a:r>
-              <a:rPr lang="en-US" sz="2000" dirty="0" smtClean="0"/>
-              <a:t>.). In </a:t>
-            </a:r>
-            <a:r>
-              <a:rPr lang="en-US" sz="2000" i="1" dirty="0" smtClean="0"/>
-              <a:t>Wikipedia</a:t>
-            </a:r>
-            <a:r>
-              <a:rPr lang="en-US" sz="2000" dirty="0" smtClean="0"/>
-              <a:t>. Retrieved March </a:t>
-            </a:r>
-            <a:r>
-              <a:rPr lang="en-US" sz="2000" dirty="0" smtClean="0"/>
-              <a:t>4, </a:t>
-            </a:r>
-            <a:r>
-              <a:rPr lang="en-US" sz="2000" dirty="0" smtClean="0"/>
-              <a:t>2013, </a:t>
-            </a:r>
-            <a:r>
-              <a:rPr lang="en-US" sz="2000" dirty="0" smtClean="0"/>
-              <a:t>from http</a:t>
-            </a:r>
-            <a:r>
-              <a:rPr lang="en-US" sz="2000" dirty="0" smtClean="0"/>
-              <a:t>://</a:t>
-            </a:r>
-            <a:r>
-              <a:rPr lang="en-US" sz="2000" dirty="0" smtClean="0"/>
-              <a:t>en.wikipedia.org/wiki/Mobile_ad_hoc_network</a:t>
-            </a:r>
-          </a:p>
-          <a:p>
-            <a:r>
-              <a:rPr lang="en-US" sz="2000" dirty="0" smtClean="0"/>
-              <a:t>Starting a Community. (2013, January 11). In </a:t>
-            </a:r>
-            <a:r>
-              <a:rPr lang="en-US" sz="2000" i="1" dirty="0" smtClean="0"/>
-              <a:t>Quick Mesh Project</a:t>
-            </a:r>
-            <a:r>
-              <a:rPr lang="en-US" sz="2000" dirty="0" smtClean="0"/>
-              <a:t>. Retrieved March 5, 2013, from http://qmp.cat/projects/qmp/wiki/Starting </a:t>
-            </a:r>
-            <a:endParaRPr lang="en-US" sz="2000" dirty="0" smtClean="0"/>
-          </a:p>
-          <a:p>
-            <a:r>
-              <a:rPr lang="en-US" sz="2000" dirty="0" smtClean="0"/>
-              <a:t>Roaming-Community/Collaborative. (2012, June 26). In </a:t>
-            </a:r>
-            <a:r>
-              <a:rPr lang="en-US" sz="2000" i="1" dirty="0" smtClean="0"/>
-              <a:t>Quick Mesh Project</a:t>
-            </a:r>
-            <a:r>
-              <a:rPr lang="en-US" sz="2000" dirty="0" smtClean="0"/>
-              <a:t>. Retrieved March 5, 2013, from http://qmp.cat/projects/qmp/wiki/Roaming-Collaborative </a:t>
-            </a:r>
-            <a:r>
-              <a:rPr lang="en-US" dirty="0" smtClean="0"/>
-              <a:t/>
-            </a:r>
-            <a:br>
-              <a:rPr lang="en-US" dirty="0" smtClean="0"/>
-            </a:br>
-            <a:endParaRPr lang="es-ES" dirty="0"/>
-          </a:p>
-        </p:txBody>
-      </p:sp>
-      <p:sp>
-        <p:nvSpPr>
-          <p:cNvPr id="4" name="3 Marcador de número de diapositiva"/>
-          <p:cNvSpPr>
-            <a:spLocks noGrp="1"/>
-          </p:cNvSpPr>
-          <p:nvPr>
-            <p:ph type="sldNum" sz="quarter" idx="12"/>
-          </p:nvPr>
-        </p:nvSpPr>
-        <p:spPr/>
-        <p:txBody>
-          <a:bodyPr/>
-          <a:lstStyle/>
-          <a:p>
-            <a:fld id="{DA3FA644-4273-4B12-888A-E74B32B8A478}" type="slidenum">
-              <a:rPr lang="ru-RU" smtClean="0"/>
-              <a:pPr/>
-              <a:t>11</a:t>
-            </a:fld>
-            <a:endParaRPr lang="ru-RU"/>
-          </a:p>
-        </p:txBody>
-      </p:sp>
-    </p:spTree>
-  </p:cSld>
-  <p:clrMapOvr>
-    <a:masterClrMapping/>
-  </p:clrMapOvr>
-  <p:timing>
-    <p:tnLst>
-      <p:par>
-        <p:cTn id="1" dur="indefinite" restart="never" nodeType="tmRoot"/>
-      </p:par>
-    </p:tnLst>
-  </p:timing>
-</p:sld>
-</file>
-
 <file path=ppt/slides/slide12.xml><?xml version="1.0" encoding="utf-8"?>
 <p:sld xmlns:a="http://schemas.openxmlformats.org/drawingml/2006/main" xmlns:r="http://schemas.openxmlformats.org/officeDocument/2006/relationships" xmlns:p="http://schemas.openxmlformats.org/presentationml/2006/main">
   <p:cSld>
@@ -5032,6 +5461,1158 @@
       </p:grpSpPr>
       <p:sp>
         <p:nvSpPr>
+          <p:cNvPr id="2" name="1 Título"/>
+          <p:cNvSpPr>
+            <a:spLocks noGrp="1"/>
+          </p:cNvSpPr>
+          <p:nvPr>
+            <p:ph type="title"/>
+          </p:nvPr>
+        </p:nvSpPr>
+        <p:spPr/>
+        <p:txBody>
+          <a:bodyPr/>
+          <a:lstStyle/>
+          <a:p>
+            <a:r>
+              <a:rPr lang="es-ES" dirty="0" smtClean="0"/>
+              <a:t>Mobile </a:t>
+            </a:r>
+            <a:r>
+              <a:rPr lang="es-ES" dirty="0" err="1" smtClean="0"/>
+              <a:t>Node</a:t>
+            </a:r>
+            <a:endParaRPr lang="es-ES" dirty="0"/>
+          </a:p>
+        </p:txBody>
+      </p:sp>
+      <p:sp>
+        <p:nvSpPr>
+          <p:cNvPr id="3" name="2 Marcador de contenido"/>
+          <p:cNvSpPr>
+            <a:spLocks noGrp="1"/>
+          </p:cNvSpPr>
+          <p:nvPr>
+            <p:ph idx="1"/>
+          </p:nvPr>
+        </p:nvSpPr>
+        <p:spPr/>
+        <p:txBody>
+          <a:bodyPr>
+            <a:normAutofit lnSpcReduction="10000"/>
+          </a:bodyPr>
+          <a:lstStyle/>
+          <a:p>
+            <a:pPr algn="just"/>
+            <a:r>
+              <a:rPr lang="en-US" dirty="0" smtClean="0"/>
+              <a:t>The main goal of creating a node which has mobility is giving coverage to zones or event that are not covered with the existing fixed infrastructure. And so it has a lot of social implications, for citizens and cities:</a:t>
+            </a:r>
+          </a:p>
+          <a:p>
+            <a:pPr lvl="1" algn="just"/>
+            <a:r>
+              <a:rPr lang="en-US" dirty="0" smtClean="0"/>
+              <a:t>Giving </a:t>
+            </a:r>
+            <a:r>
+              <a:rPr lang="en-US" dirty="0" err="1" smtClean="0"/>
+              <a:t>Wi</a:t>
+            </a:r>
+            <a:r>
+              <a:rPr lang="en-US" dirty="0" smtClean="0"/>
+              <a:t>-FI access to people in a concert or any other event (indoor or outdoors).</a:t>
+            </a:r>
+          </a:p>
+          <a:p>
+            <a:pPr lvl="1" algn="just"/>
+            <a:r>
+              <a:rPr lang="en-US" dirty="0" smtClean="0"/>
+              <a:t>Allow people broadcast something taking place with their Smartphone (apps like </a:t>
+            </a:r>
+            <a:r>
+              <a:rPr lang="en-US" dirty="0" err="1" smtClean="0"/>
+              <a:t>bambuser</a:t>
+            </a:r>
+            <a:r>
+              <a:rPr lang="en-US" dirty="0" smtClean="0"/>
+              <a:t>) or using IP cameras.</a:t>
+            </a:r>
+          </a:p>
+          <a:p>
+            <a:pPr lvl="1" algn="just"/>
+            <a:r>
+              <a:rPr lang="en-US" dirty="0" smtClean="0"/>
+              <a:t>Giving coverage in a protest,  moving the node along with the people.</a:t>
+            </a:r>
+          </a:p>
+          <a:p>
+            <a:pPr lvl="1" algn="just"/>
+            <a:r>
+              <a:rPr lang="en-US" dirty="0" smtClean="0"/>
+              <a:t>Etc!!</a:t>
+            </a:r>
+          </a:p>
+          <a:p>
+            <a:pPr algn="just"/>
+            <a:r>
+              <a:rPr lang="en-US" dirty="0" smtClean="0"/>
+              <a:t>We always need a fixed infrastructure to be able to expand the mesh by adding this node. Cities like Barcelona are creating this kind of infrastructures.</a:t>
+            </a:r>
+          </a:p>
+        </p:txBody>
+      </p:sp>
+      <p:sp>
+        <p:nvSpPr>
+          <p:cNvPr id="4" name="3 Marcador de número de diapositiva"/>
+          <p:cNvSpPr>
+            <a:spLocks noGrp="1"/>
+          </p:cNvSpPr>
+          <p:nvPr>
+            <p:ph type="sldNum" sz="quarter" idx="12"/>
+          </p:nvPr>
+        </p:nvSpPr>
+        <p:spPr/>
+        <p:txBody>
+          <a:bodyPr/>
+          <a:lstStyle/>
+          <a:p>
+            <a:fld id="{DA3FA644-4273-4B12-888A-E74B32B8A478}" type="slidenum">
+              <a:rPr lang="ru-RU" smtClean="0"/>
+              <a:pPr/>
+              <a:t>12</a:t>
+            </a:fld>
+            <a:endParaRPr lang="ru-RU"/>
+          </a:p>
+        </p:txBody>
+      </p:sp>
+      <p:pic>
+        <p:nvPicPr>
+          <p:cNvPr id="5" name="Picture 1"/>
+          <p:cNvPicPr>
+            <a:picLocks noChangeAspect="1" noChangeArrowheads="1"/>
+          </p:cNvPicPr>
+          <p:nvPr/>
+        </p:nvPicPr>
+        <p:blipFill>
+          <a:blip r:embed="rId2" cstate="print"/>
+          <a:srcRect/>
+          <a:stretch>
+            <a:fillRect/>
+          </a:stretch>
+        </p:blipFill>
+        <p:spPr bwMode="auto">
+          <a:xfrm>
+            <a:off x="467544" y="1628800"/>
+            <a:ext cx="7776864" cy="4092608"/>
+          </a:xfrm>
+          <a:prstGeom prst="rect">
+            <a:avLst/>
+          </a:prstGeom>
+          <a:noFill/>
+          <a:ln w="9525">
+            <a:noFill/>
+            <a:miter lim="800000"/>
+            <a:headEnd/>
+            <a:tailEnd/>
+          </a:ln>
+        </p:spPr>
+      </p:pic>
+    </p:spTree>
+  </p:cSld>
+  <p:clrMapOvr>
+    <a:masterClrMapping/>
+  </p:clrMapOvr>
+  <p:timing>
+    <p:tnLst>
+      <p:par>
+        <p:cTn id="1" dur="indefinite" restart="never" nodeType="tmRoot">
+          <p:childTnLst>
+            <p:seq concurrent="1" nextAc="seek">
+              <p:cTn id="2" dur="indefinite" nodeType="mainSeq">
+                <p:childTnLst>
+                  <p:par>
+                    <p:cTn id="3" fill="hold">
+                      <p:stCondLst>
+                        <p:cond delay="indefinite"/>
+                      </p:stCondLst>
+                      <p:childTnLst>
+                        <p:par>
+                          <p:cTn id="4" fill="hold">
+                            <p:stCondLst>
+                              <p:cond delay="0"/>
+                            </p:stCondLst>
+                            <p:childTnLst>
+                              <p:par>
+                                <p:cTn id="5" presetID="2" presetClass="exit" presetSubtype="4" fill="hold" grpId="0" nodeType="clickEffect">
+                                  <p:stCondLst>
+                                    <p:cond delay="0"/>
+                                  </p:stCondLst>
+                                  <p:childTnLst>
+                                    <p:anim calcmode="lin" valueType="num">
+                                      <p:cBhvr additive="base">
+                                        <p:cTn id="6" dur="500"/>
+                                        <p:tgtEl>
+                                          <p:spTgt spid="2"/>
+                                        </p:tgtEl>
+                                        <p:attrNameLst>
+                                          <p:attrName>ppt_x</p:attrName>
+                                        </p:attrNameLst>
+                                      </p:cBhvr>
+                                      <p:tavLst>
+                                        <p:tav tm="0">
+                                          <p:val>
+                                            <p:strVal val="ppt_x"/>
+                                          </p:val>
+                                        </p:tav>
+                                        <p:tav tm="100000">
+                                          <p:val>
+                                            <p:strVal val="ppt_x"/>
+                                          </p:val>
+                                        </p:tav>
+                                      </p:tavLst>
+                                    </p:anim>
+                                    <p:anim calcmode="lin" valueType="num">
+                                      <p:cBhvr additive="base">
+                                        <p:cTn id="7" dur="500"/>
+                                        <p:tgtEl>
+                                          <p:spTgt spid="2"/>
+                                        </p:tgtEl>
+                                        <p:attrNameLst>
+                                          <p:attrName>ppt_y</p:attrName>
+                                        </p:attrNameLst>
+                                      </p:cBhvr>
+                                      <p:tavLst>
+                                        <p:tav tm="0">
+                                          <p:val>
+                                            <p:strVal val="ppt_y"/>
+                                          </p:val>
+                                        </p:tav>
+                                        <p:tav tm="100000">
+                                          <p:val>
+                                            <p:strVal val="1+ppt_h/2"/>
+                                          </p:val>
+                                        </p:tav>
+                                      </p:tavLst>
+                                    </p:anim>
+                                    <p:set>
+                                      <p:cBhvr>
+                                        <p:cTn id="8" dur="1" fill="hold">
+                                          <p:stCondLst>
+                                            <p:cond delay="499"/>
+                                          </p:stCondLst>
+                                        </p:cTn>
+                                        <p:tgtEl>
+                                          <p:spTgt spid="2"/>
+                                        </p:tgtEl>
+                                        <p:attrNameLst>
+                                          <p:attrName>style.visibility</p:attrName>
+                                        </p:attrNameLst>
+                                      </p:cBhvr>
+                                      <p:to>
+                                        <p:strVal val="hidden"/>
+                                      </p:to>
+                                    </p:set>
+                                  </p:childTnLst>
+                                </p:cTn>
+                              </p:par>
+                              <p:par>
+                                <p:cTn id="9" presetID="2" presetClass="exit" presetSubtype="4" fill="hold" grpId="0" nodeType="withEffect">
+                                  <p:stCondLst>
+                                    <p:cond delay="0"/>
+                                  </p:stCondLst>
+                                  <p:childTnLst>
+                                    <p:anim calcmode="lin" valueType="num">
+                                      <p:cBhvr additive="base">
+                                        <p:cTn id="10" dur="500"/>
+                                        <p:tgtEl>
+                                          <p:spTgt spid="3">
+                                            <p:txEl>
+                                              <p:pRg st="0" end="0"/>
+                                            </p:txEl>
+                                          </p:spTgt>
+                                        </p:tgtEl>
+                                        <p:attrNameLst>
+                                          <p:attrName>ppt_x</p:attrName>
+                                        </p:attrNameLst>
+                                      </p:cBhvr>
+                                      <p:tavLst>
+                                        <p:tav tm="0">
+                                          <p:val>
+                                            <p:strVal val="ppt_x"/>
+                                          </p:val>
+                                        </p:tav>
+                                        <p:tav tm="100000">
+                                          <p:val>
+                                            <p:strVal val="ppt_x"/>
+                                          </p:val>
+                                        </p:tav>
+                                      </p:tavLst>
+                                    </p:anim>
+                                    <p:anim calcmode="lin" valueType="num">
+                                      <p:cBhvr additive="base">
+                                        <p:cTn id="11" dur="500"/>
+                                        <p:tgtEl>
+                                          <p:spTgt spid="3">
+                                            <p:txEl>
+                                              <p:pRg st="0" end="0"/>
+                                            </p:txEl>
+                                          </p:spTgt>
+                                        </p:tgtEl>
+                                        <p:attrNameLst>
+                                          <p:attrName>ppt_y</p:attrName>
+                                        </p:attrNameLst>
+                                      </p:cBhvr>
+                                      <p:tavLst>
+                                        <p:tav tm="0">
+                                          <p:val>
+                                            <p:strVal val="ppt_y"/>
+                                          </p:val>
+                                        </p:tav>
+                                        <p:tav tm="100000">
+                                          <p:val>
+                                            <p:strVal val="1+ppt_h/2"/>
+                                          </p:val>
+                                        </p:tav>
+                                      </p:tavLst>
+                                    </p:anim>
+                                    <p:set>
+                                      <p:cBhvr>
+                                        <p:cTn id="12" dur="1" fill="hold">
+                                          <p:stCondLst>
+                                            <p:cond delay="499"/>
+                                          </p:stCondLst>
+                                        </p:cTn>
+                                        <p:tgtEl>
+                                          <p:spTgt spid="3">
+                                            <p:txEl>
+                                              <p:pRg st="0" end="0"/>
+                                            </p:txEl>
+                                          </p:spTgt>
+                                        </p:tgtEl>
+                                        <p:attrNameLst>
+                                          <p:attrName>style.visibility</p:attrName>
+                                        </p:attrNameLst>
+                                      </p:cBhvr>
+                                      <p:to>
+                                        <p:strVal val="hidden"/>
+                                      </p:to>
+                                    </p:set>
+                                  </p:childTnLst>
+                                </p:cTn>
+                              </p:par>
+                              <p:par>
+                                <p:cTn id="13" presetID="2" presetClass="exit" presetSubtype="4" fill="hold" grpId="0" nodeType="withEffect">
+                                  <p:stCondLst>
+                                    <p:cond delay="0"/>
+                                  </p:stCondLst>
+                                  <p:childTnLst>
+                                    <p:anim calcmode="lin" valueType="num">
+                                      <p:cBhvr additive="base">
+                                        <p:cTn id="14" dur="500"/>
+                                        <p:tgtEl>
+                                          <p:spTgt spid="3">
+                                            <p:txEl>
+                                              <p:pRg st="1" end="1"/>
+                                            </p:txEl>
+                                          </p:spTgt>
+                                        </p:tgtEl>
+                                        <p:attrNameLst>
+                                          <p:attrName>ppt_x</p:attrName>
+                                        </p:attrNameLst>
+                                      </p:cBhvr>
+                                      <p:tavLst>
+                                        <p:tav tm="0">
+                                          <p:val>
+                                            <p:strVal val="ppt_x"/>
+                                          </p:val>
+                                        </p:tav>
+                                        <p:tav tm="100000">
+                                          <p:val>
+                                            <p:strVal val="ppt_x"/>
+                                          </p:val>
+                                        </p:tav>
+                                      </p:tavLst>
+                                    </p:anim>
+                                    <p:anim calcmode="lin" valueType="num">
+                                      <p:cBhvr additive="base">
+                                        <p:cTn id="15" dur="500"/>
+                                        <p:tgtEl>
+                                          <p:spTgt spid="3">
+                                            <p:txEl>
+                                              <p:pRg st="1" end="1"/>
+                                            </p:txEl>
+                                          </p:spTgt>
+                                        </p:tgtEl>
+                                        <p:attrNameLst>
+                                          <p:attrName>ppt_y</p:attrName>
+                                        </p:attrNameLst>
+                                      </p:cBhvr>
+                                      <p:tavLst>
+                                        <p:tav tm="0">
+                                          <p:val>
+                                            <p:strVal val="ppt_y"/>
+                                          </p:val>
+                                        </p:tav>
+                                        <p:tav tm="100000">
+                                          <p:val>
+                                            <p:strVal val="1+ppt_h/2"/>
+                                          </p:val>
+                                        </p:tav>
+                                      </p:tavLst>
+                                    </p:anim>
+                                    <p:set>
+                                      <p:cBhvr>
+                                        <p:cTn id="16" dur="1" fill="hold">
+                                          <p:stCondLst>
+                                            <p:cond delay="499"/>
+                                          </p:stCondLst>
+                                        </p:cTn>
+                                        <p:tgtEl>
+                                          <p:spTgt spid="3">
+                                            <p:txEl>
+                                              <p:pRg st="1" end="1"/>
+                                            </p:txEl>
+                                          </p:spTgt>
+                                        </p:tgtEl>
+                                        <p:attrNameLst>
+                                          <p:attrName>style.visibility</p:attrName>
+                                        </p:attrNameLst>
+                                      </p:cBhvr>
+                                      <p:to>
+                                        <p:strVal val="hidden"/>
+                                      </p:to>
+                                    </p:set>
+                                  </p:childTnLst>
+                                </p:cTn>
+                              </p:par>
+                              <p:par>
+                                <p:cTn id="17" presetID="2" presetClass="exit" presetSubtype="4" fill="hold" grpId="0" nodeType="withEffect">
+                                  <p:stCondLst>
+                                    <p:cond delay="0"/>
+                                  </p:stCondLst>
+                                  <p:childTnLst>
+                                    <p:anim calcmode="lin" valueType="num">
+                                      <p:cBhvr additive="base">
+                                        <p:cTn id="18" dur="500"/>
+                                        <p:tgtEl>
+                                          <p:spTgt spid="3">
+                                            <p:txEl>
+                                              <p:pRg st="2" end="2"/>
+                                            </p:txEl>
+                                          </p:spTgt>
+                                        </p:tgtEl>
+                                        <p:attrNameLst>
+                                          <p:attrName>ppt_x</p:attrName>
+                                        </p:attrNameLst>
+                                      </p:cBhvr>
+                                      <p:tavLst>
+                                        <p:tav tm="0">
+                                          <p:val>
+                                            <p:strVal val="ppt_x"/>
+                                          </p:val>
+                                        </p:tav>
+                                        <p:tav tm="100000">
+                                          <p:val>
+                                            <p:strVal val="ppt_x"/>
+                                          </p:val>
+                                        </p:tav>
+                                      </p:tavLst>
+                                    </p:anim>
+                                    <p:anim calcmode="lin" valueType="num">
+                                      <p:cBhvr additive="base">
+                                        <p:cTn id="19" dur="500"/>
+                                        <p:tgtEl>
+                                          <p:spTgt spid="3">
+                                            <p:txEl>
+                                              <p:pRg st="2" end="2"/>
+                                            </p:txEl>
+                                          </p:spTgt>
+                                        </p:tgtEl>
+                                        <p:attrNameLst>
+                                          <p:attrName>ppt_y</p:attrName>
+                                        </p:attrNameLst>
+                                      </p:cBhvr>
+                                      <p:tavLst>
+                                        <p:tav tm="0">
+                                          <p:val>
+                                            <p:strVal val="ppt_y"/>
+                                          </p:val>
+                                        </p:tav>
+                                        <p:tav tm="100000">
+                                          <p:val>
+                                            <p:strVal val="1+ppt_h/2"/>
+                                          </p:val>
+                                        </p:tav>
+                                      </p:tavLst>
+                                    </p:anim>
+                                    <p:set>
+                                      <p:cBhvr>
+                                        <p:cTn id="20" dur="1" fill="hold">
+                                          <p:stCondLst>
+                                            <p:cond delay="499"/>
+                                          </p:stCondLst>
+                                        </p:cTn>
+                                        <p:tgtEl>
+                                          <p:spTgt spid="3">
+                                            <p:txEl>
+                                              <p:pRg st="2" end="2"/>
+                                            </p:txEl>
+                                          </p:spTgt>
+                                        </p:tgtEl>
+                                        <p:attrNameLst>
+                                          <p:attrName>style.visibility</p:attrName>
+                                        </p:attrNameLst>
+                                      </p:cBhvr>
+                                      <p:to>
+                                        <p:strVal val="hidden"/>
+                                      </p:to>
+                                    </p:set>
+                                  </p:childTnLst>
+                                </p:cTn>
+                              </p:par>
+                              <p:par>
+                                <p:cTn id="21" presetID="2" presetClass="exit" presetSubtype="4" fill="hold" grpId="0" nodeType="withEffect">
+                                  <p:stCondLst>
+                                    <p:cond delay="0"/>
+                                  </p:stCondLst>
+                                  <p:childTnLst>
+                                    <p:anim calcmode="lin" valueType="num">
+                                      <p:cBhvr additive="base">
+                                        <p:cTn id="22" dur="500"/>
+                                        <p:tgtEl>
+                                          <p:spTgt spid="3">
+                                            <p:txEl>
+                                              <p:pRg st="3" end="3"/>
+                                            </p:txEl>
+                                          </p:spTgt>
+                                        </p:tgtEl>
+                                        <p:attrNameLst>
+                                          <p:attrName>ppt_x</p:attrName>
+                                        </p:attrNameLst>
+                                      </p:cBhvr>
+                                      <p:tavLst>
+                                        <p:tav tm="0">
+                                          <p:val>
+                                            <p:strVal val="ppt_x"/>
+                                          </p:val>
+                                        </p:tav>
+                                        <p:tav tm="100000">
+                                          <p:val>
+                                            <p:strVal val="ppt_x"/>
+                                          </p:val>
+                                        </p:tav>
+                                      </p:tavLst>
+                                    </p:anim>
+                                    <p:anim calcmode="lin" valueType="num">
+                                      <p:cBhvr additive="base">
+                                        <p:cTn id="23" dur="500"/>
+                                        <p:tgtEl>
+                                          <p:spTgt spid="3">
+                                            <p:txEl>
+                                              <p:pRg st="3" end="3"/>
+                                            </p:txEl>
+                                          </p:spTgt>
+                                        </p:tgtEl>
+                                        <p:attrNameLst>
+                                          <p:attrName>ppt_y</p:attrName>
+                                        </p:attrNameLst>
+                                      </p:cBhvr>
+                                      <p:tavLst>
+                                        <p:tav tm="0">
+                                          <p:val>
+                                            <p:strVal val="ppt_y"/>
+                                          </p:val>
+                                        </p:tav>
+                                        <p:tav tm="100000">
+                                          <p:val>
+                                            <p:strVal val="1+ppt_h/2"/>
+                                          </p:val>
+                                        </p:tav>
+                                      </p:tavLst>
+                                    </p:anim>
+                                    <p:set>
+                                      <p:cBhvr>
+                                        <p:cTn id="24" dur="1" fill="hold">
+                                          <p:stCondLst>
+                                            <p:cond delay="499"/>
+                                          </p:stCondLst>
+                                        </p:cTn>
+                                        <p:tgtEl>
+                                          <p:spTgt spid="3">
+                                            <p:txEl>
+                                              <p:pRg st="3" end="3"/>
+                                            </p:txEl>
+                                          </p:spTgt>
+                                        </p:tgtEl>
+                                        <p:attrNameLst>
+                                          <p:attrName>style.visibility</p:attrName>
+                                        </p:attrNameLst>
+                                      </p:cBhvr>
+                                      <p:to>
+                                        <p:strVal val="hidden"/>
+                                      </p:to>
+                                    </p:set>
+                                  </p:childTnLst>
+                                </p:cTn>
+                              </p:par>
+                              <p:par>
+                                <p:cTn id="25" presetID="2" presetClass="exit" presetSubtype="4" fill="hold" grpId="0" nodeType="withEffect">
+                                  <p:stCondLst>
+                                    <p:cond delay="0"/>
+                                  </p:stCondLst>
+                                  <p:childTnLst>
+                                    <p:anim calcmode="lin" valueType="num">
+                                      <p:cBhvr additive="base">
+                                        <p:cTn id="26" dur="500"/>
+                                        <p:tgtEl>
+                                          <p:spTgt spid="3">
+                                            <p:txEl>
+                                              <p:pRg st="4" end="4"/>
+                                            </p:txEl>
+                                          </p:spTgt>
+                                        </p:tgtEl>
+                                        <p:attrNameLst>
+                                          <p:attrName>ppt_x</p:attrName>
+                                        </p:attrNameLst>
+                                      </p:cBhvr>
+                                      <p:tavLst>
+                                        <p:tav tm="0">
+                                          <p:val>
+                                            <p:strVal val="ppt_x"/>
+                                          </p:val>
+                                        </p:tav>
+                                        <p:tav tm="100000">
+                                          <p:val>
+                                            <p:strVal val="ppt_x"/>
+                                          </p:val>
+                                        </p:tav>
+                                      </p:tavLst>
+                                    </p:anim>
+                                    <p:anim calcmode="lin" valueType="num">
+                                      <p:cBhvr additive="base">
+                                        <p:cTn id="27" dur="500"/>
+                                        <p:tgtEl>
+                                          <p:spTgt spid="3">
+                                            <p:txEl>
+                                              <p:pRg st="4" end="4"/>
+                                            </p:txEl>
+                                          </p:spTgt>
+                                        </p:tgtEl>
+                                        <p:attrNameLst>
+                                          <p:attrName>ppt_y</p:attrName>
+                                        </p:attrNameLst>
+                                      </p:cBhvr>
+                                      <p:tavLst>
+                                        <p:tav tm="0">
+                                          <p:val>
+                                            <p:strVal val="ppt_y"/>
+                                          </p:val>
+                                        </p:tav>
+                                        <p:tav tm="100000">
+                                          <p:val>
+                                            <p:strVal val="1+ppt_h/2"/>
+                                          </p:val>
+                                        </p:tav>
+                                      </p:tavLst>
+                                    </p:anim>
+                                    <p:set>
+                                      <p:cBhvr>
+                                        <p:cTn id="28" dur="1" fill="hold">
+                                          <p:stCondLst>
+                                            <p:cond delay="499"/>
+                                          </p:stCondLst>
+                                        </p:cTn>
+                                        <p:tgtEl>
+                                          <p:spTgt spid="3">
+                                            <p:txEl>
+                                              <p:pRg st="4" end="4"/>
+                                            </p:txEl>
+                                          </p:spTgt>
+                                        </p:tgtEl>
+                                        <p:attrNameLst>
+                                          <p:attrName>style.visibility</p:attrName>
+                                        </p:attrNameLst>
+                                      </p:cBhvr>
+                                      <p:to>
+                                        <p:strVal val="hidden"/>
+                                      </p:to>
+                                    </p:set>
+                                  </p:childTnLst>
+                                </p:cTn>
+                              </p:par>
+                              <p:par>
+                                <p:cTn id="29" presetID="2" presetClass="exit" presetSubtype="4" fill="hold" grpId="0" nodeType="withEffect">
+                                  <p:stCondLst>
+                                    <p:cond delay="0"/>
+                                  </p:stCondLst>
+                                  <p:childTnLst>
+                                    <p:anim calcmode="lin" valueType="num">
+                                      <p:cBhvr additive="base">
+                                        <p:cTn id="30" dur="500"/>
+                                        <p:tgtEl>
+                                          <p:spTgt spid="3">
+                                            <p:txEl>
+                                              <p:pRg st="5" end="5"/>
+                                            </p:txEl>
+                                          </p:spTgt>
+                                        </p:tgtEl>
+                                        <p:attrNameLst>
+                                          <p:attrName>ppt_x</p:attrName>
+                                        </p:attrNameLst>
+                                      </p:cBhvr>
+                                      <p:tavLst>
+                                        <p:tav tm="0">
+                                          <p:val>
+                                            <p:strVal val="ppt_x"/>
+                                          </p:val>
+                                        </p:tav>
+                                        <p:tav tm="100000">
+                                          <p:val>
+                                            <p:strVal val="ppt_x"/>
+                                          </p:val>
+                                        </p:tav>
+                                      </p:tavLst>
+                                    </p:anim>
+                                    <p:anim calcmode="lin" valueType="num">
+                                      <p:cBhvr additive="base">
+                                        <p:cTn id="31" dur="500"/>
+                                        <p:tgtEl>
+                                          <p:spTgt spid="3">
+                                            <p:txEl>
+                                              <p:pRg st="5" end="5"/>
+                                            </p:txEl>
+                                          </p:spTgt>
+                                        </p:tgtEl>
+                                        <p:attrNameLst>
+                                          <p:attrName>ppt_y</p:attrName>
+                                        </p:attrNameLst>
+                                      </p:cBhvr>
+                                      <p:tavLst>
+                                        <p:tav tm="0">
+                                          <p:val>
+                                            <p:strVal val="ppt_y"/>
+                                          </p:val>
+                                        </p:tav>
+                                        <p:tav tm="100000">
+                                          <p:val>
+                                            <p:strVal val="1+ppt_h/2"/>
+                                          </p:val>
+                                        </p:tav>
+                                      </p:tavLst>
+                                    </p:anim>
+                                    <p:set>
+                                      <p:cBhvr>
+                                        <p:cTn id="32" dur="1" fill="hold">
+                                          <p:stCondLst>
+                                            <p:cond delay="499"/>
+                                          </p:stCondLst>
+                                        </p:cTn>
+                                        <p:tgtEl>
+                                          <p:spTgt spid="3">
+                                            <p:txEl>
+                                              <p:pRg st="5" end="5"/>
+                                            </p:txEl>
+                                          </p:spTgt>
+                                        </p:tgtEl>
+                                        <p:attrNameLst>
+                                          <p:attrName>style.visibility</p:attrName>
+                                        </p:attrNameLst>
+                                      </p:cBhvr>
+                                      <p:to>
+                                        <p:strVal val="hidden"/>
+                                      </p:to>
+                                    </p:set>
+                                  </p:childTnLst>
+                                </p:cTn>
+                              </p:par>
+                              <p:par>
+                                <p:cTn id="33" presetID="31" presetClass="entr" presetSubtype="0" fill="hold" nodeType="withEffect">
+                                  <p:stCondLst>
+                                    <p:cond delay="0"/>
+                                  </p:stCondLst>
+                                  <p:iterate type="lt">
+                                    <p:tmPct val="5000"/>
+                                  </p:iterate>
+                                  <p:childTnLst>
+                                    <p:set>
+                                      <p:cBhvr>
+                                        <p:cTn id="34" dur="1" fill="hold">
+                                          <p:stCondLst>
+                                            <p:cond delay="0"/>
+                                          </p:stCondLst>
+                                        </p:cTn>
+                                        <p:tgtEl>
+                                          <p:spTgt spid="5"/>
+                                        </p:tgtEl>
+                                        <p:attrNameLst>
+                                          <p:attrName>style.visibility</p:attrName>
+                                        </p:attrNameLst>
+                                      </p:cBhvr>
+                                      <p:to>
+                                        <p:strVal val="visible"/>
+                                      </p:to>
+                                    </p:set>
+                                    <p:anim calcmode="lin" valueType="num">
+                                      <p:cBhvr>
+                                        <p:cTn id="35" dur="500" fill="hold"/>
+                                        <p:tgtEl>
+                                          <p:spTgt spid="5"/>
+                                        </p:tgtEl>
+                                        <p:attrNameLst>
+                                          <p:attrName>ppt_w</p:attrName>
+                                        </p:attrNameLst>
+                                      </p:cBhvr>
+                                      <p:tavLst>
+                                        <p:tav tm="0">
+                                          <p:val>
+                                            <p:fltVal val="0"/>
+                                          </p:val>
+                                        </p:tav>
+                                        <p:tav tm="100000">
+                                          <p:val>
+                                            <p:strVal val="#ppt_w"/>
+                                          </p:val>
+                                        </p:tav>
+                                      </p:tavLst>
+                                    </p:anim>
+                                    <p:anim calcmode="lin" valueType="num">
+                                      <p:cBhvr>
+                                        <p:cTn id="36" dur="500" fill="hold"/>
+                                        <p:tgtEl>
+                                          <p:spTgt spid="5"/>
+                                        </p:tgtEl>
+                                        <p:attrNameLst>
+                                          <p:attrName>ppt_h</p:attrName>
+                                        </p:attrNameLst>
+                                      </p:cBhvr>
+                                      <p:tavLst>
+                                        <p:tav tm="0">
+                                          <p:val>
+                                            <p:fltVal val="0"/>
+                                          </p:val>
+                                        </p:tav>
+                                        <p:tav tm="100000">
+                                          <p:val>
+                                            <p:strVal val="#ppt_h"/>
+                                          </p:val>
+                                        </p:tav>
+                                      </p:tavLst>
+                                    </p:anim>
+                                    <p:anim calcmode="lin" valueType="num">
+                                      <p:cBhvr>
+                                        <p:cTn id="37" dur="500" fill="hold"/>
+                                        <p:tgtEl>
+                                          <p:spTgt spid="5"/>
+                                        </p:tgtEl>
+                                        <p:attrNameLst>
+                                          <p:attrName>style.rotation</p:attrName>
+                                        </p:attrNameLst>
+                                      </p:cBhvr>
+                                      <p:tavLst>
+                                        <p:tav tm="0">
+                                          <p:val>
+                                            <p:fltVal val="90"/>
+                                          </p:val>
+                                        </p:tav>
+                                        <p:tav tm="100000">
+                                          <p:val>
+                                            <p:fltVal val="0"/>
+                                          </p:val>
+                                        </p:tav>
+                                      </p:tavLst>
+                                    </p:anim>
+                                    <p:animEffect transition="in" filter="fade">
+                                      <p:cBhvr>
+                                        <p:cTn id="38" dur="500"/>
+                                        <p:tgtEl>
+                                          <p:spTgt spid="5"/>
+                                        </p:tgtEl>
+                                      </p:cBhvr>
+                                    </p:animEffect>
+                                  </p:childTnLst>
+                                </p:cTn>
+                              </p:par>
+                            </p:childTnLst>
+                          </p:cTn>
+                        </p:par>
+                      </p:childTnLst>
+                    </p:cTn>
+                  </p:par>
+                </p:childTnLst>
+              </p:cTn>
+              <p:prevCondLst>
+                <p:cond evt="onPrev" delay="0">
+                  <p:tgtEl>
+                    <p:sldTgt/>
+                  </p:tgtEl>
+                </p:cond>
+              </p:prevCondLst>
+              <p:nextCondLst>
+                <p:cond evt="onNext" delay="0">
+                  <p:tgtEl>
+                    <p:sldTgt/>
+                  </p:tgtEl>
+                </p:cond>
+              </p:nextCondLst>
+            </p:seq>
+          </p:childTnLst>
+        </p:cTn>
+      </p:par>
+    </p:tnLst>
+    <p:bldLst>
+      <p:bldP spid="2" grpId="0"/>
+      <p:bldP spid="3" grpId="0" build="p"/>
+    </p:bldLst>
+  </p:timing>
+</p:sld>
+</file>
+
+<file path=ppt/slides/slide13.xml><?xml version="1.0" encoding="utf-8"?>
+<p:sld xmlns:a="http://schemas.openxmlformats.org/drawingml/2006/main" xmlns:r="http://schemas.openxmlformats.org/officeDocument/2006/relationships" xmlns:p="http://schemas.openxmlformats.org/presentationml/2006/main">
+  <p:cSld>
+    <p:spTree>
+      <p:nvGrpSpPr>
+        <p:cNvPr id="1" name=""/>
+        <p:cNvGrpSpPr/>
+        <p:nvPr/>
+      </p:nvGrpSpPr>
+      <p:grpSpPr>
+        <a:xfrm>
+          <a:off x="0" y="0"/>
+          <a:ext cx="0" cy="0"/>
+          <a:chOff x="0" y="0"/>
+          <a:chExt cx="0" cy="0"/>
+        </a:xfrm>
+      </p:grpSpPr>
+      <p:sp>
+        <p:nvSpPr>
+          <p:cNvPr id="2" name="1 Título"/>
+          <p:cNvSpPr>
+            <a:spLocks noGrp="1"/>
+          </p:cNvSpPr>
+          <p:nvPr>
+            <p:ph type="title"/>
+          </p:nvPr>
+        </p:nvSpPr>
+        <p:spPr/>
+        <p:txBody>
+          <a:bodyPr/>
+          <a:lstStyle/>
+          <a:p>
+            <a:r>
+              <a:rPr lang="en-US" dirty="0" smtClean="0"/>
+              <a:t>Information Sources</a:t>
+            </a:r>
+            <a:endParaRPr lang="en-US" dirty="0"/>
+          </a:p>
+        </p:txBody>
+      </p:sp>
+      <p:sp>
+        <p:nvSpPr>
+          <p:cNvPr id="3" name="2 Marcador de contenido"/>
+          <p:cNvSpPr>
+            <a:spLocks noGrp="1"/>
+          </p:cNvSpPr>
+          <p:nvPr>
+            <p:ph idx="1"/>
+          </p:nvPr>
+        </p:nvSpPr>
+        <p:spPr/>
+        <p:txBody>
+          <a:bodyPr>
+            <a:normAutofit/>
+          </a:bodyPr>
+          <a:lstStyle/>
+          <a:p>
+            <a:r>
+              <a:rPr lang="en-US" sz="2000" dirty="0" err="1" smtClean="0"/>
+              <a:t>Escrich</a:t>
+            </a:r>
+            <a:r>
+              <a:rPr lang="en-US" sz="2000" dirty="0" smtClean="0"/>
+              <a:t>, P. (2012, January). Quick deployment network using MANET. Retrieved March 4, 2013</a:t>
+            </a:r>
+          </a:p>
+          <a:p>
+            <a:r>
+              <a:rPr lang="es-ES" sz="2000" dirty="0" err="1" smtClean="0"/>
+              <a:t>Escrich</a:t>
+            </a:r>
+            <a:r>
+              <a:rPr lang="es-ES" sz="2000" dirty="0" smtClean="0"/>
+              <a:t>, P. (2012, </a:t>
+            </a:r>
+            <a:r>
+              <a:rPr lang="es-ES" sz="2000" dirty="0" err="1" smtClean="0"/>
+              <a:t>November</a:t>
+            </a:r>
+            <a:r>
+              <a:rPr lang="es-ES" sz="2000" dirty="0" smtClean="0"/>
+              <a:t> 17). </a:t>
+            </a:r>
+            <a:r>
+              <a:rPr lang="es-ES" sz="2000" dirty="0" err="1" smtClean="0"/>
+              <a:t>Xarxes</a:t>
+            </a:r>
+            <a:r>
+              <a:rPr lang="es-ES" sz="2000" dirty="0" smtClean="0"/>
+              <a:t> </a:t>
+            </a:r>
+            <a:r>
+              <a:rPr lang="es-ES" sz="2000" dirty="0" err="1" smtClean="0"/>
+              <a:t>Mesh</a:t>
+            </a:r>
+            <a:r>
+              <a:rPr lang="es-ES" sz="2000" dirty="0" smtClean="0"/>
+              <a:t>. </a:t>
+            </a:r>
+            <a:r>
+              <a:rPr lang="es-ES" sz="2000" dirty="0" err="1" smtClean="0"/>
+              <a:t>Curs</a:t>
+            </a:r>
+            <a:r>
+              <a:rPr lang="es-ES" sz="2000" dirty="0" smtClean="0"/>
+              <a:t> Guifi.net 2012. </a:t>
+            </a:r>
+            <a:r>
+              <a:rPr lang="es-ES" sz="2000" dirty="0" err="1" smtClean="0"/>
+              <a:t>Retrieved</a:t>
+            </a:r>
+            <a:r>
+              <a:rPr lang="es-ES" sz="2000" dirty="0" smtClean="0"/>
+              <a:t> </a:t>
+            </a:r>
+            <a:r>
+              <a:rPr lang="es-ES" sz="2000" dirty="0" err="1" smtClean="0"/>
+              <a:t>March</a:t>
+            </a:r>
+            <a:r>
+              <a:rPr lang="es-ES" sz="2000" dirty="0" smtClean="0"/>
+              <a:t> 5, 2013</a:t>
+            </a:r>
+          </a:p>
+          <a:p>
+            <a:r>
+              <a:rPr lang="en-US" sz="2000" dirty="0" smtClean="0"/>
+              <a:t>Mobile ad hoc network. (</a:t>
+            </a:r>
+            <a:r>
+              <a:rPr lang="en-US" sz="2000" dirty="0" err="1" smtClean="0"/>
+              <a:t>n.d</a:t>
+            </a:r>
+            <a:r>
+              <a:rPr lang="en-US" sz="2000" dirty="0" smtClean="0"/>
+              <a:t>.). In </a:t>
+            </a:r>
+            <a:r>
+              <a:rPr lang="en-US" sz="2000" i="1" dirty="0" smtClean="0"/>
+              <a:t>Wikipedia</a:t>
+            </a:r>
+            <a:r>
+              <a:rPr lang="en-US" sz="2000" dirty="0" smtClean="0"/>
+              <a:t>. Retrieved March 4, 2013, from http://en.wikipedia.org/wiki/Mobile_ad_hoc_network</a:t>
+            </a:r>
+          </a:p>
+          <a:p>
+            <a:r>
+              <a:rPr lang="en-US" sz="2000" dirty="0" smtClean="0"/>
+              <a:t>Starting a Community. (2013, January 11). In </a:t>
+            </a:r>
+            <a:r>
+              <a:rPr lang="en-US" sz="2000" i="1" dirty="0" smtClean="0"/>
+              <a:t>Quick Mesh Project</a:t>
+            </a:r>
+            <a:r>
+              <a:rPr lang="en-US" sz="2000" dirty="0" smtClean="0"/>
+              <a:t>. Retrieved March 5, 2013, from http://qmp.cat/projects/qmp/wiki/Starting </a:t>
+            </a:r>
+          </a:p>
+          <a:p>
+            <a:r>
+              <a:rPr lang="en-US" sz="2000" dirty="0" smtClean="0"/>
+              <a:t>Roaming-Community/Collaborative. (2012, June 26). In </a:t>
+            </a:r>
+            <a:r>
+              <a:rPr lang="en-US" sz="2000" i="1" dirty="0" smtClean="0"/>
+              <a:t>Quick Mesh Project</a:t>
+            </a:r>
+            <a:r>
+              <a:rPr lang="en-US" sz="2000" dirty="0" smtClean="0"/>
+              <a:t>. Retrieved March 5, 2013, from http://qmp.cat/projects/qmp/wiki/Roaming-Collaborative </a:t>
+            </a:r>
+            <a:endParaRPr lang="en-US" sz="2000" dirty="0" smtClean="0"/>
+          </a:p>
+          <a:p>
+            <a:r>
+              <a:rPr lang="en-US" sz="2000" dirty="0" smtClean="0"/>
+              <a:t>QMP users mailing list</a:t>
+            </a:r>
+            <a:br>
+              <a:rPr lang="en-US" sz="2000" dirty="0" smtClean="0"/>
+            </a:br>
+            <a:endParaRPr lang="es-ES" sz="2000" dirty="0"/>
+          </a:p>
+        </p:txBody>
+      </p:sp>
+      <p:sp>
+        <p:nvSpPr>
+          <p:cNvPr id="4" name="3 Marcador de número de diapositiva"/>
+          <p:cNvSpPr>
+            <a:spLocks noGrp="1"/>
+          </p:cNvSpPr>
+          <p:nvPr>
+            <p:ph type="sldNum" sz="quarter" idx="12"/>
+          </p:nvPr>
+        </p:nvSpPr>
+        <p:spPr/>
+        <p:txBody>
+          <a:bodyPr/>
+          <a:lstStyle/>
+          <a:p>
+            <a:fld id="{DA3FA644-4273-4B12-888A-E74B32B8A478}" type="slidenum">
+              <a:rPr lang="ru-RU" smtClean="0"/>
+              <a:pPr/>
+              <a:t>13</a:t>
+            </a:fld>
+            <a:endParaRPr lang="ru-RU"/>
+          </a:p>
+        </p:txBody>
+      </p:sp>
+    </p:spTree>
+  </p:cSld>
+  <p:clrMapOvr>
+    <a:masterClrMapping/>
+  </p:clrMapOvr>
+  <p:timing>
+    <p:tnLst>
+      <p:par>
+        <p:cTn id="1" dur="indefinite" restart="never" nodeType="tmRoot"/>
+      </p:par>
+    </p:tnLst>
+  </p:timing>
+</p:sld>
+</file>
+
+<file path=ppt/slides/slide14.xml><?xml version="1.0" encoding="utf-8"?>
+<p:sld xmlns:a="http://schemas.openxmlformats.org/drawingml/2006/main" xmlns:r="http://schemas.openxmlformats.org/officeDocument/2006/relationships" xmlns:p="http://schemas.openxmlformats.org/presentationml/2006/main">
+  <p:cSld>
+    <p:spTree>
+      <p:nvGrpSpPr>
+        <p:cNvPr id="1" name=""/>
+        <p:cNvGrpSpPr/>
+        <p:nvPr/>
+      </p:nvGrpSpPr>
+      <p:grpSpPr>
+        <a:xfrm>
+          <a:off x="0" y="0"/>
+          <a:ext cx="0" cy="0"/>
+          <a:chOff x="0" y="0"/>
+          <a:chExt cx="0" cy="0"/>
+        </a:xfrm>
+      </p:grpSpPr>
+      <p:sp>
+        <p:nvSpPr>
           <p:cNvPr id="2" name="Title 1"/>
           <p:cNvSpPr>
             <a:spLocks noGrp="1"/>
@@ -5104,7 +6685,7 @@
             <a:fld id="{DA3FA644-4273-4B12-888A-E74B32B8A478}" type="slidenum">
               <a:rPr lang="ru-RU" smtClean="0"/>
               <a:pPr/>
-              <a:t>12</a:t>
+              <a:t>14</a:t>
             </a:fld>
             <a:endParaRPr lang="ru-RU"/>
           </a:p>
@@ -5113,7 +6694,7 @@
     </p:spTree>
     <p:extLst>
       <p:ext uri="{BB962C8B-B14F-4D97-AF65-F5344CB8AC3E}">
-        <p14:creationId xmlns="" xmlns:p14="http://schemas.microsoft.com/office/powerpoint/2010/main" val="1608000149"/>
+        <p14:creationId xmlns:p14="http://schemas.microsoft.com/office/powerpoint/2010/main" xmlns="" val="1608000149"/>
       </p:ext>
     </p:extLst>
   </p:cSld>
@@ -5230,7 +6811,13 @@
               <a:rPr lang="en-US" dirty="0" smtClean="0"/>
               <a:t>Addressing</a:t>
             </a:r>
-            <a:endParaRPr lang="en-US" dirty="0" smtClean="0"/>
+          </a:p>
+          <a:p>
+            <a:pPr lvl="1"/>
+            <a:r>
+              <a:rPr lang="en-US" dirty="0" smtClean="0"/>
+              <a:t>Modes</a:t>
+            </a:r>
           </a:p>
           <a:p>
             <a:pPr lvl="1"/>
@@ -5290,7 +6877,7 @@
     </p:spTree>
     <p:extLst>
       <p:ext uri="{BB962C8B-B14F-4D97-AF65-F5344CB8AC3E}">
-        <p14:creationId xmlns="" xmlns:p14="http://schemas.microsoft.com/office/powerpoint/2010/main" val="2734673611"/>
+        <p14:creationId xmlns:p14="http://schemas.microsoft.com/office/powerpoint/2010/main" xmlns="" val="2734673611"/>
       </p:ext>
     </p:extLst>
   </p:cSld>
@@ -5410,7 +6997,7 @@
           <a:blip r:embed="rId2" cstate="print">
             <a:extLst>
               <a:ext uri="{28A0092B-C50C-407E-A947-70E740481C1C}">
-                <a14:useLocalDpi xmlns="" xmlns:a14="http://schemas.microsoft.com/office/drawing/2010/main" val="0"/>
+                <a14:useLocalDpi xmlns:a14="http://schemas.microsoft.com/office/drawing/2010/main" xmlns="" val="0"/>
               </a:ext>
             </a:extLst>
           </a:blip>
@@ -5430,7 +7017,7 @@
           <a:noFill/>
           <a:extLst>
             <a:ext uri="{909E8E84-426E-40DD-AFC4-6F175D3DCCD1}">
-              <a14:hiddenFill xmlns="" xmlns:a14="http://schemas.microsoft.com/office/drawing/2010/main">
+              <a14:hiddenFill xmlns:a14="http://schemas.microsoft.com/office/drawing/2010/main" xmlns="">
                 <a:solidFill>
                   <a:srgbClr val="FFFFFF"/>
                 </a:solidFill>
@@ -5442,7 +7029,7 @@
     </p:spTree>
     <p:extLst>
       <p:ext uri="{BB962C8B-B14F-4D97-AF65-F5344CB8AC3E}">
-        <p14:creationId xmlns="" xmlns:p14="http://schemas.microsoft.com/office/powerpoint/2010/main" val="1347604916"/>
+        <p14:creationId xmlns:p14="http://schemas.microsoft.com/office/powerpoint/2010/main" xmlns="" val="1347604916"/>
       </p:ext>
     </p:extLst>
   </p:cSld>
@@ -5644,7 +7231,7 @@
     </p:spTree>
     <p:extLst>
       <p:ext uri="{BB962C8B-B14F-4D97-AF65-F5344CB8AC3E}">
-        <p14:creationId xmlns="" xmlns:p14="http://schemas.microsoft.com/office/powerpoint/2010/main" val="4024328202"/>
+        <p14:creationId xmlns:p14="http://schemas.microsoft.com/office/powerpoint/2010/main" xmlns="" val="4024328202"/>
       </p:ext>
     </p:extLst>
   </p:cSld>
@@ -6004,7 +7591,7 @@
           <a:blip r:embed="rId2" cstate="print">
             <a:extLst>
               <a:ext uri="{28A0092B-C50C-407E-A947-70E740481C1C}">
-                <a14:useLocalDpi xmlns="" xmlns:a14="http://schemas.microsoft.com/office/drawing/2010/main" val="0"/>
+                <a14:useLocalDpi xmlns:a14="http://schemas.microsoft.com/office/drawing/2010/main" xmlns="" val="0"/>
               </a:ext>
             </a:extLst>
           </a:blip>
@@ -6024,7 +7611,7 @@
           <a:noFill/>
           <a:extLst>
             <a:ext uri="{909E8E84-426E-40DD-AFC4-6F175D3DCCD1}">
-              <a14:hiddenFill xmlns="" xmlns:a14="http://schemas.microsoft.com/office/drawing/2010/main">
+              <a14:hiddenFill xmlns:a14="http://schemas.microsoft.com/office/drawing/2010/main" xmlns="">
                 <a:solidFill>
                   <a:srgbClr val="FFFFFF"/>
                 </a:solidFill>
@@ -6137,22 +7724,14 @@
             </a:pPr>
             <a:r>
               <a:rPr lang="en-US" b="1" dirty="0" smtClean="0"/>
-              <a:t>Quick </a:t>
-            </a:r>
-            <a:r>
-              <a:rPr lang="en-US" b="1" dirty="0" smtClean="0"/>
-              <a:t>Deployments</a:t>
+              <a:t>Quick Deployments</a:t>
             </a:r>
             <a:endParaRPr lang="en-US" dirty="0" smtClean="0"/>
           </a:p>
           <a:p>
             <a:r>
               <a:rPr lang="en-US" dirty="0" smtClean="0"/>
-              <a:t>One </a:t>
-            </a:r>
-            <a:r>
-              <a:rPr lang="en-US" dirty="0" smtClean="0"/>
-              <a:t>of the scenarios QMP has been developed for is: Quick deployments.</a:t>
+              <a:t>One of the scenarios QMP has been developed for is: Quick deployments.</a:t>
             </a:r>
           </a:p>
           <a:p>
@@ -6246,7 +7825,7 @@
     </p:spTree>
     <p:extLst>
       <p:ext uri="{BB962C8B-B14F-4D97-AF65-F5344CB8AC3E}">
-        <p14:creationId xmlns:p14="http://schemas.microsoft.com/office/powerpoint/2010/main" xmlns="" val="4024328202"/>
+        <p14:creationId xmlns="" xmlns:p14="http://schemas.microsoft.com/office/powerpoint/2010/main" val="4024328202"/>
       </p:ext>
     </p:extLst>
   </p:cSld>
@@ -6280,6 +7859,38 @@
           <a:chExt cx="0" cy="0"/>
         </a:xfrm>
       </p:grpSpPr>
+      <p:pic>
+        <p:nvPicPr>
+          <p:cNvPr id="1026" name="Picture 2"/>
+          <p:cNvPicPr>
+            <a:picLocks noChangeAspect="1" noChangeArrowheads="1"/>
+          </p:cNvPicPr>
+          <p:nvPr/>
+        </p:nvPicPr>
+        <p:blipFill>
+          <a:blip r:embed="rId2" cstate="print"/>
+          <a:srcRect/>
+          <a:stretch>
+            <a:fillRect/>
+          </a:stretch>
+        </p:blipFill>
+        <p:spPr bwMode="auto">
+          <a:xfrm>
+            <a:off x="467544" y="1700808"/>
+            <a:ext cx="7628839" cy="4464496"/>
+          </a:xfrm>
+          <a:prstGeom prst="rect">
+            <a:avLst/>
+          </a:prstGeom>
+          <a:noFill/>
+          <a:ln w="9525">
+            <a:noFill/>
+            <a:miter lim="800000"/>
+            <a:headEnd/>
+            <a:tailEnd/>
+          </a:ln>
+        </p:spPr>
+      </p:pic>
       <p:sp>
         <p:nvSpPr>
           <p:cNvPr id="2" name="1 Título"/>
@@ -6337,24 +7948,24 @@
             </a:r>
           </a:p>
           <a:p>
-            <a:pPr lvl="1"/>
+            <a:pPr lvl="1" algn="just"/>
             <a:r>
               <a:rPr lang="en-US" dirty="0" smtClean="0"/>
-              <a:t>IPv6 ULA: IPv6 private range to be used internally in the mesh</a:t>
-            </a:r>
-          </a:p>
-          <a:p>
-            <a:pPr lvl="1"/>
+              <a:t>IPv6 ULA: IPv6 private range to be used internally in the mesh. These IPs are used for the communication among the nodes in the mesh network, and so they are not neither valid nor routable outside.</a:t>
+            </a:r>
+          </a:p>
+          <a:p>
+            <a:pPr lvl="1" algn="just"/>
             <a:r>
               <a:rPr lang="en-US" dirty="0" smtClean="0"/>
-              <a:t>IPv6 RIPE: IPv6 public IPs range (6to6 tunneling)</a:t>
-            </a:r>
-          </a:p>
-          <a:p>
-            <a:pPr lvl="1"/>
+              <a:t>IPv6 RIPE: IPv6 public IPs range (6to6 tunneling). These are globally valid and routable.</a:t>
+            </a:r>
+          </a:p>
+          <a:p>
+            <a:pPr lvl="1" algn="just"/>
             <a:r>
               <a:rPr lang="en-US" dirty="0" smtClean="0"/>
-              <a:t>IPv4: IPv4 private range to connect with the final user (4to6 tunneling)</a:t>
+              <a:t>IPv4: IPv4 private range to connect with the final user (4to6 tunneling). They are assigned to the final users attached to a node in the mesh, when they transmit any packet that has to travel throughout the mesh it is encapsulated in an IPv6 packet (tunneling).</a:t>
             </a:r>
           </a:p>
           <a:p>
@@ -6394,9 +8005,585 @@
   <p:timing>
     <p:tnLst>
       <p:par>
-        <p:cTn id="1" dur="indefinite" restart="never" nodeType="tmRoot"/>
+        <p:cTn id="1" dur="indefinite" restart="never" nodeType="tmRoot">
+          <p:childTnLst>
+            <p:seq concurrent="1" nextAc="seek">
+              <p:cTn id="2" dur="indefinite" nodeType="mainSeq">
+                <p:childTnLst>
+                  <p:par>
+                    <p:cTn id="3" fill="hold">
+                      <p:stCondLst>
+                        <p:cond delay="indefinite"/>
+                      </p:stCondLst>
+                      <p:childTnLst>
+                        <p:par>
+                          <p:cTn id="4" fill="hold">
+                            <p:stCondLst>
+                              <p:cond delay="0"/>
+                            </p:stCondLst>
+                            <p:childTnLst>
+                              <p:par>
+                                <p:cTn id="5" presetID="31" presetClass="entr" presetSubtype="0" fill="hold" nodeType="clickEffect">
+                                  <p:stCondLst>
+                                    <p:cond delay="0"/>
+                                  </p:stCondLst>
+                                  <p:iterate type="lt">
+                                    <p:tmPct val="5000"/>
+                                  </p:iterate>
+                                  <p:childTnLst>
+                                    <p:set>
+                                      <p:cBhvr>
+                                        <p:cTn id="6" dur="1" fill="hold">
+                                          <p:stCondLst>
+                                            <p:cond delay="0"/>
+                                          </p:stCondLst>
+                                        </p:cTn>
+                                        <p:tgtEl>
+                                          <p:spTgt spid="1026"/>
+                                        </p:tgtEl>
+                                        <p:attrNameLst>
+                                          <p:attrName>style.visibility</p:attrName>
+                                        </p:attrNameLst>
+                                      </p:cBhvr>
+                                      <p:to>
+                                        <p:strVal val="visible"/>
+                                      </p:to>
+                                    </p:set>
+                                    <p:anim calcmode="lin" valueType="num">
+                                      <p:cBhvr>
+                                        <p:cTn id="7" dur="1000" fill="hold"/>
+                                        <p:tgtEl>
+                                          <p:spTgt spid="1026"/>
+                                        </p:tgtEl>
+                                        <p:attrNameLst>
+                                          <p:attrName>ppt_w</p:attrName>
+                                        </p:attrNameLst>
+                                      </p:cBhvr>
+                                      <p:tavLst>
+                                        <p:tav tm="0">
+                                          <p:val>
+                                            <p:fltVal val="0"/>
+                                          </p:val>
+                                        </p:tav>
+                                        <p:tav tm="100000">
+                                          <p:val>
+                                            <p:strVal val="#ppt_w"/>
+                                          </p:val>
+                                        </p:tav>
+                                      </p:tavLst>
+                                    </p:anim>
+                                    <p:anim calcmode="lin" valueType="num">
+                                      <p:cBhvr>
+                                        <p:cTn id="8" dur="1000" fill="hold"/>
+                                        <p:tgtEl>
+                                          <p:spTgt spid="1026"/>
+                                        </p:tgtEl>
+                                        <p:attrNameLst>
+                                          <p:attrName>ppt_h</p:attrName>
+                                        </p:attrNameLst>
+                                      </p:cBhvr>
+                                      <p:tavLst>
+                                        <p:tav tm="0">
+                                          <p:val>
+                                            <p:fltVal val="0"/>
+                                          </p:val>
+                                        </p:tav>
+                                        <p:tav tm="100000">
+                                          <p:val>
+                                            <p:strVal val="#ppt_h"/>
+                                          </p:val>
+                                        </p:tav>
+                                      </p:tavLst>
+                                    </p:anim>
+                                    <p:anim calcmode="lin" valueType="num">
+                                      <p:cBhvr>
+                                        <p:cTn id="9" dur="1000" fill="hold"/>
+                                        <p:tgtEl>
+                                          <p:spTgt spid="1026"/>
+                                        </p:tgtEl>
+                                        <p:attrNameLst>
+                                          <p:attrName>style.rotation</p:attrName>
+                                        </p:attrNameLst>
+                                      </p:cBhvr>
+                                      <p:tavLst>
+                                        <p:tav tm="0">
+                                          <p:val>
+                                            <p:fltVal val="90"/>
+                                          </p:val>
+                                        </p:tav>
+                                        <p:tav tm="100000">
+                                          <p:val>
+                                            <p:fltVal val="0"/>
+                                          </p:val>
+                                        </p:tav>
+                                      </p:tavLst>
+                                    </p:anim>
+                                    <p:animEffect transition="in" filter="fade">
+                                      <p:cBhvr>
+                                        <p:cTn id="10" dur="1000"/>
+                                        <p:tgtEl>
+                                          <p:spTgt spid="1026"/>
+                                        </p:tgtEl>
+                                      </p:cBhvr>
+                                    </p:animEffect>
+                                  </p:childTnLst>
+                                </p:cTn>
+                              </p:par>
+                              <p:par>
+                                <p:cTn id="11" presetID="2" presetClass="exit" presetSubtype="4" fill="hold" grpId="0" nodeType="withEffect">
+                                  <p:stCondLst>
+                                    <p:cond delay="0"/>
+                                  </p:stCondLst>
+                                  <p:childTnLst>
+                                    <p:anim calcmode="lin" valueType="num">
+                                      <p:cBhvr additive="base">
+                                        <p:cTn id="12" dur="500"/>
+                                        <p:tgtEl>
+                                          <p:spTgt spid="3">
+                                            <p:txEl>
+                                              <p:pRg st="0" end="0"/>
+                                            </p:txEl>
+                                          </p:spTgt>
+                                        </p:tgtEl>
+                                        <p:attrNameLst>
+                                          <p:attrName>ppt_x</p:attrName>
+                                        </p:attrNameLst>
+                                      </p:cBhvr>
+                                      <p:tavLst>
+                                        <p:tav tm="0">
+                                          <p:val>
+                                            <p:strVal val="ppt_x"/>
+                                          </p:val>
+                                        </p:tav>
+                                        <p:tav tm="100000">
+                                          <p:val>
+                                            <p:strVal val="ppt_x"/>
+                                          </p:val>
+                                        </p:tav>
+                                      </p:tavLst>
+                                    </p:anim>
+                                    <p:anim calcmode="lin" valueType="num">
+                                      <p:cBhvr additive="base">
+                                        <p:cTn id="13" dur="500"/>
+                                        <p:tgtEl>
+                                          <p:spTgt spid="3">
+                                            <p:txEl>
+                                              <p:pRg st="0" end="0"/>
+                                            </p:txEl>
+                                          </p:spTgt>
+                                        </p:tgtEl>
+                                        <p:attrNameLst>
+                                          <p:attrName>ppt_y</p:attrName>
+                                        </p:attrNameLst>
+                                      </p:cBhvr>
+                                      <p:tavLst>
+                                        <p:tav tm="0">
+                                          <p:val>
+                                            <p:strVal val="ppt_y"/>
+                                          </p:val>
+                                        </p:tav>
+                                        <p:tav tm="100000">
+                                          <p:val>
+                                            <p:strVal val="1+ppt_h/2"/>
+                                          </p:val>
+                                        </p:tav>
+                                      </p:tavLst>
+                                    </p:anim>
+                                    <p:set>
+                                      <p:cBhvr>
+                                        <p:cTn id="14" dur="1" fill="hold">
+                                          <p:stCondLst>
+                                            <p:cond delay="499"/>
+                                          </p:stCondLst>
+                                        </p:cTn>
+                                        <p:tgtEl>
+                                          <p:spTgt spid="3">
+                                            <p:txEl>
+                                              <p:pRg st="0" end="0"/>
+                                            </p:txEl>
+                                          </p:spTgt>
+                                        </p:tgtEl>
+                                        <p:attrNameLst>
+                                          <p:attrName>style.visibility</p:attrName>
+                                        </p:attrNameLst>
+                                      </p:cBhvr>
+                                      <p:to>
+                                        <p:strVal val="hidden"/>
+                                      </p:to>
+                                    </p:set>
+                                  </p:childTnLst>
+                                </p:cTn>
+                              </p:par>
+                              <p:par>
+                                <p:cTn id="15" presetID="2" presetClass="exit" presetSubtype="4" fill="hold" grpId="0" nodeType="withEffect">
+                                  <p:stCondLst>
+                                    <p:cond delay="0"/>
+                                  </p:stCondLst>
+                                  <p:childTnLst>
+                                    <p:anim calcmode="lin" valueType="num">
+                                      <p:cBhvr additive="base">
+                                        <p:cTn id="16" dur="500"/>
+                                        <p:tgtEl>
+                                          <p:spTgt spid="3">
+                                            <p:txEl>
+                                              <p:pRg st="1" end="1"/>
+                                            </p:txEl>
+                                          </p:spTgt>
+                                        </p:tgtEl>
+                                        <p:attrNameLst>
+                                          <p:attrName>ppt_x</p:attrName>
+                                        </p:attrNameLst>
+                                      </p:cBhvr>
+                                      <p:tavLst>
+                                        <p:tav tm="0">
+                                          <p:val>
+                                            <p:strVal val="ppt_x"/>
+                                          </p:val>
+                                        </p:tav>
+                                        <p:tav tm="100000">
+                                          <p:val>
+                                            <p:strVal val="ppt_x"/>
+                                          </p:val>
+                                        </p:tav>
+                                      </p:tavLst>
+                                    </p:anim>
+                                    <p:anim calcmode="lin" valueType="num">
+                                      <p:cBhvr additive="base">
+                                        <p:cTn id="17" dur="500"/>
+                                        <p:tgtEl>
+                                          <p:spTgt spid="3">
+                                            <p:txEl>
+                                              <p:pRg st="1" end="1"/>
+                                            </p:txEl>
+                                          </p:spTgt>
+                                        </p:tgtEl>
+                                        <p:attrNameLst>
+                                          <p:attrName>ppt_y</p:attrName>
+                                        </p:attrNameLst>
+                                      </p:cBhvr>
+                                      <p:tavLst>
+                                        <p:tav tm="0">
+                                          <p:val>
+                                            <p:strVal val="ppt_y"/>
+                                          </p:val>
+                                        </p:tav>
+                                        <p:tav tm="100000">
+                                          <p:val>
+                                            <p:strVal val="1+ppt_h/2"/>
+                                          </p:val>
+                                        </p:tav>
+                                      </p:tavLst>
+                                    </p:anim>
+                                    <p:set>
+                                      <p:cBhvr>
+                                        <p:cTn id="18" dur="1" fill="hold">
+                                          <p:stCondLst>
+                                            <p:cond delay="499"/>
+                                          </p:stCondLst>
+                                        </p:cTn>
+                                        <p:tgtEl>
+                                          <p:spTgt spid="3">
+                                            <p:txEl>
+                                              <p:pRg st="1" end="1"/>
+                                            </p:txEl>
+                                          </p:spTgt>
+                                        </p:tgtEl>
+                                        <p:attrNameLst>
+                                          <p:attrName>style.visibility</p:attrName>
+                                        </p:attrNameLst>
+                                      </p:cBhvr>
+                                      <p:to>
+                                        <p:strVal val="hidden"/>
+                                      </p:to>
+                                    </p:set>
+                                  </p:childTnLst>
+                                </p:cTn>
+                              </p:par>
+                              <p:par>
+                                <p:cTn id="19" presetID="2" presetClass="exit" presetSubtype="4" fill="hold" grpId="0" nodeType="withEffect">
+                                  <p:stCondLst>
+                                    <p:cond delay="0"/>
+                                  </p:stCondLst>
+                                  <p:childTnLst>
+                                    <p:anim calcmode="lin" valueType="num">
+                                      <p:cBhvr additive="base">
+                                        <p:cTn id="20" dur="500"/>
+                                        <p:tgtEl>
+                                          <p:spTgt spid="3">
+                                            <p:txEl>
+                                              <p:pRg st="2" end="2"/>
+                                            </p:txEl>
+                                          </p:spTgt>
+                                        </p:tgtEl>
+                                        <p:attrNameLst>
+                                          <p:attrName>ppt_x</p:attrName>
+                                        </p:attrNameLst>
+                                      </p:cBhvr>
+                                      <p:tavLst>
+                                        <p:tav tm="0">
+                                          <p:val>
+                                            <p:strVal val="ppt_x"/>
+                                          </p:val>
+                                        </p:tav>
+                                        <p:tav tm="100000">
+                                          <p:val>
+                                            <p:strVal val="ppt_x"/>
+                                          </p:val>
+                                        </p:tav>
+                                      </p:tavLst>
+                                    </p:anim>
+                                    <p:anim calcmode="lin" valueType="num">
+                                      <p:cBhvr additive="base">
+                                        <p:cTn id="21" dur="500"/>
+                                        <p:tgtEl>
+                                          <p:spTgt spid="3">
+                                            <p:txEl>
+                                              <p:pRg st="2" end="2"/>
+                                            </p:txEl>
+                                          </p:spTgt>
+                                        </p:tgtEl>
+                                        <p:attrNameLst>
+                                          <p:attrName>ppt_y</p:attrName>
+                                        </p:attrNameLst>
+                                      </p:cBhvr>
+                                      <p:tavLst>
+                                        <p:tav tm="0">
+                                          <p:val>
+                                            <p:strVal val="ppt_y"/>
+                                          </p:val>
+                                        </p:tav>
+                                        <p:tav tm="100000">
+                                          <p:val>
+                                            <p:strVal val="1+ppt_h/2"/>
+                                          </p:val>
+                                        </p:tav>
+                                      </p:tavLst>
+                                    </p:anim>
+                                    <p:set>
+                                      <p:cBhvr>
+                                        <p:cTn id="22" dur="1" fill="hold">
+                                          <p:stCondLst>
+                                            <p:cond delay="499"/>
+                                          </p:stCondLst>
+                                        </p:cTn>
+                                        <p:tgtEl>
+                                          <p:spTgt spid="3">
+                                            <p:txEl>
+                                              <p:pRg st="2" end="2"/>
+                                            </p:txEl>
+                                          </p:spTgt>
+                                        </p:tgtEl>
+                                        <p:attrNameLst>
+                                          <p:attrName>style.visibility</p:attrName>
+                                        </p:attrNameLst>
+                                      </p:cBhvr>
+                                      <p:to>
+                                        <p:strVal val="hidden"/>
+                                      </p:to>
+                                    </p:set>
+                                  </p:childTnLst>
+                                </p:cTn>
+                              </p:par>
+                              <p:par>
+                                <p:cTn id="23" presetID="2" presetClass="exit" presetSubtype="4" fill="hold" grpId="0" nodeType="withEffect">
+                                  <p:stCondLst>
+                                    <p:cond delay="0"/>
+                                  </p:stCondLst>
+                                  <p:childTnLst>
+                                    <p:anim calcmode="lin" valueType="num">
+                                      <p:cBhvr additive="base">
+                                        <p:cTn id="24" dur="500"/>
+                                        <p:tgtEl>
+                                          <p:spTgt spid="3">
+                                            <p:txEl>
+                                              <p:pRg st="3" end="3"/>
+                                            </p:txEl>
+                                          </p:spTgt>
+                                        </p:tgtEl>
+                                        <p:attrNameLst>
+                                          <p:attrName>ppt_x</p:attrName>
+                                        </p:attrNameLst>
+                                      </p:cBhvr>
+                                      <p:tavLst>
+                                        <p:tav tm="0">
+                                          <p:val>
+                                            <p:strVal val="ppt_x"/>
+                                          </p:val>
+                                        </p:tav>
+                                        <p:tav tm="100000">
+                                          <p:val>
+                                            <p:strVal val="ppt_x"/>
+                                          </p:val>
+                                        </p:tav>
+                                      </p:tavLst>
+                                    </p:anim>
+                                    <p:anim calcmode="lin" valueType="num">
+                                      <p:cBhvr additive="base">
+                                        <p:cTn id="25" dur="500"/>
+                                        <p:tgtEl>
+                                          <p:spTgt spid="3">
+                                            <p:txEl>
+                                              <p:pRg st="3" end="3"/>
+                                            </p:txEl>
+                                          </p:spTgt>
+                                        </p:tgtEl>
+                                        <p:attrNameLst>
+                                          <p:attrName>ppt_y</p:attrName>
+                                        </p:attrNameLst>
+                                      </p:cBhvr>
+                                      <p:tavLst>
+                                        <p:tav tm="0">
+                                          <p:val>
+                                            <p:strVal val="ppt_y"/>
+                                          </p:val>
+                                        </p:tav>
+                                        <p:tav tm="100000">
+                                          <p:val>
+                                            <p:strVal val="1+ppt_h/2"/>
+                                          </p:val>
+                                        </p:tav>
+                                      </p:tavLst>
+                                    </p:anim>
+                                    <p:set>
+                                      <p:cBhvr>
+                                        <p:cTn id="26" dur="1" fill="hold">
+                                          <p:stCondLst>
+                                            <p:cond delay="499"/>
+                                          </p:stCondLst>
+                                        </p:cTn>
+                                        <p:tgtEl>
+                                          <p:spTgt spid="3">
+                                            <p:txEl>
+                                              <p:pRg st="3" end="3"/>
+                                            </p:txEl>
+                                          </p:spTgt>
+                                        </p:tgtEl>
+                                        <p:attrNameLst>
+                                          <p:attrName>style.visibility</p:attrName>
+                                        </p:attrNameLst>
+                                      </p:cBhvr>
+                                      <p:to>
+                                        <p:strVal val="hidden"/>
+                                      </p:to>
+                                    </p:set>
+                                  </p:childTnLst>
+                                </p:cTn>
+                              </p:par>
+                              <p:par>
+                                <p:cTn id="27" presetID="2" presetClass="exit" presetSubtype="4" fill="hold" grpId="0" nodeType="withEffect">
+                                  <p:stCondLst>
+                                    <p:cond delay="0"/>
+                                  </p:stCondLst>
+                                  <p:childTnLst>
+                                    <p:anim calcmode="lin" valueType="num">
+                                      <p:cBhvr additive="base">
+                                        <p:cTn id="28" dur="500"/>
+                                        <p:tgtEl>
+                                          <p:spTgt spid="3">
+                                            <p:txEl>
+                                              <p:pRg st="4" end="4"/>
+                                            </p:txEl>
+                                          </p:spTgt>
+                                        </p:tgtEl>
+                                        <p:attrNameLst>
+                                          <p:attrName>ppt_x</p:attrName>
+                                        </p:attrNameLst>
+                                      </p:cBhvr>
+                                      <p:tavLst>
+                                        <p:tav tm="0">
+                                          <p:val>
+                                            <p:strVal val="ppt_x"/>
+                                          </p:val>
+                                        </p:tav>
+                                        <p:tav tm="100000">
+                                          <p:val>
+                                            <p:strVal val="ppt_x"/>
+                                          </p:val>
+                                        </p:tav>
+                                      </p:tavLst>
+                                    </p:anim>
+                                    <p:anim calcmode="lin" valueType="num">
+                                      <p:cBhvr additive="base">
+                                        <p:cTn id="29" dur="500"/>
+                                        <p:tgtEl>
+                                          <p:spTgt spid="3">
+                                            <p:txEl>
+                                              <p:pRg st="4" end="4"/>
+                                            </p:txEl>
+                                          </p:spTgt>
+                                        </p:tgtEl>
+                                        <p:attrNameLst>
+                                          <p:attrName>ppt_y</p:attrName>
+                                        </p:attrNameLst>
+                                      </p:cBhvr>
+                                      <p:tavLst>
+                                        <p:tav tm="0">
+                                          <p:val>
+                                            <p:strVal val="ppt_y"/>
+                                          </p:val>
+                                        </p:tav>
+                                        <p:tav tm="100000">
+                                          <p:val>
+                                            <p:strVal val="1+ppt_h/2"/>
+                                          </p:val>
+                                        </p:tav>
+                                      </p:tavLst>
+                                    </p:anim>
+                                    <p:set>
+                                      <p:cBhvr>
+                                        <p:cTn id="30" dur="1" fill="hold">
+                                          <p:stCondLst>
+                                            <p:cond delay="499"/>
+                                          </p:stCondLst>
+                                        </p:cTn>
+                                        <p:tgtEl>
+                                          <p:spTgt spid="3">
+                                            <p:txEl>
+                                              <p:pRg st="4" end="4"/>
+                                            </p:txEl>
+                                          </p:spTgt>
+                                        </p:tgtEl>
+                                        <p:attrNameLst>
+                                          <p:attrName>style.visibility</p:attrName>
+                                        </p:attrNameLst>
+                                      </p:cBhvr>
+                                      <p:to>
+                                        <p:strVal val="hidden"/>
+                                      </p:to>
+                                    </p:set>
+                                  </p:childTnLst>
+                                </p:cTn>
+                              </p:par>
+                            </p:childTnLst>
+                          </p:cTn>
+                        </p:par>
+                      </p:childTnLst>
+                    </p:cTn>
+                  </p:par>
+                </p:childTnLst>
+              </p:cTn>
+              <p:prevCondLst>
+                <p:cond evt="onPrev" delay="0">
+                  <p:tgtEl>
+                    <p:sldTgt/>
+                  </p:tgtEl>
+                </p:cond>
+              </p:prevCondLst>
+              <p:nextCondLst>
+                <p:cond evt="onNext" delay="0">
+                  <p:tgtEl>
+                    <p:sldTgt/>
+                  </p:tgtEl>
+                </p:cond>
+              </p:nextCondLst>
+            </p:seq>
+          </p:childTnLst>
+        </p:cTn>
       </p:par>
     </p:tnLst>
+    <p:bldLst>
+      <p:bldP spid="3" grpId="0" build="p"/>
+    </p:bldLst>
   </p:timing>
 </p:sld>
 </file>
@@ -6418,155 +8605,16 @@
           <a:chExt cx="0" cy="0"/>
         </a:xfrm>
       </p:grpSpPr>
-      <p:sp>
-        <p:nvSpPr>
-          <p:cNvPr id="2" name="1 Título"/>
-          <p:cNvSpPr>
-            <a:spLocks noGrp="1"/>
-          </p:cNvSpPr>
-          <p:nvPr>
-            <p:ph type="title"/>
-          </p:nvPr>
-        </p:nvSpPr>
-        <p:spPr/>
-        <p:txBody>
-          <a:bodyPr/>
-          <a:lstStyle/>
-          <a:p>
-            <a:r>
-              <a:rPr lang="es-ES" dirty="0" smtClean="0"/>
-              <a:t>QMP</a:t>
-            </a:r>
-            <a:endParaRPr lang="es-ES" dirty="0"/>
-          </a:p>
-        </p:txBody>
-      </p:sp>
-      <p:sp>
-        <p:nvSpPr>
-          <p:cNvPr id="3" name="2 Marcador de contenido"/>
-          <p:cNvSpPr>
-            <a:spLocks noGrp="1"/>
-          </p:cNvSpPr>
-          <p:nvPr>
-            <p:ph idx="1"/>
-          </p:nvPr>
-        </p:nvSpPr>
-        <p:spPr/>
-        <p:txBody>
-          <a:bodyPr/>
-          <a:lstStyle/>
-          <a:p>
-            <a:pPr>
-              <a:buNone/>
-            </a:pPr>
-            <a:r>
-              <a:rPr lang="en-US" b="1" dirty="0" smtClean="0"/>
-              <a:t>Dynamic </a:t>
-            </a:r>
-            <a:r>
-              <a:rPr lang="en-US" b="1" dirty="0" smtClean="0"/>
-              <a:t>R</a:t>
-            </a:r>
-            <a:r>
-              <a:rPr lang="en-US" b="1" dirty="0" smtClean="0"/>
-              <a:t>outing Protocol</a:t>
-            </a:r>
-          </a:p>
-          <a:p>
-            <a:r>
-              <a:rPr lang="en-US" dirty="0" smtClean="0"/>
-              <a:t>The </a:t>
-            </a:r>
-            <a:r>
-              <a:rPr lang="en-US" dirty="0" smtClean="0"/>
-              <a:t>QMP firmware, uses the following protocols:</a:t>
-            </a:r>
-          </a:p>
-          <a:p>
-            <a:pPr lvl="1"/>
-            <a:r>
-              <a:rPr lang="en-US" dirty="0" smtClean="0"/>
-              <a:t> </a:t>
-            </a:r>
-            <a:r>
-              <a:rPr lang="en-US" dirty="0" smtClean="0"/>
-              <a:t>BMX6 as the main DRP.</a:t>
-            </a:r>
-          </a:p>
-          <a:p>
-            <a:pPr lvl="1"/>
-            <a:r>
-              <a:rPr lang="en-US" dirty="0" smtClean="0"/>
-              <a:t> OLSR6 as a backup DRP.</a:t>
-            </a:r>
-          </a:p>
-          <a:p>
-            <a:pPr lvl="1"/>
-            <a:r>
-              <a:rPr lang="en-US" dirty="0" smtClean="0"/>
-              <a:t> </a:t>
-            </a:r>
-            <a:r>
-              <a:rPr lang="en-US" dirty="0" smtClean="0"/>
-              <a:t>Babel as a backup DRP but optional.</a:t>
-            </a:r>
-          </a:p>
-          <a:p>
-            <a:endParaRPr lang="en-US" dirty="0" smtClean="0"/>
-          </a:p>
-          <a:p>
-            <a:r>
-              <a:rPr lang="en-US" dirty="0" smtClean="0"/>
-              <a:t>All three use IPv</a:t>
-            </a:r>
-            <a:r>
-              <a:rPr lang="en-US" dirty="0" smtClean="0"/>
-              <a:t>6 ULA to talk to other nodes and are isolated at the link layer (MAC) using VLANs.</a:t>
-            </a:r>
-            <a:endParaRPr lang="en-US" dirty="0"/>
-          </a:p>
-        </p:txBody>
-      </p:sp>
-      <p:sp>
-        <p:nvSpPr>
-          <p:cNvPr id="4" name="3 Marcador de número de diapositiva"/>
-          <p:cNvSpPr>
-            <a:spLocks noGrp="1"/>
-          </p:cNvSpPr>
-          <p:nvPr>
-            <p:ph type="sldNum" sz="quarter" idx="12"/>
-          </p:nvPr>
-        </p:nvSpPr>
-        <p:spPr/>
-        <p:txBody>
-          <a:bodyPr/>
-          <a:lstStyle/>
-          <a:p>
-            <a:fld id="{DA3FA644-4273-4B12-888A-E74B32B8A478}" type="slidenum">
-              <a:rPr lang="ru-RU" smtClean="0"/>
-              <a:pPr/>
-              <a:t>9</a:t>
-            </a:fld>
-            <a:endParaRPr lang="ru-RU"/>
-          </a:p>
-        </p:txBody>
-      </p:sp>
       <p:pic>
         <p:nvPicPr>
-          <p:cNvPr id="5" name="Picture 2" descr="http://qmp.cat/attachments/download/111"/>
+          <p:cNvPr id="1026" name="Picture 2"/>
           <p:cNvPicPr>
             <a:picLocks noChangeAspect="1" noChangeArrowheads="1"/>
           </p:cNvPicPr>
           <p:nvPr/>
         </p:nvPicPr>
         <p:blipFill>
-          <a:blip r:embed="rId2" cstate="print">
-            <a:extLst>
-              <a:ext uri="{28A0092B-C50C-407E-A947-70E740481C1C}">
-                <a14:useLocalDpi xmlns:a14="http://schemas.microsoft.com/office/drawing/2010/main" xmlns="" val="0"/>
-              </a:ext>
-            </a:extLst>
-          </a:blip>
+          <a:blip r:embed="rId2" cstate="print"/>
           <a:srcRect/>
           <a:stretch>
             <a:fillRect/>
@@ -6574,65 +8622,155 @@
         </p:blipFill>
         <p:spPr bwMode="auto">
           <a:xfrm>
-            <a:off x="1259632" y="4889599"/>
-            <a:ext cx="1228725" cy="495301"/>
+            <a:off x="467544" y="1412776"/>
+            <a:ext cx="7600950" cy="5181600"/>
           </a:xfrm>
           <a:prstGeom prst="rect">
             <a:avLst/>
           </a:prstGeom>
           <a:noFill/>
-          <a:extLst>
-            <a:ext uri="{909E8E84-426E-40DD-AFC4-6F175D3DCCD1}">
-              <a14:hiddenFill xmlns:a14="http://schemas.microsoft.com/office/drawing/2010/main" xmlns="">
-                <a:solidFill>
-                  <a:srgbClr val="FFFFFF"/>
-                </a:solidFill>
-              </a14:hiddenFill>
-            </a:ext>
-          </a:extLst>
+          <a:ln w="9525">
+            <a:noFill/>
+            <a:miter lim="800000"/>
+            <a:headEnd/>
+            <a:tailEnd/>
+          </a:ln>
         </p:spPr>
       </p:pic>
-      <p:pic>
-        <p:nvPicPr>
-          <p:cNvPr id="6" name="Picture 4" descr="http://t3.gstatic.com/images?q=tbn:ANd9GcRreIec2F02Y2Khun7hhgkCqiioKGp6jpJRS2qSvXjA3HG8KCWBSNz4OBo"/>
-          <p:cNvPicPr>
-            <a:picLocks noChangeAspect="1" noChangeArrowheads="1"/>
-          </p:cNvPicPr>
-          <p:nvPr/>
-        </p:nvPicPr>
-        <p:blipFill>
-          <a:blip r:embed="rId3" cstate="print">
-            <a:extLst>
-              <a:ext uri="{28A0092B-C50C-407E-A947-70E740481C1C}">
-                <a14:useLocalDpi xmlns:a14="http://schemas.microsoft.com/office/drawing/2010/main" xmlns="" val="0"/>
-              </a:ext>
-            </a:extLst>
-          </a:blip>
-          <a:srcRect/>
-          <a:stretch>
-            <a:fillRect/>
-          </a:stretch>
-        </p:blipFill>
-        <p:spPr bwMode="auto">
+      <p:sp>
+        <p:nvSpPr>
+          <p:cNvPr id="2" name="1 Título"/>
+          <p:cNvSpPr>
+            <a:spLocks noGrp="1"/>
+          </p:cNvSpPr>
+          <p:nvPr>
+            <p:ph type="title"/>
+          </p:nvPr>
+        </p:nvSpPr>
+        <p:spPr/>
+        <p:txBody>
+          <a:bodyPr/>
+          <a:lstStyle/>
+          <a:p>
+            <a:r>
+              <a:rPr lang="es-ES" dirty="0" smtClean="0"/>
+              <a:t>QMP</a:t>
+            </a:r>
+            <a:endParaRPr lang="es-ES" dirty="0"/>
+          </a:p>
+        </p:txBody>
+      </p:sp>
+      <p:sp>
+        <p:nvSpPr>
+          <p:cNvPr id="3" name="2 Marcador de contenido"/>
+          <p:cNvSpPr>
+            <a:spLocks noGrp="1"/>
+          </p:cNvSpPr>
+          <p:nvPr>
+            <p:ph idx="1"/>
+          </p:nvPr>
+        </p:nvSpPr>
+        <p:spPr>
           <a:xfrm>
-            <a:off x="3131840" y="5661248"/>
-            <a:ext cx="4914900" cy="657226"/>
+            <a:off x="457200" y="1600200"/>
+            <a:ext cx="7620000" cy="4997152"/>
           </a:xfrm>
-          <a:prstGeom prst="rect">
-            <a:avLst/>
-          </a:prstGeom>
-          <a:noFill/>
-          <a:extLst>
-            <a:ext uri="{909E8E84-426E-40DD-AFC4-6F175D3DCCD1}">
-              <a14:hiddenFill xmlns:a14="http://schemas.microsoft.com/office/drawing/2010/main" xmlns="">
-                <a:solidFill>
-                  <a:srgbClr val="FFFFFF"/>
-                </a:solidFill>
-              </a14:hiddenFill>
-            </a:ext>
-          </a:extLst>
         </p:spPr>
-      </p:pic>
+        <p:txBody>
+          <a:bodyPr>
+            <a:normAutofit/>
+          </a:bodyPr>
+          <a:lstStyle/>
+          <a:p>
+            <a:pPr>
+              <a:buNone/>
+            </a:pPr>
+            <a:r>
+              <a:rPr lang="en-US" b="1" dirty="0" smtClean="0"/>
+              <a:t>Modes</a:t>
+            </a:r>
+          </a:p>
+          <a:p>
+            <a:r>
+              <a:rPr lang="en-US" i="1" dirty="0" smtClean="0"/>
+              <a:t>Roaming</a:t>
+            </a:r>
+            <a:r>
+              <a:rPr lang="en-US" dirty="0" smtClean="0"/>
+              <a:t> for fast deployments:</a:t>
+            </a:r>
+          </a:p>
+          <a:p>
+            <a:pPr lvl="1"/>
+            <a:r>
+              <a:rPr lang="en-US" dirty="0" smtClean="0"/>
+              <a:t>All the access points in this mode will have the same IP and the same ESSID in order to allow users mobility, namely, they won’t lose the connection although they switch from an AP to another.</a:t>
+            </a:r>
+          </a:p>
+          <a:p>
+            <a:pPr lvl="1"/>
+            <a:r>
+              <a:rPr lang="en-US" dirty="0" smtClean="0"/>
+              <a:t>Every AP implements a NAT and so, two users attached to different APs won’t have direct vision between them.</a:t>
+            </a:r>
+          </a:p>
+          <a:p>
+            <a:endParaRPr lang="en-US" dirty="0" smtClean="0"/>
+          </a:p>
+          <a:p>
+            <a:r>
+              <a:rPr lang="en-US" i="1" dirty="0" smtClean="0"/>
+              <a:t>Community:</a:t>
+            </a:r>
+          </a:p>
+          <a:p>
+            <a:pPr lvl="1"/>
+            <a:r>
+              <a:rPr lang="en-US" dirty="0" smtClean="0"/>
+              <a:t>Every node will have a randomly assigned IPs range and will announce this range through the mesh.</a:t>
+            </a:r>
+          </a:p>
+          <a:p>
+            <a:pPr lvl="1"/>
+            <a:r>
+              <a:rPr lang="en-US" dirty="0" smtClean="0"/>
+              <a:t>There is not NAT, every user has direct vision with the others (1 hope away from the IPv4 network layer point of view), but mobility is not allowed (no roaming).</a:t>
+            </a:r>
+          </a:p>
+          <a:p>
+            <a:pPr lvl="1"/>
+            <a:endParaRPr lang="en-US" dirty="0" smtClean="0"/>
+          </a:p>
+          <a:p>
+            <a:pPr lvl="1"/>
+            <a:endParaRPr lang="en-US" dirty="0"/>
+          </a:p>
+        </p:txBody>
+      </p:sp>
+      <p:sp>
+        <p:nvSpPr>
+          <p:cNvPr id="4" name="3 Marcador de número de diapositiva"/>
+          <p:cNvSpPr>
+            <a:spLocks noGrp="1"/>
+          </p:cNvSpPr>
+          <p:nvPr>
+            <p:ph type="sldNum" sz="quarter" idx="12"/>
+          </p:nvPr>
+        </p:nvSpPr>
+        <p:spPr/>
+        <p:txBody>
+          <a:bodyPr/>
+          <a:lstStyle/>
+          <a:p>
+            <a:fld id="{DA3FA644-4273-4B12-888A-E74B32B8A478}" type="slidenum">
+              <a:rPr lang="ru-RU" smtClean="0"/>
+              <a:pPr/>
+              <a:t>9</a:t>
+            </a:fld>
+            <a:endParaRPr lang="ru-RU"/>
+          </a:p>
+        </p:txBody>
+      </p:sp>
     </p:spTree>
   </p:cSld>
   <p:clrMapOvr>
@@ -6641,9 +8779,755 @@
   <p:timing>
     <p:tnLst>
       <p:par>
-        <p:cTn id="1" dur="indefinite" restart="never" nodeType="tmRoot"/>
+        <p:cTn id="1" dur="indefinite" restart="never" nodeType="tmRoot">
+          <p:childTnLst>
+            <p:seq concurrent="1" nextAc="seek">
+              <p:cTn id="2" dur="indefinite" nodeType="mainSeq">
+                <p:childTnLst>
+                  <p:par>
+                    <p:cTn id="3" fill="hold">
+                      <p:stCondLst>
+                        <p:cond delay="indefinite"/>
+                      </p:stCondLst>
+                      <p:childTnLst>
+                        <p:par>
+                          <p:cTn id="4" fill="hold">
+                            <p:stCondLst>
+                              <p:cond delay="0"/>
+                            </p:stCondLst>
+                            <p:childTnLst>
+                              <p:par>
+                                <p:cTn id="5" presetID="31" presetClass="entr" presetSubtype="0" fill="hold" nodeType="clickEffect">
+                                  <p:stCondLst>
+                                    <p:cond delay="0"/>
+                                  </p:stCondLst>
+                                  <p:iterate type="lt">
+                                    <p:tmPct val="5000"/>
+                                  </p:iterate>
+                                  <p:childTnLst>
+                                    <p:set>
+                                      <p:cBhvr>
+                                        <p:cTn id="6" dur="1" fill="hold">
+                                          <p:stCondLst>
+                                            <p:cond delay="0"/>
+                                          </p:stCondLst>
+                                        </p:cTn>
+                                        <p:tgtEl>
+                                          <p:spTgt spid="1026"/>
+                                        </p:tgtEl>
+                                        <p:attrNameLst>
+                                          <p:attrName>style.visibility</p:attrName>
+                                        </p:attrNameLst>
+                                      </p:cBhvr>
+                                      <p:to>
+                                        <p:strVal val="visible"/>
+                                      </p:to>
+                                    </p:set>
+                                    <p:anim calcmode="lin" valueType="num">
+                                      <p:cBhvr>
+                                        <p:cTn id="7" dur="1000" fill="hold"/>
+                                        <p:tgtEl>
+                                          <p:spTgt spid="1026"/>
+                                        </p:tgtEl>
+                                        <p:attrNameLst>
+                                          <p:attrName>ppt_w</p:attrName>
+                                        </p:attrNameLst>
+                                      </p:cBhvr>
+                                      <p:tavLst>
+                                        <p:tav tm="0">
+                                          <p:val>
+                                            <p:fltVal val="0"/>
+                                          </p:val>
+                                        </p:tav>
+                                        <p:tav tm="100000">
+                                          <p:val>
+                                            <p:strVal val="#ppt_w"/>
+                                          </p:val>
+                                        </p:tav>
+                                      </p:tavLst>
+                                    </p:anim>
+                                    <p:anim calcmode="lin" valueType="num">
+                                      <p:cBhvr>
+                                        <p:cTn id="8" dur="1000" fill="hold"/>
+                                        <p:tgtEl>
+                                          <p:spTgt spid="1026"/>
+                                        </p:tgtEl>
+                                        <p:attrNameLst>
+                                          <p:attrName>ppt_h</p:attrName>
+                                        </p:attrNameLst>
+                                      </p:cBhvr>
+                                      <p:tavLst>
+                                        <p:tav tm="0">
+                                          <p:val>
+                                            <p:fltVal val="0"/>
+                                          </p:val>
+                                        </p:tav>
+                                        <p:tav tm="100000">
+                                          <p:val>
+                                            <p:strVal val="#ppt_h"/>
+                                          </p:val>
+                                        </p:tav>
+                                      </p:tavLst>
+                                    </p:anim>
+                                    <p:anim calcmode="lin" valueType="num">
+                                      <p:cBhvr>
+                                        <p:cTn id="9" dur="1000" fill="hold"/>
+                                        <p:tgtEl>
+                                          <p:spTgt spid="1026"/>
+                                        </p:tgtEl>
+                                        <p:attrNameLst>
+                                          <p:attrName>style.rotation</p:attrName>
+                                        </p:attrNameLst>
+                                      </p:cBhvr>
+                                      <p:tavLst>
+                                        <p:tav tm="0">
+                                          <p:val>
+                                            <p:fltVal val="90"/>
+                                          </p:val>
+                                        </p:tav>
+                                        <p:tav tm="100000">
+                                          <p:val>
+                                            <p:fltVal val="0"/>
+                                          </p:val>
+                                        </p:tav>
+                                      </p:tavLst>
+                                    </p:anim>
+                                    <p:animEffect transition="in" filter="fade">
+                                      <p:cBhvr>
+                                        <p:cTn id="10" dur="1000"/>
+                                        <p:tgtEl>
+                                          <p:spTgt spid="1026"/>
+                                        </p:tgtEl>
+                                      </p:cBhvr>
+                                    </p:animEffect>
+                                  </p:childTnLst>
+                                </p:cTn>
+                              </p:par>
+                              <p:par>
+                                <p:cTn id="11" presetID="2" presetClass="exit" presetSubtype="4" fill="hold" grpId="0" nodeType="withEffect">
+                                  <p:stCondLst>
+                                    <p:cond delay="0"/>
+                                  </p:stCondLst>
+                                  <p:childTnLst>
+                                    <p:anim calcmode="lin" valueType="num">
+                                      <p:cBhvr additive="base">
+                                        <p:cTn id="12" dur="500"/>
+                                        <p:tgtEl>
+                                          <p:spTgt spid="3">
+                                            <p:txEl>
+                                              <p:pRg st="0" end="0"/>
+                                            </p:txEl>
+                                          </p:spTgt>
+                                        </p:tgtEl>
+                                        <p:attrNameLst>
+                                          <p:attrName>ppt_x</p:attrName>
+                                        </p:attrNameLst>
+                                      </p:cBhvr>
+                                      <p:tavLst>
+                                        <p:tav tm="0">
+                                          <p:val>
+                                            <p:strVal val="ppt_x"/>
+                                          </p:val>
+                                        </p:tav>
+                                        <p:tav tm="100000">
+                                          <p:val>
+                                            <p:strVal val="ppt_x"/>
+                                          </p:val>
+                                        </p:tav>
+                                      </p:tavLst>
+                                    </p:anim>
+                                    <p:anim calcmode="lin" valueType="num">
+                                      <p:cBhvr additive="base">
+                                        <p:cTn id="13" dur="500"/>
+                                        <p:tgtEl>
+                                          <p:spTgt spid="3">
+                                            <p:txEl>
+                                              <p:pRg st="0" end="0"/>
+                                            </p:txEl>
+                                          </p:spTgt>
+                                        </p:tgtEl>
+                                        <p:attrNameLst>
+                                          <p:attrName>ppt_y</p:attrName>
+                                        </p:attrNameLst>
+                                      </p:cBhvr>
+                                      <p:tavLst>
+                                        <p:tav tm="0">
+                                          <p:val>
+                                            <p:strVal val="ppt_y"/>
+                                          </p:val>
+                                        </p:tav>
+                                        <p:tav tm="100000">
+                                          <p:val>
+                                            <p:strVal val="1+ppt_h/2"/>
+                                          </p:val>
+                                        </p:tav>
+                                      </p:tavLst>
+                                    </p:anim>
+                                    <p:set>
+                                      <p:cBhvr>
+                                        <p:cTn id="14" dur="1" fill="hold">
+                                          <p:stCondLst>
+                                            <p:cond delay="499"/>
+                                          </p:stCondLst>
+                                        </p:cTn>
+                                        <p:tgtEl>
+                                          <p:spTgt spid="3">
+                                            <p:txEl>
+                                              <p:pRg st="0" end="0"/>
+                                            </p:txEl>
+                                          </p:spTgt>
+                                        </p:tgtEl>
+                                        <p:attrNameLst>
+                                          <p:attrName>style.visibility</p:attrName>
+                                        </p:attrNameLst>
+                                      </p:cBhvr>
+                                      <p:to>
+                                        <p:strVal val="hidden"/>
+                                      </p:to>
+                                    </p:set>
+                                  </p:childTnLst>
+                                </p:cTn>
+                              </p:par>
+                              <p:par>
+                                <p:cTn id="15" presetID="2" presetClass="exit" presetSubtype="4" fill="hold" grpId="0" nodeType="withEffect">
+                                  <p:stCondLst>
+                                    <p:cond delay="0"/>
+                                  </p:stCondLst>
+                                  <p:childTnLst>
+                                    <p:anim calcmode="lin" valueType="num">
+                                      <p:cBhvr additive="base">
+                                        <p:cTn id="16" dur="500"/>
+                                        <p:tgtEl>
+                                          <p:spTgt spid="3">
+                                            <p:txEl>
+                                              <p:pRg st="1" end="1"/>
+                                            </p:txEl>
+                                          </p:spTgt>
+                                        </p:tgtEl>
+                                        <p:attrNameLst>
+                                          <p:attrName>ppt_x</p:attrName>
+                                        </p:attrNameLst>
+                                      </p:cBhvr>
+                                      <p:tavLst>
+                                        <p:tav tm="0">
+                                          <p:val>
+                                            <p:strVal val="ppt_x"/>
+                                          </p:val>
+                                        </p:tav>
+                                        <p:tav tm="100000">
+                                          <p:val>
+                                            <p:strVal val="ppt_x"/>
+                                          </p:val>
+                                        </p:tav>
+                                      </p:tavLst>
+                                    </p:anim>
+                                    <p:anim calcmode="lin" valueType="num">
+                                      <p:cBhvr additive="base">
+                                        <p:cTn id="17" dur="500"/>
+                                        <p:tgtEl>
+                                          <p:spTgt spid="3">
+                                            <p:txEl>
+                                              <p:pRg st="1" end="1"/>
+                                            </p:txEl>
+                                          </p:spTgt>
+                                        </p:tgtEl>
+                                        <p:attrNameLst>
+                                          <p:attrName>ppt_y</p:attrName>
+                                        </p:attrNameLst>
+                                      </p:cBhvr>
+                                      <p:tavLst>
+                                        <p:tav tm="0">
+                                          <p:val>
+                                            <p:strVal val="ppt_y"/>
+                                          </p:val>
+                                        </p:tav>
+                                        <p:tav tm="100000">
+                                          <p:val>
+                                            <p:strVal val="1+ppt_h/2"/>
+                                          </p:val>
+                                        </p:tav>
+                                      </p:tavLst>
+                                    </p:anim>
+                                    <p:set>
+                                      <p:cBhvr>
+                                        <p:cTn id="18" dur="1" fill="hold">
+                                          <p:stCondLst>
+                                            <p:cond delay="499"/>
+                                          </p:stCondLst>
+                                        </p:cTn>
+                                        <p:tgtEl>
+                                          <p:spTgt spid="3">
+                                            <p:txEl>
+                                              <p:pRg st="1" end="1"/>
+                                            </p:txEl>
+                                          </p:spTgt>
+                                        </p:tgtEl>
+                                        <p:attrNameLst>
+                                          <p:attrName>style.visibility</p:attrName>
+                                        </p:attrNameLst>
+                                      </p:cBhvr>
+                                      <p:to>
+                                        <p:strVal val="hidden"/>
+                                      </p:to>
+                                    </p:set>
+                                  </p:childTnLst>
+                                </p:cTn>
+                              </p:par>
+                              <p:par>
+                                <p:cTn id="19" presetID="2" presetClass="exit" presetSubtype="4" fill="hold" grpId="0" nodeType="withEffect">
+                                  <p:stCondLst>
+                                    <p:cond delay="0"/>
+                                  </p:stCondLst>
+                                  <p:childTnLst>
+                                    <p:anim calcmode="lin" valueType="num">
+                                      <p:cBhvr additive="base">
+                                        <p:cTn id="20" dur="500"/>
+                                        <p:tgtEl>
+                                          <p:spTgt spid="3">
+                                            <p:txEl>
+                                              <p:pRg st="2" end="2"/>
+                                            </p:txEl>
+                                          </p:spTgt>
+                                        </p:tgtEl>
+                                        <p:attrNameLst>
+                                          <p:attrName>ppt_x</p:attrName>
+                                        </p:attrNameLst>
+                                      </p:cBhvr>
+                                      <p:tavLst>
+                                        <p:tav tm="0">
+                                          <p:val>
+                                            <p:strVal val="ppt_x"/>
+                                          </p:val>
+                                        </p:tav>
+                                        <p:tav tm="100000">
+                                          <p:val>
+                                            <p:strVal val="ppt_x"/>
+                                          </p:val>
+                                        </p:tav>
+                                      </p:tavLst>
+                                    </p:anim>
+                                    <p:anim calcmode="lin" valueType="num">
+                                      <p:cBhvr additive="base">
+                                        <p:cTn id="21" dur="500"/>
+                                        <p:tgtEl>
+                                          <p:spTgt spid="3">
+                                            <p:txEl>
+                                              <p:pRg st="2" end="2"/>
+                                            </p:txEl>
+                                          </p:spTgt>
+                                        </p:tgtEl>
+                                        <p:attrNameLst>
+                                          <p:attrName>ppt_y</p:attrName>
+                                        </p:attrNameLst>
+                                      </p:cBhvr>
+                                      <p:tavLst>
+                                        <p:tav tm="0">
+                                          <p:val>
+                                            <p:strVal val="ppt_y"/>
+                                          </p:val>
+                                        </p:tav>
+                                        <p:tav tm="100000">
+                                          <p:val>
+                                            <p:strVal val="1+ppt_h/2"/>
+                                          </p:val>
+                                        </p:tav>
+                                      </p:tavLst>
+                                    </p:anim>
+                                    <p:set>
+                                      <p:cBhvr>
+                                        <p:cTn id="22" dur="1" fill="hold">
+                                          <p:stCondLst>
+                                            <p:cond delay="499"/>
+                                          </p:stCondLst>
+                                        </p:cTn>
+                                        <p:tgtEl>
+                                          <p:spTgt spid="3">
+                                            <p:txEl>
+                                              <p:pRg st="2" end="2"/>
+                                            </p:txEl>
+                                          </p:spTgt>
+                                        </p:tgtEl>
+                                        <p:attrNameLst>
+                                          <p:attrName>style.visibility</p:attrName>
+                                        </p:attrNameLst>
+                                      </p:cBhvr>
+                                      <p:to>
+                                        <p:strVal val="hidden"/>
+                                      </p:to>
+                                    </p:set>
+                                  </p:childTnLst>
+                                </p:cTn>
+                              </p:par>
+                              <p:par>
+                                <p:cTn id="23" presetID="2" presetClass="exit" presetSubtype="4" fill="hold" grpId="0" nodeType="withEffect">
+                                  <p:stCondLst>
+                                    <p:cond delay="0"/>
+                                  </p:stCondLst>
+                                  <p:childTnLst>
+                                    <p:anim calcmode="lin" valueType="num">
+                                      <p:cBhvr additive="base">
+                                        <p:cTn id="24" dur="500"/>
+                                        <p:tgtEl>
+                                          <p:spTgt spid="3">
+                                            <p:txEl>
+                                              <p:pRg st="3" end="3"/>
+                                            </p:txEl>
+                                          </p:spTgt>
+                                        </p:tgtEl>
+                                        <p:attrNameLst>
+                                          <p:attrName>ppt_x</p:attrName>
+                                        </p:attrNameLst>
+                                      </p:cBhvr>
+                                      <p:tavLst>
+                                        <p:tav tm="0">
+                                          <p:val>
+                                            <p:strVal val="ppt_x"/>
+                                          </p:val>
+                                        </p:tav>
+                                        <p:tav tm="100000">
+                                          <p:val>
+                                            <p:strVal val="ppt_x"/>
+                                          </p:val>
+                                        </p:tav>
+                                      </p:tavLst>
+                                    </p:anim>
+                                    <p:anim calcmode="lin" valueType="num">
+                                      <p:cBhvr additive="base">
+                                        <p:cTn id="25" dur="500"/>
+                                        <p:tgtEl>
+                                          <p:spTgt spid="3">
+                                            <p:txEl>
+                                              <p:pRg st="3" end="3"/>
+                                            </p:txEl>
+                                          </p:spTgt>
+                                        </p:tgtEl>
+                                        <p:attrNameLst>
+                                          <p:attrName>ppt_y</p:attrName>
+                                        </p:attrNameLst>
+                                      </p:cBhvr>
+                                      <p:tavLst>
+                                        <p:tav tm="0">
+                                          <p:val>
+                                            <p:strVal val="ppt_y"/>
+                                          </p:val>
+                                        </p:tav>
+                                        <p:tav tm="100000">
+                                          <p:val>
+                                            <p:strVal val="1+ppt_h/2"/>
+                                          </p:val>
+                                        </p:tav>
+                                      </p:tavLst>
+                                    </p:anim>
+                                    <p:set>
+                                      <p:cBhvr>
+                                        <p:cTn id="26" dur="1" fill="hold">
+                                          <p:stCondLst>
+                                            <p:cond delay="499"/>
+                                          </p:stCondLst>
+                                        </p:cTn>
+                                        <p:tgtEl>
+                                          <p:spTgt spid="3">
+                                            <p:txEl>
+                                              <p:pRg st="3" end="3"/>
+                                            </p:txEl>
+                                          </p:spTgt>
+                                        </p:tgtEl>
+                                        <p:attrNameLst>
+                                          <p:attrName>style.visibility</p:attrName>
+                                        </p:attrNameLst>
+                                      </p:cBhvr>
+                                      <p:to>
+                                        <p:strVal val="hidden"/>
+                                      </p:to>
+                                    </p:set>
+                                  </p:childTnLst>
+                                </p:cTn>
+                              </p:par>
+                              <p:par>
+                                <p:cTn id="27" presetID="2" presetClass="exit" presetSubtype="4" fill="hold" grpId="0" nodeType="withEffect">
+                                  <p:stCondLst>
+                                    <p:cond delay="0"/>
+                                  </p:stCondLst>
+                                  <p:childTnLst>
+                                    <p:anim calcmode="lin" valueType="num">
+                                      <p:cBhvr additive="base">
+                                        <p:cTn id="28" dur="500"/>
+                                        <p:tgtEl>
+                                          <p:spTgt spid="3">
+                                            <p:txEl>
+                                              <p:pRg st="5" end="5"/>
+                                            </p:txEl>
+                                          </p:spTgt>
+                                        </p:tgtEl>
+                                        <p:attrNameLst>
+                                          <p:attrName>ppt_x</p:attrName>
+                                        </p:attrNameLst>
+                                      </p:cBhvr>
+                                      <p:tavLst>
+                                        <p:tav tm="0">
+                                          <p:val>
+                                            <p:strVal val="ppt_x"/>
+                                          </p:val>
+                                        </p:tav>
+                                        <p:tav tm="100000">
+                                          <p:val>
+                                            <p:strVal val="ppt_x"/>
+                                          </p:val>
+                                        </p:tav>
+                                      </p:tavLst>
+                                    </p:anim>
+                                    <p:anim calcmode="lin" valueType="num">
+                                      <p:cBhvr additive="base">
+                                        <p:cTn id="29" dur="500"/>
+                                        <p:tgtEl>
+                                          <p:spTgt spid="3">
+                                            <p:txEl>
+                                              <p:pRg st="5" end="5"/>
+                                            </p:txEl>
+                                          </p:spTgt>
+                                        </p:tgtEl>
+                                        <p:attrNameLst>
+                                          <p:attrName>ppt_y</p:attrName>
+                                        </p:attrNameLst>
+                                      </p:cBhvr>
+                                      <p:tavLst>
+                                        <p:tav tm="0">
+                                          <p:val>
+                                            <p:strVal val="ppt_y"/>
+                                          </p:val>
+                                        </p:tav>
+                                        <p:tav tm="100000">
+                                          <p:val>
+                                            <p:strVal val="1+ppt_h/2"/>
+                                          </p:val>
+                                        </p:tav>
+                                      </p:tavLst>
+                                    </p:anim>
+                                    <p:set>
+                                      <p:cBhvr>
+                                        <p:cTn id="30" dur="1" fill="hold">
+                                          <p:stCondLst>
+                                            <p:cond delay="499"/>
+                                          </p:stCondLst>
+                                        </p:cTn>
+                                        <p:tgtEl>
+                                          <p:spTgt spid="3">
+                                            <p:txEl>
+                                              <p:pRg st="5" end="5"/>
+                                            </p:txEl>
+                                          </p:spTgt>
+                                        </p:tgtEl>
+                                        <p:attrNameLst>
+                                          <p:attrName>style.visibility</p:attrName>
+                                        </p:attrNameLst>
+                                      </p:cBhvr>
+                                      <p:to>
+                                        <p:strVal val="hidden"/>
+                                      </p:to>
+                                    </p:set>
+                                  </p:childTnLst>
+                                </p:cTn>
+                              </p:par>
+                              <p:par>
+                                <p:cTn id="31" presetID="2" presetClass="exit" presetSubtype="4" fill="hold" grpId="0" nodeType="withEffect">
+                                  <p:stCondLst>
+                                    <p:cond delay="0"/>
+                                  </p:stCondLst>
+                                  <p:childTnLst>
+                                    <p:anim calcmode="lin" valueType="num">
+                                      <p:cBhvr additive="base">
+                                        <p:cTn id="32" dur="500"/>
+                                        <p:tgtEl>
+                                          <p:spTgt spid="3">
+                                            <p:txEl>
+                                              <p:pRg st="6" end="6"/>
+                                            </p:txEl>
+                                          </p:spTgt>
+                                        </p:tgtEl>
+                                        <p:attrNameLst>
+                                          <p:attrName>ppt_x</p:attrName>
+                                        </p:attrNameLst>
+                                      </p:cBhvr>
+                                      <p:tavLst>
+                                        <p:tav tm="0">
+                                          <p:val>
+                                            <p:strVal val="ppt_x"/>
+                                          </p:val>
+                                        </p:tav>
+                                        <p:tav tm="100000">
+                                          <p:val>
+                                            <p:strVal val="ppt_x"/>
+                                          </p:val>
+                                        </p:tav>
+                                      </p:tavLst>
+                                    </p:anim>
+                                    <p:anim calcmode="lin" valueType="num">
+                                      <p:cBhvr additive="base">
+                                        <p:cTn id="33" dur="500"/>
+                                        <p:tgtEl>
+                                          <p:spTgt spid="3">
+                                            <p:txEl>
+                                              <p:pRg st="6" end="6"/>
+                                            </p:txEl>
+                                          </p:spTgt>
+                                        </p:tgtEl>
+                                        <p:attrNameLst>
+                                          <p:attrName>ppt_y</p:attrName>
+                                        </p:attrNameLst>
+                                      </p:cBhvr>
+                                      <p:tavLst>
+                                        <p:tav tm="0">
+                                          <p:val>
+                                            <p:strVal val="ppt_y"/>
+                                          </p:val>
+                                        </p:tav>
+                                        <p:tav tm="100000">
+                                          <p:val>
+                                            <p:strVal val="1+ppt_h/2"/>
+                                          </p:val>
+                                        </p:tav>
+                                      </p:tavLst>
+                                    </p:anim>
+                                    <p:set>
+                                      <p:cBhvr>
+                                        <p:cTn id="34" dur="1" fill="hold">
+                                          <p:stCondLst>
+                                            <p:cond delay="499"/>
+                                          </p:stCondLst>
+                                        </p:cTn>
+                                        <p:tgtEl>
+                                          <p:spTgt spid="3">
+                                            <p:txEl>
+                                              <p:pRg st="6" end="6"/>
+                                            </p:txEl>
+                                          </p:spTgt>
+                                        </p:tgtEl>
+                                        <p:attrNameLst>
+                                          <p:attrName>style.visibility</p:attrName>
+                                        </p:attrNameLst>
+                                      </p:cBhvr>
+                                      <p:to>
+                                        <p:strVal val="hidden"/>
+                                      </p:to>
+                                    </p:set>
+                                  </p:childTnLst>
+                                </p:cTn>
+                              </p:par>
+                              <p:par>
+                                <p:cTn id="35" presetID="2" presetClass="exit" presetSubtype="4" fill="hold" grpId="0" nodeType="withEffect">
+                                  <p:stCondLst>
+                                    <p:cond delay="0"/>
+                                  </p:stCondLst>
+                                  <p:childTnLst>
+                                    <p:anim calcmode="lin" valueType="num">
+                                      <p:cBhvr additive="base">
+                                        <p:cTn id="36" dur="500"/>
+                                        <p:tgtEl>
+                                          <p:spTgt spid="3">
+                                            <p:txEl>
+                                              <p:pRg st="7" end="7"/>
+                                            </p:txEl>
+                                          </p:spTgt>
+                                        </p:tgtEl>
+                                        <p:attrNameLst>
+                                          <p:attrName>ppt_x</p:attrName>
+                                        </p:attrNameLst>
+                                      </p:cBhvr>
+                                      <p:tavLst>
+                                        <p:tav tm="0">
+                                          <p:val>
+                                            <p:strVal val="ppt_x"/>
+                                          </p:val>
+                                        </p:tav>
+                                        <p:tav tm="100000">
+                                          <p:val>
+                                            <p:strVal val="ppt_x"/>
+                                          </p:val>
+                                        </p:tav>
+                                      </p:tavLst>
+                                    </p:anim>
+                                    <p:anim calcmode="lin" valueType="num">
+                                      <p:cBhvr additive="base">
+                                        <p:cTn id="37" dur="500"/>
+                                        <p:tgtEl>
+                                          <p:spTgt spid="3">
+                                            <p:txEl>
+                                              <p:pRg st="7" end="7"/>
+                                            </p:txEl>
+                                          </p:spTgt>
+                                        </p:tgtEl>
+                                        <p:attrNameLst>
+                                          <p:attrName>ppt_y</p:attrName>
+                                        </p:attrNameLst>
+                                      </p:cBhvr>
+                                      <p:tavLst>
+                                        <p:tav tm="0">
+                                          <p:val>
+                                            <p:strVal val="ppt_y"/>
+                                          </p:val>
+                                        </p:tav>
+                                        <p:tav tm="100000">
+                                          <p:val>
+                                            <p:strVal val="1+ppt_h/2"/>
+                                          </p:val>
+                                        </p:tav>
+                                      </p:tavLst>
+                                    </p:anim>
+                                    <p:set>
+                                      <p:cBhvr>
+                                        <p:cTn id="38" dur="1" fill="hold">
+                                          <p:stCondLst>
+                                            <p:cond delay="499"/>
+                                          </p:stCondLst>
+                                        </p:cTn>
+                                        <p:tgtEl>
+                                          <p:spTgt spid="3">
+                                            <p:txEl>
+                                              <p:pRg st="7" end="7"/>
+                                            </p:txEl>
+                                          </p:spTgt>
+                                        </p:tgtEl>
+                                        <p:attrNameLst>
+                                          <p:attrName>style.visibility</p:attrName>
+                                        </p:attrNameLst>
+                                      </p:cBhvr>
+                                      <p:to>
+                                        <p:strVal val="hidden"/>
+                                      </p:to>
+                                    </p:set>
+                                  </p:childTnLst>
+                                </p:cTn>
+                              </p:par>
+                            </p:childTnLst>
+                          </p:cTn>
+                        </p:par>
+                      </p:childTnLst>
+                    </p:cTn>
+                  </p:par>
+                </p:childTnLst>
+              </p:cTn>
+              <p:prevCondLst>
+                <p:cond evt="onPrev" delay="0">
+                  <p:tgtEl>
+                    <p:sldTgt/>
+                  </p:tgtEl>
+                </p:cond>
+              </p:prevCondLst>
+              <p:nextCondLst>
+                <p:cond evt="onNext" delay="0">
+                  <p:tgtEl>
+                    <p:sldTgt/>
+                  </p:tgtEl>
+                </p:cond>
+              </p:nextCondLst>
+            </p:seq>
+          </p:childTnLst>
+        </p:cTn>
       </p:par>
     </p:tnLst>
+    <p:bldLst>
+      <p:bldP spid="3" grpId="0" build="p"/>
+    </p:bldLst>
   </p:timing>
 </p:sld>
 </file>

</xml_diff>

<commit_message>
modified:   Presentation-demo/MN_QMP_Demo.pdf 	modified:   Presentation-demo/MN_QMP_Demo.pptx
</commit_message>
<xml_diff>
--- a/Presentation-demo/MN_QMP_Demo.pptx
+++ b/Presentation-demo/MN_QMP_Demo.pptx
@@ -375,7 +375,7 @@
     </p:spTree>
     <p:extLst>
       <p:ext uri="{BB962C8B-B14F-4D97-AF65-F5344CB8AC3E}">
-        <p14:creationId xmlns:p14="http://schemas.microsoft.com/office/powerpoint/2010/main" xmlns="" val="2089319304"/>
+        <p14:creationId xmlns="" xmlns:p14="http://schemas.microsoft.com/office/powerpoint/2010/main" val="2089319304"/>
       </p:ext>
     </p:extLst>
   </p:cSld>
@@ -3651,7 +3651,7 @@
     </p:spTree>
     <p:extLst>
       <p:ext uri="{BB962C8B-B14F-4D97-AF65-F5344CB8AC3E}">
-        <p14:creationId xmlns:p14="http://schemas.microsoft.com/office/powerpoint/2010/main" xmlns="" val="1584798069"/>
+        <p14:creationId xmlns="" xmlns:p14="http://schemas.microsoft.com/office/powerpoint/2010/main" val="1584798069"/>
       </p:ext>
     </p:extLst>
   </p:cSld>
@@ -3806,7 +3806,7 @@
           <a:blip r:embed="rId2" cstate="print">
             <a:extLst>
               <a:ext uri="{28A0092B-C50C-407E-A947-70E740481C1C}">
-                <a14:useLocalDpi xmlns="" xmlns:a14="http://schemas.microsoft.com/office/drawing/2010/main" val="0"/>
+                <a14:useLocalDpi xmlns:a14="http://schemas.microsoft.com/office/drawing/2010/main" xmlns="" val="0"/>
               </a:ext>
             </a:extLst>
           </a:blip>
@@ -3826,7 +3826,7 @@
           <a:noFill/>
           <a:extLst>
             <a:ext uri="{909E8E84-426E-40DD-AFC4-6F175D3DCCD1}">
-              <a14:hiddenFill xmlns="" xmlns:a14="http://schemas.microsoft.com/office/drawing/2010/main">
+              <a14:hiddenFill xmlns:a14="http://schemas.microsoft.com/office/drawing/2010/main" xmlns="">
                 <a:solidFill>
                   <a:srgbClr val="FFFFFF"/>
                 </a:solidFill>
@@ -3847,7 +3847,7 @@
           <a:blip r:embed="rId3" cstate="print">
             <a:extLst>
               <a:ext uri="{28A0092B-C50C-407E-A947-70E740481C1C}">
-                <a14:useLocalDpi xmlns="" xmlns:a14="http://schemas.microsoft.com/office/drawing/2010/main" val="0"/>
+                <a14:useLocalDpi xmlns:a14="http://schemas.microsoft.com/office/drawing/2010/main" xmlns="" val="0"/>
               </a:ext>
             </a:extLst>
           </a:blip>
@@ -3867,7 +3867,7 @@
           <a:noFill/>
           <a:extLst>
             <a:ext uri="{909E8E84-426E-40DD-AFC4-6F175D3DCCD1}">
-              <a14:hiddenFill xmlns="" xmlns:a14="http://schemas.microsoft.com/office/drawing/2010/main">
+              <a14:hiddenFill xmlns:a14="http://schemas.microsoft.com/office/drawing/2010/main" xmlns="">
                 <a:solidFill>
                   <a:srgbClr val="FFFFFF"/>
                 </a:solidFill>
@@ -4548,7 +4548,7 @@
           <a:blip r:embed="rId3" cstate="print">
             <a:extLst>
               <a:ext uri="{28A0092B-C50C-407E-A947-70E740481C1C}">
-                <a14:useLocalDpi xmlns="" xmlns:a14="http://schemas.microsoft.com/office/drawing/2010/main" val="0"/>
+                <a14:useLocalDpi xmlns:a14="http://schemas.microsoft.com/office/drawing/2010/main" xmlns="" val="0"/>
               </a:ext>
             </a:extLst>
           </a:blip>
@@ -4568,7 +4568,7 @@
           <a:noFill/>
           <a:extLst>
             <a:ext uri="{909E8E84-426E-40DD-AFC4-6F175D3DCCD1}">
-              <a14:hiddenFill xmlns="" xmlns:a14="http://schemas.microsoft.com/office/drawing/2010/main">
+              <a14:hiddenFill xmlns:a14="http://schemas.microsoft.com/office/drawing/2010/main" xmlns="">
                 <a:solidFill>
                   <a:srgbClr val="FFFFFF"/>
                 </a:solidFill>
@@ -6541,7 +6541,6 @@
               <a:rPr lang="en-US" sz="2000" dirty="0" smtClean="0"/>
               <a:t>. Retrieved March 5, 2013, from http://qmp.cat/projects/qmp/wiki/Roaming-Collaborative </a:t>
             </a:r>
-            <a:endParaRPr lang="en-US" sz="2000" dirty="0" smtClean="0"/>
           </a:p>
           <a:p>
             <a:r>
@@ -6694,7 +6693,7 @@
     </p:spTree>
     <p:extLst>
       <p:ext uri="{BB962C8B-B14F-4D97-AF65-F5344CB8AC3E}">
-        <p14:creationId xmlns:p14="http://schemas.microsoft.com/office/powerpoint/2010/main" xmlns="" val="1608000149"/>
+        <p14:creationId xmlns="" xmlns:p14="http://schemas.microsoft.com/office/powerpoint/2010/main" val="1608000149"/>
       </p:ext>
     </p:extLst>
   </p:cSld>
@@ -6877,7 +6876,7 @@
     </p:spTree>
     <p:extLst>
       <p:ext uri="{BB962C8B-B14F-4D97-AF65-F5344CB8AC3E}">
-        <p14:creationId xmlns:p14="http://schemas.microsoft.com/office/powerpoint/2010/main" xmlns="" val="2734673611"/>
+        <p14:creationId xmlns="" xmlns:p14="http://schemas.microsoft.com/office/powerpoint/2010/main" val="2734673611"/>
       </p:ext>
     </p:extLst>
   </p:cSld>
@@ -6997,7 +6996,7 @@
           <a:blip r:embed="rId2" cstate="print">
             <a:extLst>
               <a:ext uri="{28A0092B-C50C-407E-A947-70E740481C1C}">
-                <a14:useLocalDpi xmlns:a14="http://schemas.microsoft.com/office/drawing/2010/main" xmlns="" val="0"/>
+                <a14:useLocalDpi xmlns="" xmlns:a14="http://schemas.microsoft.com/office/drawing/2010/main" val="0"/>
               </a:ext>
             </a:extLst>
           </a:blip>
@@ -7017,7 +7016,7 @@
           <a:noFill/>
           <a:extLst>
             <a:ext uri="{909E8E84-426E-40DD-AFC4-6F175D3DCCD1}">
-              <a14:hiddenFill xmlns:a14="http://schemas.microsoft.com/office/drawing/2010/main" xmlns="">
+              <a14:hiddenFill xmlns="" xmlns:a14="http://schemas.microsoft.com/office/drawing/2010/main">
                 <a:solidFill>
                   <a:srgbClr val="FFFFFF"/>
                 </a:solidFill>
@@ -7029,7 +7028,7 @@
     </p:spTree>
     <p:extLst>
       <p:ext uri="{BB962C8B-B14F-4D97-AF65-F5344CB8AC3E}">
-        <p14:creationId xmlns:p14="http://schemas.microsoft.com/office/powerpoint/2010/main" xmlns="" val="1347604916"/>
+        <p14:creationId xmlns="" xmlns:p14="http://schemas.microsoft.com/office/powerpoint/2010/main" val="1347604916"/>
       </p:ext>
     </p:extLst>
   </p:cSld>
@@ -7145,8 +7144,17 @@
             <a:pPr lvl="1" algn="just"/>
             <a:r>
               <a:rPr lang="en-US" dirty="0" smtClean="0"/>
-              <a:t>A mesh network is a network where all the participants are also routers. They are level 3 networks (Network layer).</a:t>
-            </a:r>
+              <a:t>A mesh network is a network where all the participants are also routers. </a:t>
+            </a:r>
+            <a:r>
+              <a:rPr lang="en-US" dirty="0" smtClean="0"/>
+              <a:t>They are, normally, level 3 networks (Network layer) although they can also be link layer networks</a:t>
+            </a:r>
+            <a:r>
+              <a:rPr lang="en-US" dirty="0" smtClean="0"/>
+              <a:t>.</a:t>
+            </a:r>
+            <a:endParaRPr lang="en-US" dirty="0" smtClean="0"/>
           </a:p>
           <a:p>
             <a:pPr lvl="1" algn="just"/>
@@ -7181,7 +7189,7 @@
         </p:blipFill>
         <p:spPr bwMode="auto">
           <a:xfrm>
-            <a:off x="683568" y="4077072"/>
+            <a:off x="683568" y="4221088"/>
             <a:ext cx="3683149" cy="2364408"/>
           </a:xfrm>
           <a:prstGeom prst="rect">
@@ -7213,7 +7221,7 @@
         </p:blipFill>
         <p:spPr bwMode="auto">
           <a:xfrm>
-            <a:off x="4499992" y="4149080"/>
+            <a:off x="4499992" y="4293096"/>
             <a:ext cx="3823103" cy="2282760"/>
           </a:xfrm>
           <a:prstGeom prst="rect">
@@ -7231,7 +7239,7 @@
     </p:spTree>
     <p:extLst>
       <p:ext uri="{BB962C8B-B14F-4D97-AF65-F5344CB8AC3E}">
-        <p14:creationId xmlns:p14="http://schemas.microsoft.com/office/powerpoint/2010/main" xmlns="" val="4024328202"/>
+        <p14:creationId xmlns="" xmlns:p14="http://schemas.microsoft.com/office/powerpoint/2010/main" val="4024328202"/>
       </p:ext>
     </p:extLst>
   </p:cSld>
@@ -7591,7 +7599,7 @@
           <a:blip r:embed="rId2" cstate="print">
             <a:extLst>
               <a:ext uri="{28A0092B-C50C-407E-A947-70E740481C1C}">
-                <a14:useLocalDpi xmlns:a14="http://schemas.microsoft.com/office/drawing/2010/main" xmlns="" val="0"/>
+                <a14:useLocalDpi xmlns="" xmlns:a14="http://schemas.microsoft.com/office/drawing/2010/main" val="0"/>
               </a:ext>
             </a:extLst>
           </a:blip>
@@ -7611,7 +7619,7 @@
           <a:noFill/>
           <a:extLst>
             <a:ext uri="{909E8E84-426E-40DD-AFC4-6F175D3DCCD1}">
-              <a14:hiddenFill xmlns:a14="http://schemas.microsoft.com/office/drawing/2010/main" xmlns="">
+              <a14:hiddenFill xmlns="" xmlns:a14="http://schemas.microsoft.com/office/drawing/2010/main">
                 <a:solidFill>
                   <a:srgbClr val="FFFFFF"/>
                 </a:solidFill>
@@ -7825,7 +7833,7 @@
     </p:spTree>
     <p:extLst>
       <p:ext uri="{BB962C8B-B14F-4D97-AF65-F5344CB8AC3E}">
-        <p14:creationId xmlns="" xmlns:p14="http://schemas.microsoft.com/office/powerpoint/2010/main" val="4024328202"/>
+        <p14:creationId xmlns:p14="http://schemas.microsoft.com/office/powerpoint/2010/main" xmlns="" val="4024328202"/>
       </p:ext>
     </p:extLst>
   </p:cSld>

</xml_diff>

<commit_message>
modified:   "Documentation/Spanish/Documentaci\303\263n.docx" 	modified:   Presentation-demo/MN_QMP_Demo.odp 	modified:   Presentation-demo/MN_QMP_Demo.pdf 	modified:   Presentation-demo/MN_QMP_Demo.pptx
</commit_message>
<xml_diff>
--- a/Presentation-demo/MN_QMP_Demo.pptx
+++ b/Presentation-demo/MN_QMP_Demo.pptx
@@ -5,23 +5,24 @@
     <p:sldMasterId id="2147483660" r:id="rId1"/>
   </p:sldMasterIdLst>
   <p:notesMasterIdLst>
-    <p:notesMasterId r:id="rId16"/>
+    <p:notesMasterId r:id="rId17"/>
   </p:notesMasterIdLst>
   <p:sldIdLst>
     <p:sldId id="256" r:id="rId2"/>
-    <p:sldId id="258" r:id="rId3"/>
-    <p:sldId id="266" r:id="rId4"/>
-    <p:sldId id="260" r:id="rId5"/>
-    <p:sldId id="267" r:id="rId6"/>
-    <p:sldId id="268" r:id="rId7"/>
-    <p:sldId id="271" r:id="rId8"/>
-    <p:sldId id="273" r:id="rId9"/>
-    <p:sldId id="274" r:id="rId10"/>
-    <p:sldId id="269" r:id="rId11"/>
-    <p:sldId id="272" r:id="rId12"/>
-    <p:sldId id="275" r:id="rId13"/>
-    <p:sldId id="270" r:id="rId14"/>
-    <p:sldId id="262" r:id="rId15"/>
+    <p:sldId id="276" r:id="rId3"/>
+    <p:sldId id="258" r:id="rId4"/>
+    <p:sldId id="266" r:id="rId5"/>
+    <p:sldId id="260" r:id="rId6"/>
+    <p:sldId id="267" r:id="rId7"/>
+    <p:sldId id="268" r:id="rId8"/>
+    <p:sldId id="271" r:id="rId9"/>
+    <p:sldId id="273" r:id="rId10"/>
+    <p:sldId id="274" r:id="rId11"/>
+    <p:sldId id="269" r:id="rId12"/>
+    <p:sldId id="272" r:id="rId13"/>
+    <p:sldId id="275" r:id="rId14"/>
+    <p:sldId id="270" r:id="rId15"/>
+    <p:sldId id="262" r:id="rId16"/>
   </p:sldIdLst>
   <p:sldSz cx="9144000" cy="6858000" type="screen4x3"/>
   <p:notesSz cx="6858000" cy="9144000"/>
@@ -206,7 +207,7 @@
             <a:fld id="{55E5443F-E353-429A-B0E4-7B65604E2DF0}" type="datetimeFigureOut">
               <a:rPr lang="ru-RU" smtClean="0"/>
               <a:pPr/>
-              <a:t>06.03.2013</a:t>
+              <a:t>10.03.2013</a:t>
             </a:fld>
             <a:endParaRPr lang="ru-RU"/>
           </a:p>
@@ -670,7 +671,7 @@
             <a:fld id="{65D1C55E-B11D-438C-8012-585487039BCD}" type="datetime1">
               <a:rPr lang="ru-RU" smtClean="0"/>
               <a:pPr/>
-              <a:t>06.03.2013</a:t>
+              <a:t>10.03.2013</a:t>
             </a:fld>
             <a:endParaRPr lang="ru-RU"/>
           </a:p>
@@ -837,7 +838,7 @@
             <a:fld id="{D43CF458-E8BA-4D11-B660-B7EDE58252C2}" type="datetime1">
               <a:rPr lang="ru-RU" smtClean="0"/>
               <a:pPr/>
-              <a:t>06.03.2013</a:t>
+              <a:t>10.03.2013</a:t>
             </a:fld>
             <a:endParaRPr lang="ru-RU"/>
           </a:p>
@@ -1014,7 +1015,7 @@
             <a:fld id="{D76480F4-9944-4231-A2FC-ACBF0C541F07}" type="datetime1">
               <a:rPr lang="ru-RU" smtClean="0"/>
               <a:pPr/>
-              <a:t>06.03.2013</a:t>
+              <a:t>10.03.2013</a:t>
             </a:fld>
             <a:endParaRPr lang="ru-RU"/>
           </a:p>
@@ -1181,7 +1182,7 @@
             <a:fld id="{0ABA554F-15B7-4471-954B-B09B3D6EBBF1}" type="datetime1">
               <a:rPr lang="ru-RU" smtClean="0"/>
               <a:pPr/>
-              <a:t>06.03.2013</a:t>
+              <a:t>10.03.2013</a:t>
             </a:fld>
             <a:endParaRPr lang="ru-RU"/>
           </a:p>
@@ -1424,7 +1425,7 @@
             <a:fld id="{193206D4-02DB-42E0-93CE-7D2D2568A31F}" type="datetime1">
               <a:rPr lang="ru-RU" smtClean="0"/>
               <a:pPr/>
-              <a:t>06.03.2013</a:t>
+              <a:t>10.03.2013</a:t>
             </a:fld>
             <a:endParaRPr lang="ru-RU"/>
           </a:p>
@@ -1709,7 +1710,7 @@
             <a:fld id="{626C50A8-49AA-42C6-A936-43CA5B1F5E8C}" type="datetime1">
               <a:rPr lang="ru-RU" smtClean="0"/>
               <a:pPr/>
-              <a:t>06.03.2013</a:t>
+              <a:t>10.03.2013</a:t>
             </a:fld>
             <a:endParaRPr lang="ru-RU"/>
           </a:p>
@@ -2140,7 +2141,7 @@
             <a:fld id="{BCAD40CC-8075-46F1-8DC6-60D6F6E6F283}" type="datetime1">
               <a:rPr lang="ru-RU" smtClean="0"/>
               <a:pPr/>
-              <a:t>06.03.2013</a:t>
+              <a:t>10.03.2013</a:t>
             </a:fld>
             <a:endParaRPr lang="ru-RU"/>
           </a:p>
@@ -2255,7 +2256,7 @@
             <a:fld id="{273125D8-D6B7-4598-A720-622DD29B88E5}" type="datetime1">
               <a:rPr lang="ru-RU" smtClean="0"/>
               <a:pPr/>
-              <a:t>06.03.2013</a:t>
+              <a:t>10.03.2013</a:t>
             </a:fld>
             <a:endParaRPr lang="ru-RU"/>
           </a:p>
@@ -2347,7 +2348,7 @@
             <a:fld id="{F96B8079-F953-4D97-9271-6C73546CD683}" type="datetime1">
               <a:rPr lang="ru-RU" smtClean="0"/>
               <a:pPr/>
-              <a:t>06.03.2013</a:t>
+              <a:t>10.03.2013</a:t>
             </a:fld>
             <a:endParaRPr lang="ru-RU"/>
           </a:p>
@@ -2538,7 +2539,7 @@
             <a:fld id="{D3BC4E32-C344-47BA-8C91-74F8F7BE8607}" type="datetime1">
               <a:rPr lang="ru-RU" smtClean="0"/>
               <a:pPr/>
-              <a:t>06.03.2013</a:t>
+              <a:t>10.03.2013</a:t>
             </a:fld>
             <a:endParaRPr lang="ru-RU"/>
           </a:p>
@@ -2858,7 +2859,7 @@
             <a:fld id="{56E44682-18C2-4899-90E2-EA3C96A5D216}" type="datetime1">
               <a:rPr lang="ru-RU" smtClean="0"/>
               <a:pPr/>
-              <a:t>06.03.2013</a:t>
+              <a:t>10.03.2013</a:t>
             </a:fld>
             <a:endParaRPr lang="ru-RU"/>
           </a:p>
@@ -3240,7 +3241,7 @@
             <a:fld id="{366EE1AE-826B-4213-A73B-DC4CAF3252C2}" type="datetime1">
               <a:rPr lang="ru-RU" smtClean="0"/>
               <a:pPr/>
-              <a:t>06.03.2013</a:t>
+              <a:t>10.03.2013</a:t>
             </a:fld>
             <a:endParaRPr lang="ru-RU"/>
           </a:p>
@@ -3685,6 +3686,38 @@
           <a:chExt cx="0" cy="0"/>
         </a:xfrm>
       </p:grpSpPr>
+      <p:pic>
+        <p:nvPicPr>
+          <p:cNvPr id="1026" name="Picture 2"/>
+          <p:cNvPicPr>
+            <a:picLocks noChangeAspect="1" noChangeArrowheads="1"/>
+          </p:cNvPicPr>
+          <p:nvPr/>
+        </p:nvPicPr>
+        <p:blipFill>
+          <a:blip r:embed="rId2" cstate="print"/>
+          <a:srcRect/>
+          <a:stretch>
+            <a:fillRect/>
+          </a:stretch>
+        </p:blipFill>
+        <p:spPr bwMode="auto">
+          <a:xfrm>
+            <a:off x="467544" y="1412776"/>
+            <a:ext cx="7600950" cy="5181600"/>
+          </a:xfrm>
+          <a:prstGeom prst="rect">
+            <a:avLst/>
+          </a:prstGeom>
+          <a:noFill/>
+          <a:ln w="9525">
+            <a:noFill/>
+            <a:miter lim="800000"/>
+            <a:headEnd/>
+            <a:tailEnd/>
+          </a:ln>
+        </p:spPr>
+      </p:pic>
       <p:sp>
         <p:nvSpPr>
           <p:cNvPr id="2" name="1 Título"/>
@@ -3718,9 +3751,16 @@
             <p:ph idx="1"/>
           </p:nvPr>
         </p:nvSpPr>
-        <p:spPr/>
-        <p:txBody>
-          <a:bodyPr/>
+        <p:spPr>
+          <a:xfrm>
+            <a:off x="457200" y="1600200"/>
+            <a:ext cx="7620000" cy="4997152"/>
+          </a:xfrm>
+        </p:spPr>
+        <p:txBody>
+          <a:bodyPr>
+            <a:normAutofit/>
+          </a:bodyPr>
           <a:lstStyle/>
           <a:p>
             <a:pPr>
@@ -3728,44 +3768,62 @@
             </a:pPr>
             <a:r>
               <a:rPr lang="en-US" b="1" dirty="0" smtClean="0"/>
-              <a:t>Dynamic Routing Protocol</a:t>
-            </a:r>
-          </a:p>
-          <a:p>
+              <a:t>Modes</a:t>
+            </a:r>
+          </a:p>
+          <a:p>
+            <a:r>
+              <a:rPr lang="en-US" i="1" dirty="0" smtClean="0"/>
+              <a:t>Roaming</a:t>
+            </a:r>
             <a:r>
               <a:rPr lang="en-US" dirty="0" smtClean="0"/>
-              <a:t>The QMP firmware, uses the following protocols:</a:t>
+              <a:t> for fast deployments:</a:t>
             </a:r>
           </a:p>
           <a:p>
             <a:pPr lvl="1"/>
             <a:r>
               <a:rPr lang="en-US" dirty="0" smtClean="0"/>
-              <a:t> BMX6 as the main DRP.</a:t>
+              <a:t>All the access points in this mode will have the same IP and the same ESSID in order to allow users mobility, namely, they won’t lose the connection although they switch from an AP to another.</a:t>
             </a:r>
           </a:p>
           <a:p>
             <a:pPr lvl="1"/>
             <a:r>
               <a:rPr lang="en-US" dirty="0" smtClean="0"/>
-              <a:t> OLSR6 as a backup DRP.</a:t>
+              <a:t>Every AP implements a NAT and so, two users attached to different APs won’t have direct vision between them.</a:t>
+            </a:r>
+          </a:p>
+          <a:p>
+            <a:endParaRPr lang="en-US" dirty="0" smtClean="0"/>
+          </a:p>
+          <a:p>
+            <a:r>
+              <a:rPr lang="en-US" i="1" dirty="0" smtClean="0"/>
+              <a:t>Community:</a:t>
             </a:r>
           </a:p>
           <a:p>
             <a:pPr lvl="1"/>
             <a:r>
               <a:rPr lang="en-US" dirty="0" smtClean="0"/>
-              <a:t> Babel as a backup DRP but optional.</a:t>
-            </a:r>
-          </a:p>
-          <a:p>
+              <a:t>Every node will have a randomly assigned IPs range and will announce this range through the mesh.</a:t>
+            </a:r>
+          </a:p>
+          <a:p>
+            <a:pPr lvl="1"/>
+            <a:r>
+              <a:rPr lang="en-US" dirty="0" smtClean="0"/>
+              <a:t>There is not NAT, every user has direct vision with the others (1 hope away from the IPv4 network layer point of view), but mobility is not allowed (no roaming).</a:t>
+            </a:r>
+          </a:p>
+          <a:p>
+            <a:pPr lvl="1"/>
             <a:endParaRPr lang="en-US" dirty="0" smtClean="0"/>
           </a:p>
           <a:p>
-            <a:r>
-              <a:rPr lang="en-US" dirty="0" smtClean="0"/>
-              <a:t>All three use IPv6 ULA to talk to other nodes and are isolated at the link layer (MAC) using VLANs.</a:t>
-            </a:r>
+            <a:pPr lvl="1"/>
             <a:endParaRPr lang="en-US" dirty="0"/>
           </a:p>
         </p:txBody>
@@ -3789,6 +3847,893 @@
               <a:rPr lang="ru-RU" smtClean="0"/>
               <a:pPr/>
               <a:t>10</a:t>
+            </a:fld>
+            <a:endParaRPr lang="ru-RU"/>
+          </a:p>
+        </p:txBody>
+      </p:sp>
+    </p:spTree>
+  </p:cSld>
+  <p:clrMapOvr>
+    <a:masterClrMapping/>
+  </p:clrMapOvr>
+  <p:timing>
+    <p:tnLst>
+      <p:par>
+        <p:cTn id="1" dur="indefinite" restart="never" nodeType="tmRoot">
+          <p:childTnLst>
+            <p:seq concurrent="1" nextAc="seek">
+              <p:cTn id="2" dur="indefinite" nodeType="mainSeq">
+                <p:childTnLst>
+                  <p:par>
+                    <p:cTn id="3" fill="hold">
+                      <p:stCondLst>
+                        <p:cond delay="indefinite"/>
+                      </p:stCondLst>
+                      <p:childTnLst>
+                        <p:par>
+                          <p:cTn id="4" fill="hold">
+                            <p:stCondLst>
+                              <p:cond delay="0"/>
+                            </p:stCondLst>
+                            <p:childTnLst>
+                              <p:par>
+                                <p:cTn id="5" presetID="31" presetClass="entr" presetSubtype="0" fill="hold" nodeType="clickEffect">
+                                  <p:stCondLst>
+                                    <p:cond delay="0"/>
+                                  </p:stCondLst>
+                                  <p:iterate type="lt">
+                                    <p:tmPct val="5000"/>
+                                  </p:iterate>
+                                  <p:childTnLst>
+                                    <p:set>
+                                      <p:cBhvr>
+                                        <p:cTn id="6" dur="1" fill="hold">
+                                          <p:stCondLst>
+                                            <p:cond delay="0"/>
+                                          </p:stCondLst>
+                                        </p:cTn>
+                                        <p:tgtEl>
+                                          <p:spTgt spid="1026"/>
+                                        </p:tgtEl>
+                                        <p:attrNameLst>
+                                          <p:attrName>style.visibility</p:attrName>
+                                        </p:attrNameLst>
+                                      </p:cBhvr>
+                                      <p:to>
+                                        <p:strVal val="visible"/>
+                                      </p:to>
+                                    </p:set>
+                                    <p:anim calcmode="lin" valueType="num">
+                                      <p:cBhvr>
+                                        <p:cTn id="7" dur="1000" fill="hold"/>
+                                        <p:tgtEl>
+                                          <p:spTgt spid="1026"/>
+                                        </p:tgtEl>
+                                        <p:attrNameLst>
+                                          <p:attrName>ppt_w</p:attrName>
+                                        </p:attrNameLst>
+                                      </p:cBhvr>
+                                      <p:tavLst>
+                                        <p:tav tm="0">
+                                          <p:val>
+                                            <p:fltVal val="0"/>
+                                          </p:val>
+                                        </p:tav>
+                                        <p:tav tm="100000">
+                                          <p:val>
+                                            <p:strVal val="#ppt_w"/>
+                                          </p:val>
+                                        </p:tav>
+                                      </p:tavLst>
+                                    </p:anim>
+                                    <p:anim calcmode="lin" valueType="num">
+                                      <p:cBhvr>
+                                        <p:cTn id="8" dur="1000" fill="hold"/>
+                                        <p:tgtEl>
+                                          <p:spTgt spid="1026"/>
+                                        </p:tgtEl>
+                                        <p:attrNameLst>
+                                          <p:attrName>ppt_h</p:attrName>
+                                        </p:attrNameLst>
+                                      </p:cBhvr>
+                                      <p:tavLst>
+                                        <p:tav tm="0">
+                                          <p:val>
+                                            <p:fltVal val="0"/>
+                                          </p:val>
+                                        </p:tav>
+                                        <p:tav tm="100000">
+                                          <p:val>
+                                            <p:strVal val="#ppt_h"/>
+                                          </p:val>
+                                        </p:tav>
+                                      </p:tavLst>
+                                    </p:anim>
+                                    <p:anim calcmode="lin" valueType="num">
+                                      <p:cBhvr>
+                                        <p:cTn id="9" dur="1000" fill="hold"/>
+                                        <p:tgtEl>
+                                          <p:spTgt spid="1026"/>
+                                        </p:tgtEl>
+                                        <p:attrNameLst>
+                                          <p:attrName>style.rotation</p:attrName>
+                                        </p:attrNameLst>
+                                      </p:cBhvr>
+                                      <p:tavLst>
+                                        <p:tav tm="0">
+                                          <p:val>
+                                            <p:fltVal val="90"/>
+                                          </p:val>
+                                        </p:tav>
+                                        <p:tav tm="100000">
+                                          <p:val>
+                                            <p:fltVal val="0"/>
+                                          </p:val>
+                                        </p:tav>
+                                      </p:tavLst>
+                                    </p:anim>
+                                    <p:animEffect transition="in" filter="fade">
+                                      <p:cBhvr>
+                                        <p:cTn id="10" dur="1000"/>
+                                        <p:tgtEl>
+                                          <p:spTgt spid="1026"/>
+                                        </p:tgtEl>
+                                      </p:cBhvr>
+                                    </p:animEffect>
+                                  </p:childTnLst>
+                                </p:cTn>
+                              </p:par>
+                              <p:par>
+                                <p:cTn id="11" presetID="2" presetClass="exit" presetSubtype="4" fill="hold" grpId="0" nodeType="withEffect">
+                                  <p:stCondLst>
+                                    <p:cond delay="0"/>
+                                  </p:stCondLst>
+                                  <p:childTnLst>
+                                    <p:anim calcmode="lin" valueType="num">
+                                      <p:cBhvr additive="base">
+                                        <p:cTn id="12" dur="500"/>
+                                        <p:tgtEl>
+                                          <p:spTgt spid="3">
+                                            <p:txEl>
+                                              <p:pRg st="0" end="0"/>
+                                            </p:txEl>
+                                          </p:spTgt>
+                                        </p:tgtEl>
+                                        <p:attrNameLst>
+                                          <p:attrName>ppt_x</p:attrName>
+                                        </p:attrNameLst>
+                                      </p:cBhvr>
+                                      <p:tavLst>
+                                        <p:tav tm="0">
+                                          <p:val>
+                                            <p:strVal val="ppt_x"/>
+                                          </p:val>
+                                        </p:tav>
+                                        <p:tav tm="100000">
+                                          <p:val>
+                                            <p:strVal val="ppt_x"/>
+                                          </p:val>
+                                        </p:tav>
+                                      </p:tavLst>
+                                    </p:anim>
+                                    <p:anim calcmode="lin" valueType="num">
+                                      <p:cBhvr additive="base">
+                                        <p:cTn id="13" dur="500"/>
+                                        <p:tgtEl>
+                                          <p:spTgt spid="3">
+                                            <p:txEl>
+                                              <p:pRg st="0" end="0"/>
+                                            </p:txEl>
+                                          </p:spTgt>
+                                        </p:tgtEl>
+                                        <p:attrNameLst>
+                                          <p:attrName>ppt_y</p:attrName>
+                                        </p:attrNameLst>
+                                      </p:cBhvr>
+                                      <p:tavLst>
+                                        <p:tav tm="0">
+                                          <p:val>
+                                            <p:strVal val="ppt_y"/>
+                                          </p:val>
+                                        </p:tav>
+                                        <p:tav tm="100000">
+                                          <p:val>
+                                            <p:strVal val="1+ppt_h/2"/>
+                                          </p:val>
+                                        </p:tav>
+                                      </p:tavLst>
+                                    </p:anim>
+                                    <p:set>
+                                      <p:cBhvr>
+                                        <p:cTn id="14" dur="1" fill="hold">
+                                          <p:stCondLst>
+                                            <p:cond delay="499"/>
+                                          </p:stCondLst>
+                                        </p:cTn>
+                                        <p:tgtEl>
+                                          <p:spTgt spid="3">
+                                            <p:txEl>
+                                              <p:pRg st="0" end="0"/>
+                                            </p:txEl>
+                                          </p:spTgt>
+                                        </p:tgtEl>
+                                        <p:attrNameLst>
+                                          <p:attrName>style.visibility</p:attrName>
+                                        </p:attrNameLst>
+                                      </p:cBhvr>
+                                      <p:to>
+                                        <p:strVal val="hidden"/>
+                                      </p:to>
+                                    </p:set>
+                                  </p:childTnLst>
+                                </p:cTn>
+                              </p:par>
+                              <p:par>
+                                <p:cTn id="15" presetID="2" presetClass="exit" presetSubtype="4" fill="hold" grpId="0" nodeType="withEffect">
+                                  <p:stCondLst>
+                                    <p:cond delay="0"/>
+                                  </p:stCondLst>
+                                  <p:childTnLst>
+                                    <p:anim calcmode="lin" valueType="num">
+                                      <p:cBhvr additive="base">
+                                        <p:cTn id="16" dur="500"/>
+                                        <p:tgtEl>
+                                          <p:spTgt spid="3">
+                                            <p:txEl>
+                                              <p:pRg st="1" end="1"/>
+                                            </p:txEl>
+                                          </p:spTgt>
+                                        </p:tgtEl>
+                                        <p:attrNameLst>
+                                          <p:attrName>ppt_x</p:attrName>
+                                        </p:attrNameLst>
+                                      </p:cBhvr>
+                                      <p:tavLst>
+                                        <p:tav tm="0">
+                                          <p:val>
+                                            <p:strVal val="ppt_x"/>
+                                          </p:val>
+                                        </p:tav>
+                                        <p:tav tm="100000">
+                                          <p:val>
+                                            <p:strVal val="ppt_x"/>
+                                          </p:val>
+                                        </p:tav>
+                                      </p:tavLst>
+                                    </p:anim>
+                                    <p:anim calcmode="lin" valueType="num">
+                                      <p:cBhvr additive="base">
+                                        <p:cTn id="17" dur="500"/>
+                                        <p:tgtEl>
+                                          <p:spTgt spid="3">
+                                            <p:txEl>
+                                              <p:pRg st="1" end="1"/>
+                                            </p:txEl>
+                                          </p:spTgt>
+                                        </p:tgtEl>
+                                        <p:attrNameLst>
+                                          <p:attrName>ppt_y</p:attrName>
+                                        </p:attrNameLst>
+                                      </p:cBhvr>
+                                      <p:tavLst>
+                                        <p:tav tm="0">
+                                          <p:val>
+                                            <p:strVal val="ppt_y"/>
+                                          </p:val>
+                                        </p:tav>
+                                        <p:tav tm="100000">
+                                          <p:val>
+                                            <p:strVal val="1+ppt_h/2"/>
+                                          </p:val>
+                                        </p:tav>
+                                      </p:tavLst>
+                                    </p:anim>
+                                    <p:set>
+                                      <p:cBhvr>
+                                        <p:cTn id="18" dur="1" fill="hold">
+                                          <p:stCondLst>
+                                            <p:cond delay="499"/>
+                                          </p:stCondLst>
+                                        </p:cTn>
+                                        <p:tgtEl>
+                                          <p:spTgt spid="3">
+                                            <p:txEl>
+                                              <p:pRg st="1" end="1"/>
+                                            </p:txEl>
+                                          </p:spTgt>
+                                        </p:tgtEl>
+                                        <p:attrNameLst>
+                                          <p:attrName>style.visibility</p:attrName>
+                                        </p:attrNameLst>
+                                      </p:cBhvr>
+                                      <p:to>
+                                        <p:strVal val="hidden"/>
+                                      </p:to>
+                                    </p:set>
+                                  </p:childTnLst>
+                                </p:cTn>
+                              </p:par>
+                              <p:par>
+                                <p:cTn id="19" presetID="2" presetClass="exit" presetSubtype="4" fill="hold" grpId="0" nodeType="withEffect">
+                                  <p:stCondLst>
+                                    <p:cond delay="0"/>
+                                  </p:stCondLst>
+                                  <p:childTnLst>
+                                    <p:anim calcmode="lin" valueType="num">
+                                      <p:cBhvr additive="base">
+                                        <p:cTn id="20" dur="500"/>
+                                        <p:tgtEl>
+                                          <p:spTgt spid="3">
+                                            <p:txEl>
+                                              <p:pRg st="2" end="2"/>
+                                            </p:txEl>
+                                          </p:spTgt>
+                                        </p:tgtEl>
+                                        <p:attrNameLst>
+                                          <p:attrName>ppt_x</p:attrName>
+                                        </p:attrNameLst>
+                                      </p:cBhvr>
+                                      <p:tavLst>
+                                        <p:tav tm="0">
+                                          <p:val>
+                                            <p:strVal val="ppt_x"/>
+                                          </p:val>
+                                        </p:tav>
+                                        <p:tav tm="100000">
+                                          <p:val>
+                                            <p:strVal val="ppt_x"/>
+                                          </p:val>
+                                        </p:tav>
+                                      </p:tavLst>
+                                    </p:anim>
+                                    <p:anim calcmode="lin" valueType="num">
+                                      <p:cBhvr additive="base">
+                                        <p:cTn id="21" dur="500"/>
+                                        <p:tgtEl>
+                                          <p:spTgt spid="3">
+                                            <p:txEl>
+                                              <p:pRg st="2" end="2"/>
+                                            </p:txEl>
+                                          </p:spTgt>
+                                        </p:tgtEl>
+                                        <p:attrNameLst>
+                                          <p:attrName>ppt_y</p:attrName>
+                                        </p:attrNameLst>
+                                      </p:cBhvr>
+                                      <p:tavLst>
+                                        <p:tav tm="0">
+                                          <p:val>
+                                            <p:strVal val="ppt_y"/>
+                                          </p:val>
+                                        </p:tav>
+                                        <p:tav tm="100000">
+                                          <p:val>
+                                            <p:strVal val="1+ppt_h/2"/>
+                                          </p:val>
+                                        </p:tav>
+                                      </p:tavLst>
+                                    </p:anim>
+                                    <p:set>
+                                      <p:cBhvr>
+                                        <p:cTn id="22" dur="1" fill="hold">
+                                          <p:stCondLst>
+                                            <p:cond delay="499"/>
+                                          </p:stCondLst>
+                                        </p:cTn>
+                                        <p:tgtEl>
+                                          <p:spTgt spid="3">
+                                            <p:txEl>
+                                              <p:pRg st="2" end="2"/>
+                                            </p:txEl>
+                                          </p:spTgt>
+                                        </p:tgtEl>
+                                        <p:attrNameLst>
+                                          <p:attrName>style.visibility</p:attrName>
+                                        </p:attrNameLst>
+                                      </p:cBhvr>
+                                      <p:to>
+                                        <p:strVal val="hidden"/>
+                                      </p:to>
+                                    </p:set>
+                                  </p:childTnLst>
+                                </p:cTn>
+                              </p:par>
+                              <p:par>
+                                <p:cTn id="23" presetID="2" presetClass="exit" presetSubtype="4" fill="hold" grpId="0" nodeType="withEffect">
+                                  <p:stCondLst>
+                                    <p:cond delay="0"/>
+                                  </p:stCondLst>
+                                  <p:childTnLst>
+                                    <p:anim calcmode="lin" valueType="num">
+                                      <p:cBhvr additive="base">
+                                        <p:cTn id="24" dur="500"/>
+                                        <p:tgtEl>
+                                          <p:spTgt spid="3">
+                                            <p:txEl>
+                                              <p:pRg st="3" end="3"/>
+                                            </p:txEl>
+                                          </p:spTgt>
+                                        </p:tgtEl>
+                                        <p:attrNameLst>
+                                          <p:attrName>ppt_x</p:attrName>
+                                        </p:attrNameLst>
+                                      </p:cBhvr>
+                                      <p:tavLst>
+                                        <p:tav tm="0">
+                                          <p:val>
+                                            <p:strVal val="ppt_x"/>
+                                          </p:val>
+                                        </p:tav>
+                                        <p:tav tm="100000">
+                                          <p:val>
+                                            <p:strVal val="ppt_x"/>
+                                          </p:val>
+                                        </p:tav>
+                                      </p:tavLst>
+                                    </p:anim>
+                                    <p:anim calcmode="lin" valueType="num">
+                                      <p:cBhvr additive="base">
+                                        <p:cTn id="25" dur="500"/>
+                                        <p:tgtEl>
+                                          <p:spTgt spid="3">
+                                            <p:txEl>
+                                              <p:pRg st="3" end="3"/>
+                                            </p:txEl>
+                                          </p:spTgt>
+                                        </p:tgtEl>
+                                        <p:attrNameLst>
+                                          <p:attrName>ppt_y</p:attrName>
+                                        </p:attrNameLst>
+                                      </p:cBhvr>
+                                      <p:tavLst>
+                                        <p:tav tm="0">
+                                          <p:val>
+                                            <p:strVal val="ppt_y"/>
+                                          </p:val>
+                                        </p:tav>
+                                        <p:tav tm="100000">
+                                          <p:val>
+                                            <p:strVal val="1+ppt_h/2"/>
+                                          </p:val>
+                                        </p:tav>
+                                      </p:tavLst>
+                                    </p:anim>
+                                    <p:set>
+                                      <p:cBhvr>
+                                        <p:cTn id="26" dur="1" fill="hold">
+                                          <p:stCondLst>
+                                            <p:cond delay="499"/>
+                                          </p:stCondLst>
+                                        </p:cTn>
+                                        <p:tgtEl>
+                                          <p:spTgt spid="3">
+                                            <p:txEl>
+                                              <p:pRg st="3" end="3"/>
+                                            </p:txEl>
+                                          </p:spTgt>
+                                        </p:tgtEl>
+                                        <p:attrNameLst>
+                                          <p:attrName>style.visibility</p:attrName>
+                                        </p:attrNameLst>
+                                      </p:cBhvr>
+                                      <p:to>
+                                        <p:strVal val="hidden"/>
+                                      </p:to>
+                                    </p:set>
+                                  </p:childTnLst>
+                                </p:cTn>
+                              </p:par>
+                              <p:par>
+                                <p:cTn id="27" presetID="2" presetClass="exit" presetSubtype="4" fill="hold" grpId="0" nodeType="withEffect">
+                                  <p:stCondLst>
+                                    <p:cond delay="0"/>
+                                  </p:stCondLst>
+                                  <p:childTnLst>
+                                    <p:anim calcmode="lin" valueType="num">
+                                      <p:cBhvr additive="base">
+                                        <p:cTn id="28" dur="500"/>
+                                        <p:tgtEl>
+                                          <p:spTgt spid="3">
+                                            <p:txEl>
+                                              <p:pRg st="5" end="5"/>
+                                            </p:txEl>
+                                          </p:spTgt>
+                                        </p:tgtEl>
+                                        <p:attrNameLst>
+                                          <p:attrName>ppt_x</p:attrName>
+                                        </p:attrNameLst>
+                                      </p:cBhvr>
+                                      <p:tavLst>
+                                        <p:tav tm="0">
+                                          <p:val>
+                                            <p:strVal val="ppt_x"/>
+                                          </p:val>
+                                        </p:tav>
+                                        <p:tav tm="100000">
+                                          <p:val>
+                                            <p:strVal val="ppt_x"/>
+                                          </p:val>
+                                        </p:tav>
+                                      </p:tavLst>
+                                    </p:anim>
+                                    <p:anim calcmode="lin" valueType="num">
+                                      <p:cBhvr additive="base">
+                                        <p:cTn id="29" dur="500"/>
+                                        <p:tgtEl>
+                                          <p:spTgt spid="3">
+                                            <p:txEl>
+                                              <p:pRg st="5" end="5"/>
+                                            </p:txEl>
+                                          </p:spTgt>
+                                        </p:tgtEl>
+                                        <p:attrNameLst>
+                                          <p:attrName>ppt_y</p:attrName>
+                                        </p:attrNameLst>
+                                      </p:cBhvr>
+                                      <p:tavLst>
+                                        <p:tav tm="0">
+                                          <p:val>
+                                            <p:strVal val="ppt_y"/>
+                                          </p:val>
+                                        </p:tav>
+                                        <p:tav tm="100000">
+                                          <p:val>
+                                            <p:strVal val="1+ppt_h/2"/>
+                                          </p:val>
+                                        </p:tav>
+                                      </p:tavLst>
+                                    </p:anim>
+                                    <p:set>
+                                      <p:cBhvr>
+                                        <p:cTn id="30" dur="1" fill="hold">
+                                          <p:stCondLst>
+                                            <p:cond delay="499"/>
+                                          </p:stCondLst>
+                                        </p:cTn>
+                                        <p:tgtEl>
+                                          <p:spTgt spid="3">
+                                            <p:txEl>
+                                              <p:pRg st="5" end="5"/>
+                                            </p:txEl>
+                                          </p:spTgt>
+                                        </p:tgtEl>
+                                        <p:attrNameLst>
+                                          <p:attrName>style.visibility</p:attrName>
+                                        </p:attrNameLst>
+                                      </p:cBhvr>
+                                      <p:to>
+                                        <p:strVal val="hidden"/>
+                                      </p:to>
+                                    </p:set>
+                                  </p:childTnLst>
+                                </p:cTn>
+                              </p:par>
+                              <p:par>
+                                <p:cTn id="31" presetID="2" presetClass="exit" presetSubtype="4" fill="hold" grpId="0" nodeType="withEffect">
+                                  <p:stCondLst>
+                                    <p:cond delay="0"/>
+                                  </p:stCondLst>
+                                  <p:childTnLst>
+                                    <p:anim calcmode="lin" valueType="num">
+                                      <p:cBhvr additive="base">
+                                        <p:cTn id="32" dur="500"/>
+                                        <p:tgtEl>
+                                          <p:spTgt spid="3">
+                                            <p:txEl>
+                                              <p:pRg st="6" end="6"/>
+                                            </p:txEl>
+                                          </p:spTgt>
+                                        </p:tgtEl>
+                                        <p:attrNameLst>
+                                          <p:attrName>ppt_x</p:attrName>
+                                        </p:attrNameLst>
+                                      </p:cBhvr>
+                                      <p:tavLst>
+                                        <p:tav tm="0">
+                                          <p:val>
+                                            <p:strVal val="ppt_x"/>
+                                          </p:val>
+                                        </p:tav>
+                                        <p:tav tm="100000">
+                                          <p:val>
+                                            <p:strVal val="ppt_x"/>
+                                          </p:val>
+                                        </p:tav>
+                                      </p:tavLst>
+                                    </p:anim>
+                                    <p:anim calcmode="lin" valueType="num">
+                                      <p:cBhvr additive="base">
+                                        <p:cTn id="33" dur="500"/>
+                                        <p:tgtEl>
+                                          <p:spTgt spid="3">
+                                            <p:txEl>
+                                              <p:pRg st="6" end="6"/>
+                                            </p:txEl>
+                                          </p:spTgt>
+                                        </p:tgtEl>
+                                        <p:attrNameLst>
+                                          <p:attrName>ppt_y</p:attrName>
+                                        </p:attrNameLst>
+                                      </p:cBhvr>
+                                      <p:tavLst>
+                                        <p:tav tm="0">
+                                          <p:val>
+                                            <p:strVal val="ppt_y"/>
+                                          </p:val>
+                                        </p:tav>
+                                        <p:tav tm="100000">
+                                          <p:val>
+                                            <p:strVal val="1+ppt_h/2"/>
+                                          </p:val>
+                                        </p:tav>
+                                      </p:tavLst>
+                                    </p:anim>
+                                    <p:set>
+                                      <p:cBhvr>
+                                        <p:cTn id="34" dur="1" fill="hold">
+                                          <p:stCondLst>
+                                            <p:cond delay="499"/>
+                                          </p:stCondLst>
+                                        </p:cTn>
+                                        <p:tgtEl>
+                                          <p:spTgt spid="3">
+                                            <p:txEl>
+                                              <p:pRg st="6" end="6"/>
+                                            </p:txEl>
+                                          </p:spTgt>
+                                        </p:tgtEl>
+                                        <p:attrNameLst>
+                                          <p:attrName>style.visibility</p:attrName>
+                                        </p:attrNameLst>
+                                      </p:cBhvr>
+                                      <p:to>
+                                        <p:strVal val="hidden"/>
+                                      </p:to>
+                                    </p:set>
+                                  </p:childTnLst>
+                                </p:cTn>
+                              </p:par>
+                              <p:par>
+                                <p:cTn id="35" presetID="2" presetClass="exit" presetSubtype="4" fill="hold" grpId="0" nodeType="withEffect">
+                                  <p:stCondLst>
+                                    <p:cond delay="0"/>
+                                  </p:stCondLst>
+                                  <p:childTnLst>
+                                    <p:anim calcmode="lin" valueType="num">
+                                      <p:cBhvr additive="base">
+                                        <p:cTn id="36" dur="500"/>
+                                        <p:tgtEl>
+                                          <p:spTgt spid="3">
+                                            <p:txEl>
+                                              <p:pRg st="7" end="7"/>
+                                            </p:txEl>
+                                          </p:spTgt>
+                                        </p:tgtEl>
+                                        <p:attrNameLst>
+                                          <p:attrName>ppt_x</p:attrName>
+                                        </p:attrNameLst>
+                                      </p:cBhvr>
+                                      <p:tavLst>
+                                        <p:tav tm="0">
+                                          <p:val>
+                                            <p:strVal val="ppt_x"/>
+                                          </p:val>
+                                        </p:tav>
+                                        <p:tav tm="100000">
+                                          <p:val>
+                                            <p:strVal val="ppt_x"/>
+                                          </p:val>
+                                        </p:tav>
+                                      </p:tavLst>
+                                    </p:anim>
+                                    <p:anim calcmode="lin" valueType="num">
+                                      <p:cBhvr additive="base">
+                                        <p:cTn id="37" dur="500"/>
+                                        <p:tgtEl>
+                                          <p:spTgt spid="3">
+                                            <p:txEl>
+                                              <p:pRg st="7" end="7"/>
+                                            </p:txEl>
+                                          </p:spTgt>
+                                        </p:tgtEl>
+                                        <p:attrNameLst>
+                                          <p:attrName>ppt_y</p:attrName>
+                                        </p:attrNameLst>
+                                      </p:cBhvr>
+                                      <p:tavLst>
+                                        <p:tav tm="0">
+                                          <p:val>
+                                            <p:strVal val="ppt_y"/>
+                                          </p:val>
+                                        </p:tav>
+                                        <p:tav tm="100000">
+                                          <p:val>
+                                            <p:strVal val="1+ppt_h/2"/>
+                                          </p:val>
+                                        </p:tav>
+                                      </p:tavLst>
+                                    </p:anim>
+                                    <p:set>
+                                      <p:cBhvr>
+                                        <p:cTn id="38" dur="1" fill="hold">
+                                          <p:stCondLst>
+                                            <p:cond delay="499"/>
+                                          </p:stCondLst>
+                                        </p:cTn>
+                                        <p:tgtEl>
+                                          <p:spTgt spid="3">
+                                            <p:txEl>
+                                              <p:pRg st="7" end="7"/>
+                                            </p:txEl>
+                                          </p:spTgt>
+                                        </p:tgtEl>
+                                        <p:attrNameLst>
+                                          <p:attrName>style.visibility</p:attrName>
+                                        </p:attrNameLst>
+                                      </p:cBhvr>
+                                      <p:to>
+                                        <p:strVal val="hidden"/>
+                                      </p:to>
+                                    </p:set>
+                                  </p:childTnLst>
+                                </p:cTn>
+                              </p:par>
+                            </p:childTnLst>
+                          </p:cTn>
+                        </p:par>
+                      </p:childTnLst>
+                    </p:cTn>
+                  </p:par>
+                </p:childTnLst>
+              </p:cTn>
+              <p:prevCondLst>
+                <p:cond evt="onPrev" delay="0">
+                  <p:tgtEl>
+                    <p:sldTgt/>
+                  </p:tgtEl>
+                </p:cond>
+              </p:prevCondLst>
+              <p:nextCondLst>
+                <p:cond evt="onNext" delay="0">
+                  <p:tgtEl>
+                    <p:sldTgt/>
+                  </p:tgtEl>
+                </p:cond>
+              </p:nextCondLst>
+            </p:seq>
+          </p:childTnLst>
+        </p:cTn>
+      </p:par>
+    </p:tnLst>
+    <p:bldLst>
+      <p:bldP spid="3" grpId="0" build="p"/>
+    </p:bldLst>
+  </p:timing>
+</p:sld>
+</file>
+
+<file path=ppt/slides/slide11.xml><?xml version="1.0" encoding="utf-8"?>
+<p:sld xmlns:a="http://schemas.openxmlformats.org/drawingml/2006/main" xmlns:r="http://schemas.openxmlformats.org/officeDocument/2006/relationships" xmlns:p="http://schemas.openxmlformats.org/presentationml/2006/main">
+  <p:cSld>
+    <p:spTree>
+      <p:nvGrpSpPr>
+        <p:cNvPr id="1" name=""/>
+        <p:cNvGrpSpPr/>
+        <p:nvPr/>
+      </p:nvGrpSpPr>
+      <p:grpSpPr>
+        <a:xfrm>
+          <a:off x="0" y="0"/>
+          <a:ext cx="0" cy="0"/>
+          <a:chOff x="0" y="0"/>
+          <a:chExt cx="0" cy="0"/>
+        </a:xfrm>
+      </p:grpSpPr>
+      <p:sp>
+        <p:nvSpPr>
+          <p:cNvPr id="2" name="1 Título"/>
+          <p:cNvSpPr>
+            <a:spLocks noGrp="1"/>
+          </p:cNvSpPr>
+          <p:nvPr>
+            <p:ph type="title"/>
+          </p:nvPr>
+        </p:nvSpPr>
+        <p:spPr/>
+        <p:txBody>
+          <a:bodyPr/>
+          <a:lstStyle/>
+          <a:p>
+            <a:r>
+              <a:rPr lang="es-ES" dirty="0" smtClean="0"/>
+              <a:t>QMP</a:t>
+            </a:r>
+            <a:endParaRPr lang="es-ES" dirty="0"/>
+          </a:p>
+        </p:txBody>
+      </p:sp>
+      <p:sp>
+        <p:nvSpPr>
+          <p:cNvPr id="3" name="2 Marcador de contenido"/>
+          <p:cNvSpPr>
+            <a:spLocks noGrp="1"/>
+          </p:cNvSpPr>
+          <p:nvPr>
+            <p:ph idx="1"/>
+          </p:nvPr>
+        </p:nvSpPr>
+        <p:spPr/>
+        <p:txBody>
+          <a:bodyPr/>
+          <a:lstStyle/>
+          <a:p>
+            <a:pPr>
+              <a:buNone/>
+            </a:pPr>
+            <a:r>
+              <a:rPr lang="en-US" b="1" dirty="0" smtClean="0"/>
+              <a:t>Dynamic Routing Protocol</a:t>
+            </a:r>
+          </a:p>
+          <a:p>
+            <a:r>
+              <a:rPr lang="en-US" dirty="0" smtClean="0"/>
+              <a:t>The QMP firmware, uses the following protocols:</a:t>
+            </a:r>
+          </a:p>
+          <a:p>
+            <a:pPr lvl="1"/>
+            <a:r>
+              <a:rPr lang="en-US" dirty="0" smtClean="0"/>
+              <a:t> BMX6 as the main DRP.</a:t>
+            </a:r>
+          </a:p>
+          <a:p>
+            <a:pPr lvl="1"/>
+            <a:r>
+              <a:rPr lang="en-US" dirty="0" smtClean="0"/>
+              <a:t> OLSR6 as a backup DRP.</a:t>
+            </a:r>
+          </a:p>
+          <a:p>
+            <a:pPr lvl="1"/>
+            <a:r>
+              <a:rPr lang="en-US" dirty="0" smtClean="0"/>
+              <a:t> Babel as a backup DRP but optional.</a:t>
+            </a:r>
+          </a:p>
+          <a:p>
+            <a:endParaRPr lang="en-US" dirty="0" smtClean="0"/>
+          </a:p>
+          <a:p>
+            <a:r>
+              <a:rPr lang="en-US" dirty="0" smtClean="0"/>
+              <a:t>All three use IPv6 ULA to talk to other nodes and are isolated at the link layer (MAC) using VLANs.</a:t>
+            </a:r>
+            <a:endParaRPr lang="en-US" dirty="0"/>
+          </a:p>
+        </p:txBody>
+      </p:sp>
+      <p:sp>
+        <p:nvSpPr>
+          <p:cNvPr id="4" name="3 Marcador de número de diapositiva"/>
+          <p:cNvSpPr>
+            <a:spLocks noGrp="1"/>
+          </p:cNvSpPr>
+          <p:nvPr>
+            <p:ph type="sldNum" sz="quarter" idx="12"/>
+          </p:nvPr>
+        </p:nvSpPr>
+        <p:spPr/>
+        <p:txBody>
+          <a:bodyPr/>
+          <a:lstStyle/>
+          <a:p>
+            <a:fld id="{DA3FA644-4273-4B12-888A-E74B32B8A478}" type="slidenum">
+              <a:rPr lang="ru-RU" smtClean="0"/>
+              <a:pPr/>
+              <a:t>11</a:t>
             </a:fld>
             <a:endParaRPr lang="ru-RU"/>
           </a:p>
@@ -3891,7 +4836,7 @@
 </p:sld>
 </file>
 
-<file path=ppt/slides/slide11.xml><?xml version="1.0" encoding="utf-8"?>
+<file path=ppt/slides/slide12.xml><?xml version="1.0" encoding="utf-8"?>
 <p:sld xmlns:a="http://schemas.openxmlformats.org/drawingml/2006/main" xmlns:r="http://schemas.openxmlformats.org/officeDocument/2006/relationships" xmlns:p="http://schemas.openxmlformats.org/presentationml/2006/main">
   <p:cSld>
     <p:spTree>
@@ -4530,7 +5475,7 @@
             <a:fld id="{DA3FA644-4273-4B12-888A-E74B32B8A478}" type="slidenum">
               <a:rPr lang="ru-RU" smtClean="0"/>
               <a:pPr/>
-              <a:t>11</a:t>
+              <a:t>12</a:t>
             </a:fld>
             <a:endParaRPr lang="ru-RU"/>
           </a:p>
@@ -5442,7 +6387,7 @@
 </p:sld>
 </file>
 
-<file path=ppt/slides/slide12.xml><?xml version="1.0" encoding="utf-8"?>
+<file path=ppt/slides/slide13.xml><?xml version="1.0" encoding="utf-8"?>
 <p:sld xmlns:a="http://schemas.openxmlformats.org/drawingml/2006/main" xmlns:r="http://schemas.openxmlformats.org/officeDocument/2006/relationships" xmlns:p="http://schemas.openxmlformats.org/presentationml/2006/main">
   <p:cSld>
     <p:spTree>
@@ -5580,7 +6525,7 @@
             <a:fld id="{DA3FA644-4273-4B12-888A-E74B32B8A478}" type="slidenum">
               <a:rPr lang="ru-RU" smtClean="0"/>
               <a:pPr/>
-              <a:t>12</a:t>
+              <a:t>13</a:t>
             </a:fld>
             <a:endParaRPr lang="ru-RU"/>
           </a:p>
@@ -6368,231 +7313,6 @@
 </p:sld>
 </file>
 
-<file path=ppt/slides/slide13.xml><?xml version="1.0" encoding="utf-8"?>
-<p:sld xmlns:a="http://schemas.openxmlformats.org/drawingml/2006/main" xmlns:r="http://schemas.openxmlformats.org/officeDocument/2006/relationships" xmlns:p="http://schemas.openxmlformats.org/presentationml/2006/main">
-  <p:cSld>
-    <p:spTree>
-      <p:nvGrpSpPr>
-        <p:cNvPr id="1" name=""/>
-        <p:cNvGrpSpPr/>
-        <p:nvPr/>
-      </p:nvGrpSpPr>
-      <p:grpSpPr>
-        <a:xfrm>
-          <a:off x="0" y="0"/>
-          <a:ext cx="0" cy="0"/>
-          <a:chOff x="0" y="0"/>
-          <a:chExt cx="0" cy="0"/>
-        </a:xfrm>
-      </p:grpSpPr>
-      <p:sp>
-        <p:nvSpPr>
-          <p:cNvPr id="2" name="1 Título"/>
-          <p:cNvSpPr>
-            <a:spLocks noGrp="1"/>
-          </p:cNvSpPr>
-          <p:nvPr>
-            <p:ph type="title"/>
-          </p:nvPr>
-        </p:nvSpPr>
-        <p:spPr/>
-        <p:txBody>
-          <a:bodyPr/>
-          <a:lstStyle/>
-          <a:p>
-            <a:r>
-              <a:rPr lang="en-US" dirty="0" smtClean="0"/>
-              <a:t>Information Sources</a:t>
-            </a:r>
-            <a:endParaRPr lang="en-US" dirty="0"/>
-          </a:p>
-        </p:txBody>
-      </p:sp>
-      <p:sp>
-        <p:nvSpPr>
-          <p:cNvPr id="3" name="2 Marcador de contenido"/>
-          <p:cNvSpPr>
-            <a:spLocks noGrp="1"/>
-          </p:cNvSpPr>
-          <p:nvPr>
-            <p:ph idx="1"/>
-          </p:nvPr>
-        </p:nvSpPr>
-        <p:spPr/>
-        <p:txBody>
-          <a:bodyPr>
-            <a:normAutofit/>
-          </a:bodyPr>
-          <a:lstStyle/>
-          <a:p>
-            <a:r>
-              <a:rPr lang="en-US" sz="2000" dirty="0" err="1" smtClean="0"/>
-              <a:t>Escrich</a:t>
-            </a:r>
-            <a:r>
-              <a:rPr lang="en-US" sz="2000" dirty="0" smtClean="0"/>
-              <a:t>, P. (2012, January). Quick deployment network using MANET. Retrieved March 4, 2013</a:t>
-            </a:r>
-          </a:p>
-          <a:p>
-            <a:r>
-              <a:rPr lang="es-ES" sz="2000" dirty="0" err="1" smtClean="0"/>
-              <a:t>Escrich</a:t>
-            </a:r>
-            <a:r>
-              <a:rPr lang="es-ES" sz="2000" dirty="0" smtClean="0"/>
-              <a:t>, P. (2012, </a:t>
-            </a:r>
-            <a:r>
-              <a:rPr lang="es-ES" sz="2000" dirty="0" err="1" smtClean="0"/>
-              <a:t>November</a:t>
-            </a:r>
-            <a:r>
-              <a:rPr lang="es-ES" sz="2000" dirty="0" smtClean="0"/>
-              <a:t> 17). </a:t>
-            </a:r>
-            <a:r>
-              <a:rPr lang="es-ES" sz="2000" dirty="0" err="1" smtClean="0"/>
-              <a:t>Xarxes</a:t>
-            </a:r>
-            <a:r>
-              <a:rPr lang="es-ES" sz="2000" dirty="0" smtClean="0"/>
-              <a:t> </a:t>
-            </a:r>
-            <a:r>
-              <a:rPr lang="es-ES" sz="2000" dirty="0" err="1" smtClean="0"/>
-              <a:t>Mesh</a:t>
-            </a:r>
-            <a:r>
-              <a:rPr lang="es-ES" sz="2000" dirty="0" smtClean="0"/>
-              <a:t>. </a:t>
-            </a:r>
-            <a:r>
-              <a:rPr lang="es-ES" sz="2000" dirty="0" err="1" smtClean="0"/>
-              <a:t>Curs</a:t>
-            </a:r>
-            <a:r>
-              <a:rPr lang="es-ES" sz="2000" dirty="0" smtClean="0"/>
-              <a:t> Guifi.net 2012. </a:t>
-            </a:r>
-            <a:r>
-              <a:rPr lang="es-ES" sz="2000" dirty="0" err="1" smtClean="0"/>
-              <a:t>Retrieved</a:t>
-            </a:r>
-            <a:r>
-              <a:rPr lang="es-ES" sz="2000" dirty="0" smtClean="0"/>
-              <a:t> </a:t>
-            </a:r>
-            <a:r>
-              <a:rPr lang="es-ES" sz="2000" dirty="0" err="1" smtClean="0"/>
-              <a:t>March</a:t>
-            </a:r>
-            <a:r>
-              <a:rPr lang="es-ES" sz="2000" dirty="0" smtClean="0"/>
-              <a:t> 5, 2013</a:t>
-            </a:r>
-          </a:p>
-          <a:p>
-            <a:r>
-              <a:rPr lang="en-US" sz="2000" dirty="0" smtClean="0"/>
-              <a:t>Mobile ad hoc network. (</a:t>
-            </a:r>
-            <a:r>
-              <a:rPr lang="en-US" sz="2000" dirty="0" err="1" smtClean="0"/>
-              <a:t>n.d</a:t>
-            </a:r>
-            <a:r>
-              <a:rPr lang="en-US" sz="2000" dirty="0" smtClean="0"/>
-              <a:t>.). In </a:t>
-            </a:r>
-            <a:r>
-              <a:rPr lang="en-US" sz="2000" i="1" dirty="0" smtClean="0"/>
-              <a:t>Wikipedia</a:t>
-            </a:r>
-            <a:r>
-              <a:rPr lang="en-US" sz="2000" dirty="0" smtClean="0"/>
-              <a:t>. Retrieved March 4, 2013, from http://en.wikipedia.org/wiki/Mobile_ad_hoc_network</a:t>
-            </a:r>
-          </a:p>
-          <a:p>
-            <a:r>
-              <a:rPr lang="en-US" sz="2000" dirty="0" smtClean="0"/>
-              <a:t>Starting a Community. (2013, January 11). In </a:t>
-            </a:r>
-            <a:r>
-              <a:rPr lang="en-US" sz="2000" i="1" dirty="0" smtClean="0"/>
-              <a:t>Quick Mesh Project</a:t>
-            </a:r>
-            <a:r>
-              <a:rPr lang="en-US" sz="2000" dirty="0" smtClean="0"/>
-              <a:t>. Retrieved March 5, 2013, from http://qmp.cat/projects/qmp/wiki/Starting </a:t>
-            </a:r>
-          </a:p>
-          <a:p>
-            <a:r>
-              <a:rPr lang="en-US" sz="2000" dirty="0" smtClean="0"/>
-              <a:t>Roaming-Community/Collaborative. (2012, June 26). In </a:t>
-            </a:r>
-            <a:r>
-              <a:rPr lang="en-US" sz="2000" i="1" dirty="0" smtClean="0"/>
-              <a:t>Quick Mesh Project</a:t>
-            </a:r>
-            <a:r>
-              <a:rPr lang="en-US" sz="2000" dirty="0" smtClean="0"/>
-              <a:t>. Retrieved March 5, 2013, from http://qmp.cat/projects/qmp/wiki/Roaming-Collaborative </a:t>
-            </a:r>
-          </a:p>
-          <a:p>
-            <a:r>
-              <a:rPr lang="en-US" sz="2000" dirty="0" smtClean="0"/>
-              <a:t>QMP users mailing list</a:t>
-            </a:r>
-            <a:br>
-              <a:rPr lang="en-US" sz="2000" dirty="0" smtClean="0"/>
-            </a:br>
-            <a:endParaRPr lang="es-ES" sz="2000" dirty="0"/>
-          </a:p>
-        </p:txBody>
-      </p:sp>
-      <p:sp>
-        <p:nvSpPr>
-          <p:cNvPr id="4" name="3 Marcador de número de diapositiva"/>
-          <p:cNvSpPr>
-            <a:spLocks noGrp="1"/>
-          </p:cNvSpPr>
-          <p:nvPr>
-            <p:ph type="sldNum" sz="quarter" idx="12"/>
-          </p:nvPr>
-        </p:nvSpPr>
-        <p:spPr/>
-        <p:txBody>
-          <a:bodyPr/>
-          <a:lstStyle/>
-          <a:p>
-            <a:fld id="{DA3FA644-4273-4B12-888A-E74B32B8A478}" type="slidenum">
-              <a:rPr lang="ru-RU" smtClean="0"/>
-              <a:pPr/>
-              <a:t>13</a:t>
-            </a:fld>
-            <a:endParaRPr lang="ru-RU"/>
-          </a:p>
-        </p:txBody>
-      </p:sp>
-    </p:spTree>
-  </p:cSld>
-  <p:clrMapOvr>
-    <a:masterClrMapping/>
-  </p:clrMapOvr>
-  <p:timing>
-    <p:tnLst>
-      <p:par>
-        <p:cTn id="1" dur="indefinite" restart="never" nodeType="tmRoot"/>
-      </p:par>
-    </p:tnLst>
-  </p:timing>
-</p:sld>
-</file>
-
 <file path=ppt/slides/slide14.xml><?xml version="1.0" encoding="utf-8"?>
 <p:sld xmlns:a="http://schemas.openxmlformats.org/drawingml/2006/main" xmlns:r="http://schemas.openxmlformats.org/officeDocument/2006/relationships" xmlns:p="http://schemas.openxmlformats.org/presentationml/2006/main">
   <p:cSld>
@@ -6612,6 +7332,231 @@
       </p:grpSpPr>
       <p:sp>
         <p:nvSpPr>
+          <p:cNvPr id="2" name="1 Título"/>
+          <p:cNvSpPr>
+            <a:spLocks noGrp="1"/>
+          </p:cNvSpPr>
+          <p:nvPr>
+            <p:ph type="title"/>
+          </p:nvPr>
+        </p:nvSpPr>
+        <p:spPr/>
+        <p:txBody>
+          <a:bodyPr/>
+          <a:lstStyle/>
+          <a:p>
+            <a:r>
+              <a:rPr lang="en-US" dirty="0" smtClean="0"/>
+              <a:t>Information Sources</a:t>
+            </a:r>
+            <a:endParaRPr lang="en-US" dirty="0"/>
+          </a:p>
+        </p:txBody>
+      </p:sp>
+      <p:sp>
+        <p:nvSpPr>
+          <p:cNvPr id="3" name="2 Marcador de contenido"/>
+          <p:cNvSpPr>
+            <a:spLocks noGrp="1"/>
+          </p:cNvSpPr>
+          <p:nvPr>
+            <p:ph idx="1"/>
+          </p:nvPr>
+        </p:nvSpPr>
+        <p:spPr/>
+        <p:txBody>
+          <a:bodyPr>
+            <a:normAutofit/>
+          </a:bodyPr>
+          <a:lstStyle/>
+          <a:p>
+            <a:r>
+              <a:rPr lang="en-US" sz="2000" dirty="0" err="1" smtClean="0"/>
+              <a:t>Escrich</a:t>
+            </a:r>
+            <a:r>
+              <a:rPr lang="en-US" sz="2000" dirty="0" smtClean="0"/>
+              <a:t>, P. (2012, January). Quick deployment network using MANET. Retrieved March 4, 2013</a:t>
+            </a:r>
+          </a:p>
+          <a:p>
+            <a:r>
+              <a:rPr lang="es-ES" sz="2000" dirty="0" err="1" smtClean="0"/>
+              <a:t>Escrich</a:t>
+            </a:r>
+            <a:r>
+              <a:rPr lang="es-ES" sz="2000" dirty="0" smtClean="0"/>
+              <a:t>, P. (2012, </a:t>
+            </a:r>
+            <a:r>
+              <a:rPr lang="es-ES" sz="2000" dirty="0" err="1" smtClean="0"/>
+              <a:t>November</a:t>
+            </a:r>
+            <a:r>
+              <a:rPr lang="es-ES" sz="2000" dirty="0" smtClean="0"/>
+              <a:t> 17). </a:t>
+            </a:r>
+            <a:r>
+              <a:rPr lang="es-ES" sz="2000" dirty="0" err="1" smtClean="0"/>
+              <a:t>Xarxes</a:t>
+            </a:r>
+            <a:r>
+              <a:rPr lang="es-ES" sz="2000" dirty="0" smtClean="0"/>
+              <a:t> </a:t>
+            </a:r>
+            <a:r>
+              <a:rPr lang="es-ES" sz="2000" dirty="0" err="1" smtClean="0"/>
+              <a:t>Mesh</a:t>
+            </a:r>
+            <a:r>
+              <a:rPr lang="es-ES" sz="2000" dirty="0" smtClean="0"/>
+              <a:t>. </a:t>
+            </a:r>
+            <a:r>
+              <a:rPr lang="es-ES" sz="2000" dirty="0" err="1" smtClean="0"/>
+              <a:t>Curs</a:t>
+            </a:r>
+            <a:r>
+              <a:rPr lang="es-ES" sz="2000" dirty="0" smtClean="0"/>
+              <a:t> Guifi.net 2012. </a:t>
+            </a:r>
+            <a:r>
+              <a:rPr lang="es-ES" sz="2000" dirty="0" err="1" smtClean="0"/>
+              <a:t>Retrieved</a:t>
+            </a:r>
+            <a:r>
+              <a:rPr lang="es-ES" sz="2000" dirty="0" smtClean="0"/>
+              <a:t> </a:t>
+            </a:r>
+            <a:r>
+              <a:rPr lang="es-ES" sz="2000" dirty="0" err="1" smtClean="0"/>
+              <a:t>March</a:t>
+            </a:r>
+            <a:r>
+              <a:rPr lang="es-ES" sz="2000" dirty="0" smtClean="0"/>
+              <a:t> 5, 2013</a:t>
+            </a:r>
+          </a:p>
+          <a:p>
+            <a:r>
+              <a:rPr lang="en-US" sz="2000" dirty="0" smtClean="0"/>
+              <a:t>Mobile ad hoc network. (</a:t>
+            </a:r>
+            <a:r>
+              <a:rPr lang="en-US" sz="2000" dirty="0" err="1" smtClean="0"/>
+              <a:t>n.d</a:t>
+            </a:r>
+            <a:r>
+              <a:rPr lang="en-US" sz="2000" dirty="0" smtClean="0"/>
+              <a:t>.). In </a:t>
+            </a:r>
+            <a:r>
+              <a:rPr lang="en-US" sz="2000" i="1" dirty="0" smtClean="0"/>
+              <a:t>Wikipedia</a:t>
+            </a:r>
+            <a:r>
+              <a:rPr lang="en-US" sz="2000" dirty="0" smtClean="0"/>
+              <a:t>. Retrieved March 4, 2013, from http://en.wikipedia.org/wiki/Mobile_ad_hoc_network</a:t>
+            </a:r>
+          </a:p>
+          <a:p>
+            <a:r>
+              <a:rPr lang="en-US" sz="2000" dirty="0" smtClean="0"/>
+              <a:t>Starting a Community. (2013, January 11). In </a:t>
+            </a:r>
+            <a:r>
+              <a:rPr lang="en-US" sz="2000" i="1" dirty="0" smtClean="0"/>
+              <a:t>Quick Mesh Project</a:t>
+            </a:r>
+            <a:r>
+              <a:rPr lang="en-US" sz="2000" dirty="0" smtClean="0"/>
+              <a:t>. Retrieved March 5, 2013, from http://qmp.cat/projects/qmp/wiki/Starting </a:t>
+            </a:r>
+          </a:p>
+          <a:p>
+            <a:r>
+              <a:rPr lang="en-US" sz="2000" dirty="0" smtClean="0"/>
+              <a:t>Roaming-Community/Collaborative. (2012, June 26). In </a:t>
+            </a:r>
+            <a:r>
+              <a:rPr lang="en-US" sz="2000" i="1" dirty="0" smtClean="0"/>
+              <a:t>Quick Mesh Project</a:t>
+            </a:r>
+            <a:r>
+              <a:rPr lang="en-US" sz="2000" dirty="0" smtClean="0"/>
+              <a:t>. Retrieved March 5, 2013, from http://qmp.cat/projects/qmp/wiki/Roaming-Collaborative </a:t>
+            </a:r>
+          </a:p>
+          <a:p>
+            <a:r>
+              <a:rPr lang="en-US" sz="2000" dirty="0" smtClean="0"/>
+              <a:t>QMP users mailing list</a:t>
+            </a:r>
+            <a:br>
+              <a:rPr lang="en-US" sz="2000" dirty="0" smtClean="0"/>
+            </a:br>
+            <a:endParaRPr lang="es-ES" sz="2000" dirty="0"/>
+          </a:p>
+        </p:txBody>
+      </p:sp>
+      <p:sp>
+        <p:nvSpPr>
+          <p:cNvPr id="4" name="3 Marcador de número de diapositiva"/>
+          <p:cNvSpPr>
+            <a:spLocks noGrp="1"/>
+          </p:cNvSpPr>
+          <p:nvPr>
+            <p:ph type="sldNum" sz="quarter" idx="12"/>
+          </p:nvPr>
+        </p:nvSpPr>
+        <p:spPr/>
+        <p:txBody>
+          <a:bodyPr/>
+          <a:lstStyle/>
+          <a:p>
+            <a:fld id="{DA3FA644-4273-4B12-888A-E74B32B8A478}" type="slidenum">
+              <a:rPr lang="ru-RU" smtClean="0"/>
+              <a:pPr/>
+              <a:t>14</a:t>
+            </a:fld>
+            <a:endParaRPr lang="ru-RU"/>
+          </a:p>
+        </p:txBody>
+      </p:sp>
+    </p:spTree>
+  </p:cSld>
+  <p:clrMapOvr>
+    <a:masterClrMapping/>
+  </p:clrMapOvr>
+  <p:timing>
+    <p:tnLst>
+      <p:par>
+        <p:cTn id="1" dur="indefinite" restart="never" nodeType="tmRoot"/>
+      </p:par>
+    </p:tnLst>
+  </p:timing>
+</p:sld>
+</file>
+
+<file path=ppt/slides/slide15.xml><?xml version="1.0" encoding="utf-8"?>
+<p:sld xmlns:a="http://schemas.openxmlformats.org/drawingml/2006/main" xmlns:r="http://schemas.openxmlformats.org/officeDocument/2006/relationships" xmlns:p="http://schemas.openxmlformats.org/presentationml/2006/main">
+  <p:cSld>
+    <p:spTree>
+      <p:nvGrpSpPr>
+        <p:cNvPr id="1" name=""/>
+        <p:cNvGrpSpPr/>
+        <p:nvPr/>
+      </p:nvGrpSpPr>
+      <p:grpSpPr>
+        <a:xfrm>
+          <a:off x="0" y="0"/>
+          <a:ext cx="0" cy="0"/>
+          <a:chOff x="0" y="0"/>
+          <a:chExt cx="0" cy="0"/>
+        </a:xfrm>
+      </p:grpSpPr>
+      <p:sp>
+        <p:nvSpPr>
           <p:cNvPr id="2" name="Title 1"/>
           <p:cNvSpPr>
             <a:spLocks noGrp="1"/>
@@ -6684,7 +7629,7 @@
             <a:fld id="{DA3FA644-4273-4B12-888A-E74B32B8A478}" type="slidenum">
               <a:rPr lang="ru-RU" smtClean="0"/>
               <a:pPr/>
-              <a:t>14</a:t>
+              <a:t>15</a:t>
             </a:fld>
             <a:endParaRPr lang="ru-RU"/>
           </a:p>
@@ -6729,129 +7674,7 @@
       </p:grpSpPr>
       <p:sp>
         <p:nvSpPr>
-          <p:cNvPr id="2" name="Title 1"/>
-          <p:cNvSpPr>
-            <a:spLocks noGrp="1"/>
-          </p:cNvSpPr>
-          <p:nvPr>
-            <p:ph type="title"/>
-          </p:nvPr>
-        </p:nvSpPr>
-        <p:spPr/>
-        <p:txBody>
-          <a:bodyPr/>
-          <a:lstStyle/>
-          <a:p>
-            <a:r>
-              <a:rPr lang="en-US" dirty="0" smtClean="0"/>
-              <a:t>Outline</a:t>
-            </a:r>
-            <a:endParaRPr lang="en-US" dirty="0"/>
-          </a:p>
-        </p:txBody>
-      </p:sp>
-      <p:sp>
-        <p:nvSpPr>
-          <p:cNvPr id="3" name="Content Placeholder 2"/>
-          <p:cNvSpPr>
-            <a:spLocks noGrp="1"/>
-          </p:cNvSpPr>
-          <p:nvPr>
-            <p:ph idx="1"/>
-          </p:nvPr>
-        </p:nvSpPr>
-        <p:spPr/>
-        <p:txBody>
-          <a:bodyPr/>
-          <a:lstStyle/>
-          <a:p>
-            <a:r>
-              <a:rPr lang="en-US" dirty="0" smtClean="0"/>
-              <a:t>Introduction</a:t>
-            </a:r>
-          </a:p>
-          <a:p>
-            <a:r>
-              <a:rPr lang="en-US" dirty="0" smtClean="0"/>
-              <a:t>Mesh and </a:t>
-            </a:r>
-            <a:r>
-              <a:rPr lang="en-US" dirty="0" err="1" smtClean="0"/>
-              <a:t>Manet</a:t>
-            </a:r>
-            <a:r>
-              <a:rPr lang="en-US" dirty="0" smtClean="0"/>
-              <a:t> Networks</a:t>
-            </a:r>
-          </a:p>
-          <a:p>
-            <a:r>
-              <a:rPr lang="en-US" dirty="0" smtClean="0"/>
-              <a:t>QMP</a:t>
-            </a:r>
-          </a:p>
-          <a:p>
-            <a:pPr lvl="1"/>
-            <a:r>
-              <a:rPr lang="en-US" dirty="0" smtClean="0"/>
-              <a:t>Main features</a:t>
-            </a:r>
-          </a:p>
-          <a:p>
-            <a:pPr lvl="1"/>
-            <a:r>
-              <a:rPr lang="en-US" dirty="0" smtClean="0"/>
-              <a:t>Quick deployments</a:t>
-            </a:r>
-          </a:p>
-          <a:p>
-            <a:pPr lvl="1"/>
-            <a:r>
-              <a:rPr lang="en-US" dirty="0" smtClean="0"/>
-              <a:t>Addressing</a:t>
-            </a:r>
-          </a:p>
-          <a:p>
-            <a:pPr lvl="1"/>
-            <a:r>
-              <a:rPr lang="en-US" dirty="0" smtClean="0"/>
-              <a:t>Modes</a:t>
-            </a:r>
-          </a:p>
-          <a:p>
-            <a:pPr lvl="1"/>
-            <a:r>
-              <a:rPr lang="en-US" dirty="0" smtClean="0"/>
-              <a:t>Dynamic Routing Protocol</a:t>
-            </a:r>
-          </a:p>
-          <a:p>
-            <a:pPr lvl="1"/>
-            <a:r>
-              <a:rPr lang="en-US" dirty="0" smtClean="0"/>
-              <a:t>BMX6</a:t>
-            </a:r>
-          </a:p>
-          <a:p>
-            <a:r>
-              <a:rPr lang="en-US" dirty="0" smtClean="0"/>
-              <a:t>Mobile Node</a:t>
-            </a:r>
-          </a:p>
-          <a:p>
-            <a:r>
-              <a:rPr lang="en-US" dirty="0" smtClean="0"/>
-              <a:t>Information sources</a:t>
-            </a:r>
-          </a:p>
-          <a:p>
-            <a:endParaRPr lang="en-US" dirty="0"/>
-          </a:p>
-        </p:txBody>
-      </p:sp>
-      <p:sp>
-        <p:nvSpPr>
-          <p:cNvPr id="4" name="Slide Number Placeholder 3"/>
+          <p:cNvPr id="4" name="3 Marcador de número de diapositiva"/>
           <p:cNvSpPr>
             <a:spLocks noGrp="1"/>
           </p:cNvSpPr>
@@ -6873,12 +7696,145 @@
           </a:p>
         </p:txBody>
       </p:sp>
+      <p:sp>
+        <p:nvSpPr>
+          <p:cNvPr id="5" name="4 Rectángulo"/>
+          <p:cNvSpPr/>
+          <p:nvPr/>
+        </p:nvSpPr>
+        <p:spPr>
+          <a:xfrm>
+            <a:off x="1403648" y="1988840"/>
+            <a:ext cx="5616624" cy="2160240"/>
+          </a:xfrm>
+          <a:prstGeom prst="rect">
+            <a:avLst/>
+          </a:prstGeom>
+        </p:spPr>
+        <p:style>
+          <a:lnRef idx="2">
+            <a:schemeClr val="accent1">
+              <a:shade val="50000"/>
+            </a:schemeClr>
+          </a:lnRef>
+          <a:fillRef idx="1">
+            <a:schemeClr val="accent1"/>
+          </a:fillRef>
+          <a:effectRef idx="0">
+            <a:schemeClr val="accent1"/>
+          </a:effectRef>
+          <a:fontRef idx="minor">
+            <a:schemeClr val="lt1"/>
+          </a:fontRef>
+        </p:style>
+        <p:txBody>
+          <a:bodyPr rtlCol="0" anchor="ctr"/>
+          <a:lstStyle/>
+          <a:p>
+            <a:pPr algn="ctr"/>
+            <a:endParaRPr lang="es-ES" dirty="0"/>
+          </a:p>
+        </p:txBody>
+      </p:sp>
+      <p:sp>
+        <p:nvSpPr>
+          <p:cNvPr id="6" name="5 CuadroTexto"/>
+          <p:cNvSpPr txBox="1"/>
+          <p:nvPr/>
+        </p:nvSpPr>
+        <p:spPr>
+          <a:xfrm>
+            <a:off x="1547664" y="2132856"/>
+            <a:ext cx="5544616" cy="923330"/>
+          </a:xfrm>
+          <a:prstGeom prst="rect">
+            <a:avLst/>
+          </a:prstGeom>
+          <a:noFill/>
+        </p:spPr>
+        <p:txBody>
+          <a:bodyPr wrap="square" rtlCol="0">
+            <a:spAutoFit/>
+          </a:bodyPr>
+          <a:lstStyle/>
+          <a:p>
+            <a:r>
+              <a:rPr lang="en-US" dirty="0" smtClean="0"/>
+              <a:t>Mobile Node - </a:t>
+            </a:r>
+            <a:r>
+              <a:rPr lang="en-US" dirty="0" err="1" smtClean="0"/>
+              <a:t>Qmp</a:t>
+            </a:r>
+            <a:r>
+              <a:rPr lang="en-US" dirty="0" smtClean="0"/>
+              <a:t> Presentation is licensed under a </a:t>
+            </a:r>
+            <a:r>
+              <a:rPr lang="en-US" dirty="0" smtClean="0">
+                <a:hlinkClick r:id="rId2"/>
+              </a:rPr>
+              <a:t>Creative Commons Attribution-</a:t>
+            </a:r>
+            <a:r>
+              <a:rPr lang="en-US" dirty="0" err="1" smtClean="0">
+                <a:hlinkClick r:id="rId2"/>
+              </a:rPr>
+              <a:t>ShareAlike</a:t>
+            </a:r>
+            <a:r>
+              <a:rPr lang="en-US" dirty="0" smtClean="0">
+                <a:hlinkClick r:id="rId2"/>
+              </a:rPr>
+              <a:t> 3.0 </a:t>
+            </a:r>
+            <a:r>
+              <a:rPr lang="en-US" dirty="0" err="1" smtClean="0">
+                <a:hlinkClick r:id="rId2"/>
+              </a:rPr>
+              <a:t>Unported</a:t>
+            </a:r>
+            <a:r>
+              <a:rPr lang="en-US" dirty="0" smtClean="0">
+                <a:hlinkClick r:id="rId2"/>
+              </a:rPr>
+              <a:t> License</a:t>
+            </a:r>
+            <a:r>
+              <a:rPr lang="en-US" dirty="0" smtClean="0"/>
+              <a:t>.</a:t>
+            </a:r>
+            <a:endParaRPr lang="es-ES" dirty="0"/>
+          </a:p>
+        </p:txBody>
+      </p:sp>
+      <p:pic>
+        <p:nvPicPr>
+          <p:cNvPr id="1026" name="Picture 2" descr="Creative Commons License"/>
+          <p:cNvPicPr>
+            <a:picLocks noChangeAspect="1" noChangeArrowheads="1"/>
+          </p:cNvPicPr>
+          <p:nvPr/>
+        </p:nvPicPr>
+        <p:blipFill>
+          <a:blip r:embed="rId3" cstate="print"/>
+          <a:srcRect/>
+          <a:stretch>
+            <a:fillRect/>
+          </a:stretch>
+        </p:blipFill>
+        <p:spPr bwMode="auto">
+          <a:xfrm>
+            <a:off x="3347864" y="3212976"/>
+            <a:ext cx="1800200" cy="634161"/>
+          </a:xfrm>
+          <a:prstGeom prst="rect">
+            <a:avLst/>
+          </a:prstGeom>
+          <a:noFill/>
+        </p:spPr>
+      </p:pic>
     </p:spTree>
-    <p:extLst>
-      <p:ext uri="{BB962C8B-B14F-4D97-AF65-F5344CB8AC3E}">
-        <p14:creationId xmlns="" xmlns:p14="http://schemas.microsoft.com/office/powerpoint/2010/main" val="2734673611"/>
-      </p:ext>
-    </p:extLst>
   </p:cSld>
   <p:clrMapOvr>
     <a:masterClrMapping/>
@@ -6927,7 +7883,7 @@
           <a:p>
             <a:r>
               <a:rPr lang="en-US" dirty="0" smtClean="0"/>
-              <a:t>Introduction</a:t>
+              <a:t>Outline</a:t>
             </a:r>
             <a:endParaRPr lang="en-US" dirty="0"/>
           </a:p>
@@ -6948,15 +7904,87 @@
           <a:bodyPr/>
           <a:lstStyle/>
           <a:p>
-            <a:pPr algn="just"/>
             <a:r>
               <a:rPr lang="en-US" dirty="0" smtClean="0"/>
-              <a:t>The </a:t>
-            </a:r>
-            <a:r>
-              <a:rPr lang="en-US" dirty="0"/>
-              <a:t>main idea within the Mobile Node Pilot is to create a free transmission workstation that can be used in the urban space and contributes to the digital mesh through other networks.</a:t>
-            </a:r>
+              <a:t>Introduction</a:t>
+            </a:r>
+          </a:p>
+          <a:p>
+            <a:r>
+              <a:rPr lang="en-US" dirty="0" smtClean="0"/>
+              <a:t>Mesh and </a:t>
+            </a:r>
+            <a:r>
+              <a:rPr lang="en-US" dirty="0" err="1" smtClean="0"/>
+              <a:t>Manet</a:t>
+            </a:r>
+            <a:r>
+              <a:rPr lang="en-US" dirty="0" smtClean="0"/>
+              <a:t> Networks</a:t>
+            </a:r>
+          </a:p>
+          <a:p>
+            <a:r>
+              <a:rPr lang="en-US" dirty="0" smtClean="0"/>
+              <a:t>QMP</a:t>
+            </a:r>
+          </a:p>
+          <a:p>
+            <a:pPr lvl="1"/>
+            <a:r>
+              <a:rPr lang="en-US" dirty="0" smtClean="0"/>
+              <a:t>Main features</a:t>
+            </a:r>
+          </a:p>
+          <a:p>
+            <a:pPr lvl="1"/>
+            <a:r>
+              <a:rPr lang="en-US" dirty="0" smtClean="0"/>
+              <a:t>Quick deployments</a:t>
+            </a:r>
+          </a:p>
+          <a:p>
+            <a:pPr lvl="1"/>
+            <a:r>
+              <a:rPr lang="en-US" dirty="0" smtClean="0"/>
+              <a:t>Addressing</a:t>
+            </a:r>
+          </a:p>
+          <a:p>
+            <a:pPr lvl="1"/>
+            <a:r>
+              <a:rPr lang="en-US" dirty="0" smtClean="0"/>
+              <a:t>Modes</a:t>
+            </a:r>
+          </a:p>
+          <a:p>
+            <a:pPr lvl="1"/>
+            <a:r>
+              <a:rPr lang="en-US" dirty="0" smtClean="0"/>
+              <a:t>Dynamic Routing Protocol</a:t>
+            </a:r>
+          </a:p>
+          <a:p>
+            <a:pPr lvl="1"/>
+            <a:r>
+              <a:rPr lang="en-US" dirty="0" smtClean="0"/>
+              <a:t>BMX6</a:t>
+            </a:r>
+          </a:p>
+          <a:p>
+            <a:r>
+              <a:rPr lang="en-US" dirty="0" smtClean="0"/>
+              <a:t>Mobile Node</a:t>
+            </a:r>
+          </a:p>
+          <a:p>
+            <a:r>
+              <a:rPr lang="en-US" dirty="0" smtClean="0"/>
+              <a:t>Information sources</a:t>
+            </a:r>
+          </a:p>
+          <a:p>
+            <a:endParaRPr lang="en-US" dirty="0"/>
           </a:p>
         </p:txBody>
       </p:sp>
@@ -6979,6 +8007,117 @@
               <a:rPr lang="ru-RU" smtClean="0"/>
               <a:pPr/>
               <a:t>3</a:t>
+            </a:fld>
+            <a:endParaRPr lang="ru-RU"/>
+          </a:p>
+        </p:txBody>
+      </p:sp>
+    </p:spTree>
+    <p:extLst>
+      <p:ext uri="{BB962C8B-B14F-4D97-AF65-F5344CB8AC3E}">
+        <p14:creationId xmlns="" xmlns:p14="http://schemas.microsoft.com/office/powerpoint/2010/main" val="2734673611"/>
+      </p:ext>
+    </p:extLst>
+  </p:cSld>
+  <p:clrMapOvr>
+    <a:masterClrMapping/>
+  </p:clrMapOvr>
+  <p:timing>
+    <p:tnLst>
+      <p:par>
+        <p:cTn id="1" dur="indefinite" restart="never" nodeType="tmRoot"/>
+      </p:par>
+    </p:tnLst>
+  </p:timing>
+</p:sld>
+</file>
+
+<file path=ppt/slides/slide4.xml><?xml version="1.0" encoding="utf-8"?>
+<p:sld xmlns:a="http://schemas.openxmlformats.org/drawingml/2006/main" xmlns:r="http://schemas.openxmlformats.org/officeDocument/2006/relationships" xmlns:p="http://schemas.openxmlformats.org/presentationml/2006/main">
+  <p:cSld>
+    <p:spTree>
+      <p:nvGrpSpPr>
+        <p:cNvPr id="1" name=""/>
+        <p:cNvGrpSpPr/>
+        <p:nvPr/>
+      </p:nvGrpSpPr>
+      <p:grpSpPr>
+        <a:xfrm>
+          <a:off x="0" y="0"/>
+          <a:ext cx="0" cy="0"/>
+          <a:chOff x="0" y="0"/>
+          <a:chExt cx="0" cy="0"/>
+        </a:xfrm>
+      </p:grpSpPr>
+      <p:sp>
+        <p:nvSpPr>
+          <p:cNvPr id="2" name="Title 1"/>
+          <p:cNvSpPr>
+            <a:spLocks noGrp="1"/>
+          </p:cNvSpPr>
+          <p:nvPr>
+            <p:ph type="title"/>
+          </p:nvPr>
+        </p:nvSpPr>
+        <p:spPr/>
+        <p:txBody>
+          <a:bodyPr/>
+          <a:lstStyle/>
+          <a:p>
+            <a:r>
+              <a:rPr lang="en-US" dirty="0" smtClean="0"/>
+              <a:t>Introduction</a:t>
+            </a:r>
+            <a:endParaRPr lang="en-US" dirty="0"/>
+          </a:p>
+        </p:txBody>
+      </p:sp>
+      <p:sp>
+        <p:nvSpPr>
+          <p:cNvPr id="3" name="Content Placeholder 2"/>
+          <p:cNvSpPr>
+            <a:spLocks noGrp="1"/>
+          </p:cNvSpPr>
+          <p:nvPr>
+            <p:ph idx="1"/>
+          </p:nvPr>
+        </p:nvSpPr>
+        <p:spPr/>
+        <p:txBody>
+          <a:bodyPr/>
+          <a:lstStyle/>
+          <a:p>
+            <a:pPr algn="just"/>
+            <a:r>
+              <a:rPr lang="en-US" dirty="0" smtClean="0"/>
+              <a:t>The </a:t>
+            </a:r>
+            <a:r>
+              <a:rPr lang="en-US" dirty="0"/>
+              <a:t>main idea within the Mobile Node Pilot is to create a free transmission workstation that can be used in the urban space and contributes to the digital mesh through other networks.</a:t>
+            </a:r>
+          </a:p>
+        </p:txBody>
+      </p:sp>
+      <p:sp>
+        <p:nvSpPr>
+          <p:cNvPr id="4" name="Slide Number Placeholder 3"/>
+          <p:cNvSpPr>
+            <a:spLocks noGrp="1"/>
+          </p:cNvSpPr>
+          <p:nvPr>
+            <p:ph type="sldNum" sz="quarter" idx="12"/>
+          </p:nvPr>
+        </p:nvSpPr>
+        <p:spPr/>
+        <p:txBody>
+          <a:bodyPr/>
+          <a:lstStyle/>
+          <a:p>
+            <a:fld id="{DA3FA644-4273-4B12-888A-E74B32B8A478}" type="slidenum">
+              <a:rPr lang="ru-RU" smtClean="0"/>
+              <a:pPr/>
+              <a:t>4</a:t>
             </a:fld>
             <a:endParaRPr lang="ru-RU"/>
           </a:p>
@@ -7045,7 +8184,7 @@
 </p:sld>
 </file>
 
-<file path=ppt/slides/slide4.xml><?xml version="1.0" encoding="utf-8"?>
+<file path=ppt/slides/slide5.xml><?xml version="1.0" encoding="utf-8"?>
 <p:sld xmlns:a="http://schemas.openxmlformats.org/drawingml/2006/main" xmlns:r="http://schemas.openxmlformats.org/officeDocument/2006/relationships" xmlns:p="http://schemas.openxmlformats.org/presentationml/2006/main">
   <p:cSld>
     <p:spTree>
@@ -7115,7 +8254,7 @@
             <a:fld id="{DA3FA644-4273-4B12-888A-E74B32B8A478}" type="slidenum">
               <a:rPr lang="ru-RU" smtClean="0"/>
               <a:pPr/>
-              <a:t>4</a:t>
+              <a:t>5</a:t>
             </a:fld>
             <a:endParaRPr lang="ru-RU"/>
           </a:p>
@@ -7144,17 +8283,8 @@
             <a:pPr lvl="1" algn="just"/>
             <a:r>
               <a:rPr lang="en-US" dirty="0" smtClean="0"/>
-              <a:t>A mesh network is a network where all the participants are also routers. </a:t>
-            </a:r>
-            <a:r>
-              <a:rPr lang="en-US" dirty="0" smtClean="0"/>
-              <a:t>They are, normally, level 3 networks (Network layer) although they can also be link layer networks</a:t>
-            </a:r>
-            <a:r>
-              <a:rPr lang="en-US" dirty="0" smtClean="0"/>
-              <a:t>.</a:t>
-            </a:r>
-            <a:endParaRPr lang="en-US" dirty="0" smtClean="0"/>
+              <a:t>A mesh network is a network where all the participants are also routers. They are, normally, level 3 networks (Network layer) although they can also be link layer networks.</a:t>
+            </a:r>
           </a:p>
           <a:p>
             <a:pPr lvl="1" algn="just"/>
@@ -7256,7 +8386,7 @@
 </p:sld>
 </file>
 
-<file path=ppt/slides/slide5.xml><?xml version="1.0" encoding="utf-8"?>
+<file path=ppt/slides/slide6.xml><?xml version="1.0" encoding="utf-8"?>
 <p:sld xmlns:a="http://schemas.openxmlformats.org/drawingml/2006/main" xmlns:r="http://schemas.openxmlformats.org/officeDocument/2006/relationships" xmlns:p="http://schemas.openxmlformats.org/presentationml/2006/main">
   <p:cSld>
     <p:spTree>
@@ -7386,7 +8516,7 @@
             <a:fld id="{DA3FA644-4273-4B12-888A-E74B32B8A478}" type="slidenum">
               <a:rPr lang="ru-RU" smtClean="0"/>
               <a:pPr/>
-              <a:t>5</a:t>
+              <a:t>6</a:t>
             </a:fld>
             <a:endParaRPr lang="ru-RU"/>
           </a:p>
@@ -7433,7 +8563,7 @@
 </p:sld>
 </file>
 
-<file path=ppt/slides/slide6.xml><?xml version="1.0" encoding="utf-8"?>
+<file path=ppt/slides/slide7.xml><?xml version="1.0" encoding="utf-8"?>
 <p:sld xmlns:a="http://schemas.openxmlformats.org/drawingml/2006/main" xmlns:r="http://schemas.openxmlformats.org/officeDocument/2006/relationships" xmlns:p="http://schemas.openxmlformats.org/presentationml/2006/main">
   <p:cSld>
     <p:spTree>
@@ -7581,7 +8711,7 @@
             <a:fld id="{DA3FA644-4273-4B12-888A-E74B32B8A478}" type="slidenum">
               <a:rPr lang="ru-RU" smtClean="0"/>
               <a:pPr/>
-              <a:t>6</a:t>
+              <a:t>7</a:t>
             </a:fld>
             <a:endParaRPr lang="ru-RU"/>
           </a:p>
@@ -7643,7 +8773,7 @@
 </p:sld>
 </file>
 
-<file path=ppt/slides/slide7.xml><?xml version="1.0" encoding="utf-8"?>
+<file path=ppt/slides/slide8.xml><?xml version="1.0" encoding="utf-8"?>
 <p:sld xmlns:a="http://schemas.openxmlformats.org/drawingml/2006/main" xmlns:r="http://schemas.openxmlformats.org/officeDocument/2006/relationships" xmlns:p="http://schemas.openxmlformats.org/presentationml/2006/main">
   <p:cSld>
     <p:spTree>
@@ -7701,7 +8831,7 @@
             <a:fld id="{DA3FA644-4273-4B12-888A-E74B32B8A478}" type="slidenum">
               <a:rPr lang="ru-RU" smtClean="0"/>
               <a:pPr/>
-              <a:t>7</a:t>
+              <a:t>8</a:t>
             </a:fld>
             <a:endParaRPr lang="ru-RU"/>
           </a:p>
@@ -7850,7 +8980,7 @@
 </p:sld>
 </file>
 
-<file path=ppt/slides/slide8.xml><?xml version="1.0" encoding="utf-8"?>
+<file path=ppt/slides/slide9.xml><?xml version="1.0" encoding="utf-8"?>
 <p:sld xmlns:a="http://schemas.openxmlformats.org/drawingml/2006/main" xmlns:r="http://schemas.openxmlformats.org/officeDocument/2006/relationships" xmlns:p="http://schemas.openxmlformats.org/presentationml/2006/main">
   <p:cSld>
     <p:spTree>
@@ -7999,7 +9129,7 @@
             <a:fld id="{DA3FA644-4273-4B12-888A-E74B32B8A478}" type="slidenum">
               <a:rPr lang="ru-RU" smtClean="0"/>
               <a:pPr/>
-              <a:t>8</a:t>
+              <a:t>9</a:t>
             </a:fld>
             <a:endParaRPr lang="ru-RU"/>
           </a:p>
@@ -8548,950 +9678,6 @@
                                           <p:spTgt spid="3">
                                             <p:txEl>
                                               <p:pRg st="4" end="4"/>
-                                            </p:txEl>
-                                          </p:spTgt>
-                                        </p:tgtEl>
-                                        <p:attrNameLst>
-                                          <p:attrName>style.visibility</p:attrName>
-                                        </p:attrNameLst>
-                                      </p:cBhvr>
-                                      <p:to>
-                                        <p:strVal val="hidden"/>
-                                      </p:to>
-                                    </p:set>
-                                  </p:childTnLst>
-                                </p:cTn>
-                              </p:par>
-                            </p:childTnLst>
-                          </p:cTn>
-                        </p:par>
-                      </p:childTnLst>
-                    </p:cTn>
-                  </p:par>
-                </p:childTnLst>
-              </p:cTn>
-              <p:prevCondLst>
-                <p:cond evt="onPrev" delay="0">
-                  <p:tgtEl>
-                    <p:sldTgt/>
-                  </p:tgtEl>
-                </p:cond>
-              </p:prevCondLst>
-              <p:nextCondLst>
-                <p:cond evt="onNext" delay="0">
-                  <p:tgtEl>
-                    <p:sldTgt/>
-                  </p:tgtEl>
-                </p:cond>
-              </p:nextCondLst>
-            </p:seq>
-          </p:childTnLst>
-        </p:cTn>
-      </p:par>
-    </p:tnLst>
-    <p:bldLst>
-      <p:bldP spid="3" grpId="0" build="p"/>
-    </p:bldLst>
-  </p:timing>
-</p:sld>
-</file>
-
-<file path=ppt/slides/slide9.xml><?xml version="1.0" encoding="utf-8"?>
-<p:sld xmlns:a="http://schemas.openxmlformats.org/drawingml/2006/main" xmlns:r="http://schemas.openxmlformats.org/officeDocument/2006/relationships" xmlns:p="http://schemas.openxmlformats.org/presentationml/2006/main">
-  <p:cSld>
-    <p:spTree>
-      <p:nvGrpSpPr>
-        <p:cNvPr id="1" name=""/>
-        <p:cNvGrpSpPr/>
-        <p:nvPr/>
-      </p:nvGrpSpPr>
-      <p:grpSpPr>
-        <a:xfrm>
-          <a:off x="0" y="0"/>
-          <a:ext cx="0" cy="0"/>
-          <a:chOff x="0" y="0"/>
-          <a:chExt cx="0" cy="0"/>
-        </a:xfrm>
-      </p:grpSpPr>
-      <p:pic>
-        <p:nvPicPr>
-          <p:cNvPr id="1026" name="Picture 2"/>
-          <p:cNvPicPr>
-            <a:picLocks noChangeAspect="1" noChangeArrowheads="1"/>
-          </p:cNvPicPr>
-          <p:nvPr/>
-        </p:nvPicPr>
-        <p:blipFill>
-          <a:blip r:embed="rId2" cstate="print"/>
-          <a:srcRect/>
-          <a:stretch>
-            <a:fillRect/>
-          </a:stretch>
-        </p:blipFill>
-        <p:spPr bwMode="auto">
-          <a:xfrm>
-            <a:off x="467544" y="1412776"/>
-            <a:ext cx="7600950" cy="5181600"/>
-          </a:xfrm>
-          <a:prstGeom prst="rect">
-            <a:avLst/>
-          </a:prstGeom>
-          <a:noFill/>
-          <a:ln w="9525">
-            <a:noFill/>
-            <a:miter lim="800000"/>
-            <a:headEnd/>
-            <a:tailEnd/>
-          </a:ln>
-        </p:spPr>
-      </p:pic>
-      <p:sp>
-        <p:nvSpPr>
-          <p:cNvPr id="2" name="1 Título"/>
-          <p:cNvSpPr>
-            <a:spLocks noGrp="1"/>
-          </p:cNvSpPr>
-          <p:nvPr>
-            <p:ph type="title"/>
-          </p:nvPr>
-        </p:nvSpPr>
-        <p:spPr/>
-        <p:txBody>
-          <a:bodyPr/>
-          <a:lstStyle/>
-          <a:p>
-            <a:r>
-              <a:rPr lang="es-ES" dirty="0" smtClean="0"/>
-              <a:t>QMP</a:t>
-            </a:r>
-            <a:endParaRPr lang="es-ES" dirty="0"/>
-          </a:p>
-        </p:txBody>
-      </p:sp>
-      <p:sp>
-        <p:nvSpPr>
-          <p:cNvPr id="3" name="2 Marcador de contenido"/>
-          <p:cNvSpPr>
-            <a:spLocks noGrp="1"/>
-          </p:cNvSpPr>
-          <p:nvPr>
-            <p:ph idx="1"/>
-          </p:nvPr>
-        </p:nvSpPr>
-        <p:spPr>
-          <a:xfrm>
-            <a:off x="457200" y="1600200"/>
-            <a:ext cx="7620000" cy="4997152"/>
-          </a:xfrm>
-        </p:spPr>
-        <p:txBody>
-          <a:bodyPr>
-            <a:normAutofit/>
-          </a:bodyPr>
-          <a:lstStyle/>
-          <a:p>
-            <a:pPr>
-              <a:buNone/>
-            </a:pPr>
-            <a:r>
-              <a:rPr lang="en-US" b="1" dirty="0" smtClean="0"/>
-              <a:t>Modes</a:t>
-            </a:r>
-          </a:p>
-          <a:p>
-            <a:r>
-              <a:rPr lang="en-US" i="1" dirty="0" smtClean="0"/>
-              <a:t>Roaming</a:t>
-            </a:r>
-            <a:r>
-              <a:rPr lang="en-US" dirty="0" smtClean="0"/>
-              <a:t> for fast deployments:</a:t>
-            </a:r>
-          </a:p>
-          <a:p>
-            <a:pPr lvl="1"/>
-            <a:r>
-              <a:rPr lang="en-US" dirty="0" smtClean="0"/>
-              <a:t>All the access points in this mode will have the same IP and the same ESSID in order to allow users mobility, namely, they won’t lose the connection although they switch from an AP to another.</a:t>
-            </a:r>
-          </a:p>
-          <a:p>
-            <a:pPr lvl="1"/>
-            <a:r>
-              <a:rPr lang="en-US" dirty="0" smtClean="0"/>
-              <a:t>Every AP implements a NAT and so, two users attached to different APs won’t have direct vision between them.</a:t>
-            </a:r>
-          </a:p>
-          <a:p>
-            <a:endParaRPr lang="en-US" dirty="0" smtClean="0"/>
-          </a:p>
-          <a:p>
-            <a:r>
-              <a:rPr lang="en-US" i="1" dirty="0" smtClean="0"/>
-              <a:t>Community:</a:t>
-            </a:r>
-          </a:p>
-          <a:p>
-            <a:pPr lvl="1"/>
-            <a:r>
-              <a:rPr lang="en-US" dirty="0" smtClean="0"/>
-              <a:t>Every node will have a randomly assigned IPs range and will announce this range through the mesh.</a:t>
-            </a:r>
-          </a:p>
-          <a:p>
-            <a:pPr lvl="1"/>
-            <a:r>
-              <a:rPr lang="en-US" dirty="0" smtClean="0"/>
-              <a:t>There is not NAT, every user has direct vision with the others (1 hope away from the IPv4 network layer point of view), but mobility is not allowed (no roaming).</a:t>
-            </a:r>
-          </a:p>
-          <a:p>
-            <a:pPr lvl="1"/>
-            <a:endParaRPr lang="en-US" dirty="0" smtClean="0"/>
-          </a:p>
-          <a:p>
-            <a:pPr lvl="1"/>
-            <a:endParaRPr lang="en-US" dirty="0"/>
-          </a:p>
-        </p:txBody>
-      </p:sp>
-      <p:sp>
-        <p:nvSpPr>
-          <p:cNvPr id="4" name="3 Marcador de número de diapositiva"/>
-          <p:cNvSpPr>
-            <a:spLocks noGrp="1"/>
-          </p:cNvSpPr>
-          <p:nvPr>
-            <p:ph type="sldNum" sz="quarter" idx="12"/>
-          </p:nvPr>
-        </p:nvSpPr>
-        <p:spPr/>
-        <p:txBody>
-          <a:bodyPr/>
-          <a:lstStyle/>
-          <a:p>
-            <a:fld id="{DA3FA644-4273-4B12-888A-E74B32B8A478}" type="slidenum">
-              <a:rPr lang="ru-RU" smtClean="0"/>
-              <a:pPr/>
-              <a:t>9</a:t>
-            </a:fld>
-            <a:endParaRPr lang="ru-RU"/>
-          </a:p>
-        </p:txBody>
-      </p:sp>
-    </p:spTree>
-  </p:cSld>
-  <p:clrMapOvr>
-    <a:masterClrMapping/>
-  </p:clrMapOvr>
-  <p:timing>
-    <p:tnLst>
-      <p:par>
-        <p:cTn id="1" dur="indefinite" restart="never" nodeType="tmRoot">
-          <p:childTnLst>
-            <p:seq concurrent="1" nextAc="seek">
-              <p:cTn id="2" dur="indefinite" nodeType="mainSeq">
-                <p:childTnLst>
-                  <p:par>
-                    <p:cTn id="3" fill="hold">
-                      <p:stCondLst>
-                        <p:cond delay="indefinite"/>
-                      </p:stCondLst>
-                      <p:childTnLst>
-                        <p:par>
-                          <p:cTn id="4" fill="hold">
-                            <p:stCondLst>
-                              <p:cond delay="0"/>
-                            </p:stCondLst>
-                            <p:childTnLst>
-                              <p:par>
-                                <p:cTn id="5" presetID="31" presetClass="entr" presetSubtype="0" fill="hold" nodeType="clickEffect">
-                                  <p:stCondLst>
-                                    <p:cond delay="0"/>
-                                  </p:stCondLst>
-                                  <p:iterate type="lt">
-                                    <p:tmPct val="5000"/>
-                                  </p:iterate>
-                                  <p:childTnLst>
-                                    <p:set>
-                                      <p:cBhvr>
-                                        <p:cTn id="6" dur="1" fill="hold">
-                                          <p:stCondLst>
-                                            <p:cond delay="0"/>
-                                          </p:stCondLst>
-                                        </p:cTn>
-                                        <p:tgtEl>
-                                          <p:spTgt spid="1026"/>
-                                        </p:tgtEl>
-                                        <p:attrNameLst>
-                                          <p:attrName>style.visibility</p:attrName>
-                                        </p:attrNameLst>
-                                      </p:cBhvr>
-                                      <p:to>
-                                        <p:strVal val="visible"/>
-                                      </p:to>
-                                    </p:set>
-                                    <p:anim calcmode="lin" valueType="num">
-                                      <p:cBhvr>
-                                        <p:cTn id="7" dur="1000" fill="hold"/>
-                                        <p:tgtEl>
-                                          <p:spTgt spid="1026"/>
-                                        </p:tgtEl>
-                                        <p:attrNameLst>
-                                          <p:attrName>ppt_w</p:attrName>
-                                        </p:attrNameLst>
-                                      </p:cBhvr>
-                                      <p:tavLst>
-                                        <p:tav tm="0">
-                                          <p:val>
-                                            <p:fltVal val="0"/>
-                                          </p:val>
-                                        </p:tav>
-                                        <p:tav tm="100000">
-                                          <p:val>
-                                            <p:strVal val="#ppt_w"/>
-                                          </p:val>
-                                        </p:tav>
-                                      </p:tavLst>
-                                    </p:anim>
-                                    <p:anim calcmode="lin" valueType="num">
-                                      <p:cBhvr>
-                                        <p:cTn id="8" dur="1000" fill="hold"/>
-                                        <p:tgtEl>
-                                          <p:spTgt spid="1026"/>
-                                        </p:tgtEl>
-                                        <p:attrNameLst>
-                                          <p:attrName>ppt_h</p:attrName>
-                                        </p:attrNameLst>
-                                      </p:cBhvr>
-                                      <p:tavLst>
-                                        <p:tav tm="0">
-                                          <p:val>
-                                            <p:fltVal val="0"/>
-                                          </p:val>
-                                        </p:tav>
-                                        <p:tav tm="100000">
-                                          <p:val>
-                                            <p:strVal val="#ppt_h"/>
-                                          </p:val>
-                                        </p:tav>
-                                      </p:tavLst>
-                                    </p:anim>
-                                    <p:anim calcmode="lin" valueType="num">
-                                      <p:cBhvr>
-                                        <p:cTn id="9" dur="1000" fill="hold"/>
-                                        <p:tgtEl>
-                                          <p:spTgt spid="1026"/>
-                                        </p:tgtEl>
-                                        <p:attrNameLst>
-                                          <p:attrName>style.rotation</p:attrName>
-                                        </p:attrNameLst>
-                                      </p:cBhvr>
-                                      <p:tavLst>
-                                        <p:tav tm="0">
-                                          <p:val>
-                                            <p:fltVal val="90"/>
-                                          </p:val>
-                                        </p:tav>
-                                        <p:tav tm="100000">
-                                          <p:val>
-                                            <p:fltVal val="0"/>
-                                          </p:val>
-                                        </p:tav>
-                                      </p:tavLst>
-                                    </p:anim>
-                                    <p:animEffect transition="in" filter="fade">
-                                      <p:cBhvr>
-                                        <p:cTn id="10" dur="1000"/>
-                                        <p:tgtEl>
-                                          <p:spTgt spid="1026"/>
-                                        </p:tgtEl>
-                                      </p:cBhvr>
-                                    </p:animEffect>
-                                  </p:childTnLst>
-                                </p:cTn>
-                              </p:par>
-                              <p:par>
-                                <p:cTn id="11" presetID="2" presetClass="exit" presetSubtype="4" fill="hold" grpId="0" nodeType="withEffect">
-                                  <p:stCondLst>
-                                    <p:cond delay="0"/>
-                                  </p:stCondLst>
-                                  <p:childTnLst>
-                                    <p:anim calcmode="lin" valueType="num">
-                                      <p:cBhvr additive="base">
-                                        <p:cTn id="12" dur="500"/>
-                                        <p:tgtEl>
-                                          <p:spTgt spid="3">
-                                            <p:txEl>
-                                              <p:pRg st="0" end="0"/>
-                                            </p:txEl>
-                                          </p:spTgt>
-                                        </p:tgtEl>
-                                        <p:attrNameLst>
-                                          <p:attrName>ppt_x</p:attrName>
-                                        </p:attrNameLst>
-                                      </p:cBhvr>
-                                      <p:tavLst>
-                                        <p:tav tm="0">
-                                          <p:val>
-                                            <p:strVal val="ppt_x"/>
-                                          </p:val>
-                                        </p:tav>
-                                        <p:tav tm="100000">
-                                          <p:val>
-                                            <p:strVal val="ppt_x"/>
-                                          </p:val>
-                                        </p:tav>
-                                      </p:tavLst>
-                                    </p:anim>
-                                    <p:anim calcmode="lin" valueType="num">
-                                      <p:cBhvr additive="base">
-                                        <p:cTn id="13" dur="500"/>
-                                        <p:tgtEl>
-                                          <p:spTgt spid="3">
-                                            <p:txEl>
-                                              <p:pRg st="0" end="0"/>
-                                            </p:txEl>
-                                          </p:spTgt>
-                                        </p:tgtEl>
-                                        <p:attrNameLst>
-                                          <p:attrName>ppt_y</p:attrName>
-                                        </p:attrNameLst>
-                                      </p:cBhvr>
-                                      <p:tavLst>
-                                        <p:tav tm="0">
-                                          <p:val>
-                                            <p:strVal val="ppt_y"/>
-                                          </p:val>
-                                        </p:tav>
-                                        <p:tav tm="100000">
-                                          <p:val>
-                                            <p:strVal val="1+ppt_h/2"/>
-                                          </p:val>
-                                        </p:tav>
-                                      </p:tavLst>
-                                    </p:anim>
-                                    <p:set>
-                                      <p:cBhvr>
-                                        <p:cTn id="14" dur="1" fill="hold">
-                                          <p:stCondLst>
-                                            <p:cond delay="499"/>
-                                          </p:stCondLst>
-                                        </p:cTn>
-                                        <p:tgtEl>
-                                          <p:spTgt spid="3">
-                                            <p:txEl>
-                                              <p:pRg st="0" end="0"/>
-                                            </p:txEl>
-                                          </p:spTgt>
-                                        </p:tgtEl>
-                                        <p:attrNameLst>
-                                          <p:attrName>style.visibility</p:attrName>
-                                        </p:attrNameLst>
-                                      </p:cBhvr>
-                                      <p:to>
-                                        <p:strVal val="hidden"/>
-                                      </p:to>
-                                    </p:set>
-                                  </p:childTnLst>
-                                </p:cTn>
-                              </p:par>
-                              <p:par>
-                                <p:cTn id="15" presetID="2" presetClass="exit" presetSubtype="4" fill="hold" grpId="0" nodeType="withEffect">
-                                  <p:stCondLst>
-                                    <p:cond delay="0"/>
-                                  </p:stCondLst>
-                                  <p:childTnLst>
-                                    <p:anim calcmode="lin" valueType="num">
-                                      <p:cBhvr additive="base">
-                                        <p:cTn id="16" dur="500"/>
-                                        <p:tgtEl>
-                                          <p:spTgt spid="3">
-                                            <p:txEl>
-                                              <p:pRg st="1" end="1"/>
-                                            </p:txEl>
-                                          </p:spTgt>
-                                        </p:tgtEl>
-                                        <p:attrNameLst>
-                                          <p:attrName>ppt_x</p:attrName>
-                                        </p:attrNameLst>
-                                      </p:cBhvr>
-                                      <p:tavLst>
-                                        <p:tav tm="0">
-                                          <p:val>
-                                            <p:strVal val="ppt_x"/>
-                                          </p:val>
-                                        </p:tav>
-                                        <p:tav tm="100000">
-                                          <p:val>
-                                            <p:strVal val="ppt_x"/>
-                                          </p:val>
-                                        </p:tav>
-                                      </p:tavLst>
-                                    </p:anim>
-                                    <p:anim calcmode="lin" valueType="num">
-                                      <p:cBhvr additive="base">
-                                        <p:cTn id="17" dur="500"/>
-                                        <p:tgtEl>
-                                          <p:spTgt spid="3">
-                                            <p:txEl>
-                                              <p:pRg st="1" end="1"/>
-                                            </p:txEl>
-                                          </p:spTgt>
-                                        </p:tgtEl>
-                                        <p:attrNameLst>
-                                          <p:attrName>ppt_y</p:attrName>
-                                        </p:attrNameLst>
-                                      </p:cBhvr>
-                                      <p:tavLst>
-                                        <p:tav tm="0">
-                                          <p:val>
-                                            <p:strVal val="ppt_y"/>
-                                          </p:val>
-                                        </p:tav>
-                                        <p:tav tm="100000">
-                                          <p:val>
-                                            <p:strVal val="1+ppt_h/2"/>
-                                          </p:val>
-                                        </p:tav>
-                                      </p:tavLst>
-                                    </p:anim>
-                                    <p:set>
-                                      <p:cBhvr>
-                                        <p:cTn id="18" dur="1" fill="hold">
-                                          <p:stCondLst>
-                                            <p:cond delay="499"/>
-                                          </p:stCondLst>
-                                        </p:cTn>
-                                        <p:tgtEl>
-                                          <p:spTgt spid="3">
-                                            <p:txEl>
-                                              <p:pRg st="1" end="1"/>
-                                            </p:txEl>
-                                          </p:spTgt>
-                                        </p:tgtEl>
-                                        <p:attrNameLst>
-                                          <p:attrName>style.visibility</p:attrName>
-                                        </p:attrNameLst>
-                                      </p:cBhvr>
-                                      <p:to>
-                                        <p:strVal val="hidden"/>
-                                      </p:to>
-                                    </p:set>
-                                  </p:childTnLst>
-                                </p:cTn>
-                              </p:par>
-                              <p:par>
-                                <p:cTn id="19" presetID="2" presetClass="exit" presetSubtype="4" fill="hold" grpId="0" nodeType="withEffect">
-                                  <p:stCondLst>
-                                    <p:cond delay="0"/>
-                                  </p:stCondLst>
-                                  <p:childTnLst>
-                                    <p:anim calcmode="lin" valueType="num">
-                                      <p:cBhvr additive="base">
-                                        <p:cTn id="20" dur="500"/>
-                                        <p:tgtEl>
-                                          <p:spTgt spid="3">
-                                            <p:txEl>
-                                              <p:pRg st="2" end="2"/>
-                                            </p:txEl>
-                                          </p:spTgt>
-                                        </p:tgtEl>
-                                        <p:attrNameLst>
-                                          <p:attrName>ppt_x</p:attrName>
-                                        </p:attrNameLst>
-                                      </p:cBhvr>
-                                      <p:tavLst>
-                                        <p:tav tm="0">
-                                          <p:val>
-                                            <p:strVal val="ppt_x"/>
-                                          </p:val>
-                                        </p:tav>
-                                        <p:tav tm="100000">
-                                          <p:val>
-                                            <p:strVal val="ppt_x"/>
-                                          </p:val>
-                                        </p:tav>
-                                      </p:tavLst>
-                                    </p:anim>
-                                    <p:anim calcmode="lin" valueType="num">
-                                      <p:cBhvr additive="base">
-                                        <p:cTn id="21" dur="500"/>
-                                        <p:tgtEl>
-                                          <p:spTgt spid="3">
-                                            <p:txEl>
-                                              <p:pRg st="2" end="2"/>
-                                            </p:txEl>
-                                          </p:spTgt>
-                                        </p:tgtEl>
-                                        <p:attrNameLst>
-                                          <p:attrName>ppt_y</p:attrName>
-                                        </p:attrNameLst>
-                                      </p:cBhvr>
-                                      <p:tavLst>
-                                        <p:tav tm="0">
-                                          <p:val>
-                                            <p:strVal val="ppt_y"/>
-                                          </p:val>
-                                        </p:tav>
-                                        <p:tav tm="100000">
-                                          <p:val>
-                                            <p:strVal val="1+ppt_h/2"/>
-                                          </p:val>
-                                        </p:tav>
-                                      </p:tavLst>
-                                    </p:anim>
-                                    <p:set>
-                                      <p:cBhvr>
-                                        <p:cTn id="22" dur="1" fill="hold">
-                                          <p:stCondLst>
-                                            <p:cond delay="499"/>
-                                          </p:stCondLst>
-                                        </p:cTn>
-                                        <p:tgtEl>
-                                          <p:spTgt spid="3">
-                                            <p:txEl>
-                                              <p:pRg st="2" end="2"/>
-                                            </p:txEl>
-                                          </p:spTgt>
-                                        </p:tgtEl>
-                                        <p:attrNameLst>
-                                          <p:attrName>style.visibility</p:attrName>
-                                        </p:attrNameLst>
-                                      </p:cBhvr>
-                                      <p:to>
-                                        <p:strVal val="hidden"/>
-                                      </p:to>
-                                    </p:set>
-                                  </p:childTnLst>
-                                </p:cTn>
-                              </p:par>
-                              <p:par>
-                                <p:cTn id="23" presetID="2" presetClass="exit" presetSubtype="4" fill="hold" grpId="0" nodeType="withEffect">
-                                  <p:stCondLst>
-                                    <p:cond delay="0"/>
-                                  </p:stCondLst>
-                                  <p:childTnLst>
-                                    <p:anim calcmode="lin" valueType="num">
-                                      <p:cBhvr additive="base">
-                                        <p:cTn id="24" dur="500"/>
-                                        <p:tgtEl>
-                                          <p:spTgt spid="3">
-                                            <p:txEl>
-                                              <p:pRg st="3" end="3"/>
-                                            </p:txEl>
-                                          </p:spTgt>
-                                        </p:tgtEl>
-                                        <p:attrNameLst>
-                                          <p:attrName>ppt_x</p:attrName>
-                                        </p:attrNameLst>
-                                      </p:cBhvr>
-                                      <p:tavLst>
-                                        <p:tav tm="0">
-                                          <p:val>
-                                            <p:strVal val="ppt_x"/>
-                                          </p:val>
-                                        </p:tav>
-                                        <p:tav tm="100000">
-                                          <p:val>
-                                            <p:strVal val="ppt_x"/>
-                                          </p:val>
-                                        </p:tav>
-                                      </p:tavLst>
-                                    </p:anim>
-                                    <p:anim calcmode="lin" valueType="num">
-                                      <p:cBhvr additive="base">
-                                        <p:cTn id="25" dur="500"/>
-                                        <p:tgtEl>
-                                          <p:spTgt spid="3">
-                                            <p:txEl>
-                                              <p:pRg st="3" end="3"/>
-                                            </p:txEl>
-                                          </p:spTgt>
-                                        </p:tgtEl>
-                                        <p:attrNameLst>
-                                          <p:attrName>ppt_y</p:attrName>
-                                        </p:attrNameLst>
-                                      </p:cBhvr>
-                                      <p:tavLst>
-                                        <p:tav tm="0">
-                                          <p:val>
-                                            <p:strVal val="ppt_y"/>
-                                          </p:val>
-                                        </p:tav>
-                                        <p:tav tm="100000">
-                                          <p:val>
-                                            <p:strVal val="1+ppt_h/2"/>
-                                          </p:val>
-                                        </p:tav>
-                                      </p:tavLst>
-                                    </p:anim>
-                                    <p:set>
-                                      <p:cBhvr>
-                                        <p:cTn id="26" dur="1" fill="hold">
-                                          <p:stCondLst>
-                                            <p:cond delay="499"/>
-                                          </p:stCondLst>
-                                        </p:cTn>
-                                        <p:tgtEl>
-                                          <p:spTgt spid="3">
-                                            <p:txEl>
-                                              <p:pRg st="3" end="3"/>
-                                            </p:txEl>
-                                          </p:spTgt>
-                                        </p:tgtEl>
-                                        <p:attrNameLst>
-                                          <p:attrName>style.visibility</p:attrName>
-                                        </p:attrNameLst>
-                                      </p:cBhvr>
-                                      <p:to>
-                                        <p:strVal val="hidden"/>
-                                      </p:to>
-                                    </p:set>
-                                  </p:childTnLst>
-                                </p:cTn>
-                              </p:par>
-                              <p:par>
-                                <p:cTn id="27" presetID="2" presetClass="exit" presetSubtype="4" fill="hold" grpId="0" nodeType="withEffect">
-                                  <p:stCondLst>
-                                    <p:cond delay="0"/>
-                                  </p:stCondLst>
-                                  <p:childTnLst>
-                                    <p:anim calcmode="lin" valueType="num">
-                                      <p:cBhvr additive="base">
-                                        <p:cTn id="28" dur="500"/>
-                                        <p:tgtEl>
-                                          <p:spTgt spid="3">
-                                            <p:txEl>
-                                              <p:pRg st="5" end="5"/>
-                                            </p:txEl>
-                                          </p:spTgt>
-                                        </p:tgtEl>
-                                        <p:attrNameLst>
-                                          <p:attrName>ppt_x</p:attrName>
-                                        </p:attrNameLst>
-                                      </p:cBhvr>
-                                      <p:tavLst>
-                                        <p:tav tm="0">
-                                          <p:val>
-                                            <p:strVal val="ppt_x"/>
-                                          </p:val>
-                                        </p:tav>
-                                        <p:tav tm="100000">
-                                          <p:val>
-                                            <p:strVal val="ppt_x"/>
-                                          </p:val>
-                                        </p:tav>
-                                      </p:tavLst>
-                                    </p:anim>
-                                    <p:anim calcmode="lin" valueType="num">
-                                      <p:cBhvr additive="base">
-                                        <p:cTn id="29" dur="500"/>
-                                        <p:tgtEl>
-                                          <p:spTgt spid="3">
-                                            <p:txEl>
-                                              <p:pRg st="5" end="5"/>
-                                            </p:txEl>
-                                          </p:spTgt>
-                                        </p:tgtEl>
-                                        <p:attrNameLst>
-                                          <p:attrName>ppt_y</p:attrName>
-                                        </p:attrNameLst>
-                                      </p:cBhvr>
-                                      <p:tavLst>
-                                        <p:tav tm="0">
-                                          <p:val>
-                                            <p:strVal val="ppt_y"/>
-                                          </p:val>
-                                        </p:tav>
-                                        <p:tav tm="100000">
-                                          <p:val>
-                                            <p:strVal val="1+ppt_h/2"/>
-                                          </p:val>
-                                        </p:tav>
-                                      </p:tavLst>
-                                    </p:anim>
-                                    <p:set>
-                                      <p:cBhvr>
-                                        <p:cTn id="30" dur="1" fill="hold">
-                                          <p:stCondLst>
-                                            <p:cond delay="499"/>
-                                          </p:stCondLst>
-                                        </p:cTn>
-                                        <p:tgtEl>
-                                          <p:spTgt spid="3">
-                                            <p:txEl>
-                                              <p:pRg st="5" end="5"/>
-                                            </p:txEl>
-                                          </p:spTgt>
-                                        </p:tgtEl>
-                                        <p:attrNameLst>
-                                          <p:attrName>style.visibility</p:attrName>
-                                        </p:attrNameLst>
-                                      </p:cBhvr>
-                                      <p:to>
-                                        <p:strVal val="hidden"/>
-                                      </p:to>
-                                    </p:set>
-                                  </p:childTnLst>
-                                </p:cTn>
-                              </p:par>
-                              <p:par>
-                                <p:cTn id="31" presetID="2" presetClass="exit" presetSubtype="4" fill="hold" grpId="0" nodeType="withEffect">
-                                  <p:stCondLst>
-                                    <p:cond delay="0"/>
-                                  </p:stCondLst>
-                                  <p:childTnLst>
-                                    <p:anim calcmode="lin" valueType="num">
-                                      <p:cBhvr additive="base">
-                                        <p:cTn id="32" dur="500"/>
-                                        <p:tgtEl>
-                                          <p:spTgt spid="3">
-                                            <p:txEl>
-                                              <p:pRg st="6" end="6"/>
-                                            </p:txEl>
-                                          </p:spTgt>
-                                        </p:tgtEl>
-                                        <p:attrNameLst>
-                                          <p:attrName>ppt_x</p:attrName>
-                                        </p:attrNameLst>
-                                      </p:cBhvr>
-                                      <p:tavLst>
-                                        <p:tav tm="0">
-                                          <p:val>
-                                            <p:strVal val="ppt_x"/>
-                                          </p:val>
-                                        </p:tav>
-                                        <p:tav tm="100000">
-                                          <p:val>
-                                            <p:strVal val="ppt_x"/>
-                                          </p:val>
-                                        </p:tav>
-                                      </p:tavLst>
-                                    </p:anim>
-                                    <p:anim calcmode="lin" valueType="num">
-                                      <p:cBhvr additive="base">
-                                        <p:cTn id="33" dur="500"/>
-                                        <p:tgtEl>
-                                          <p:spTgt spid="3">
-                                            <p:txEl>
-                                              <p:pRg st="6" end="6"/>
-                                            </p:txEl>
-                                          </p:spTgt>
-                                        </p:tgtEl>
-                                        <p:attrNameLst>
-                                          <p:attrName>ppt_y</p:attrName>
-                                        </p:attrNameLst>
-                                      </p:cBhvr>
-                                      <p:tavLst>
-                                        <p:tav tm="0">
-                                          <p:val>
-                                            <p:strVal val="ppt_y"/>
-                                          </p:val>
-                                        </p:tav>
-                                        <p:tav tm="100000">
-                                          <p:val>
-                                            <p:strVal val="1+ppt_h/2"/>
-                                          </p:val>
-                                        </p:tav>
-                                      </p:tavLst>
-                                    </p:anim>
-                                    <p:set>
-                                      <p:cBhvr>
-                                        <p:cTn id="34" dur="1" fill="hold">
-                                          <p:stCondLst>
-                                            <p:cond delay="499"/>
-                                          </p:stCondLst>
-                                        </p:cTn>
-                                        <p:tgtEl>
-                                          <p:spTgt spid="3">
-                                            <p:txEl>
-                                              <p:pRg st="6" end="6"/>
-                                            </p:txEl>
-                                          </p:spTgt>
-                                        </p:tgtEl>
-                                        <p:attrNameLst>
-                                          <p:attrName>style.visibility</p:attrName>
-                                        </p:attrNameLst>
-                                      </p:cBhvr>
-                                      <p:to>
-                                        <p:strVal val="hidden"/>
-                                      </p:to>
-                                    </p:set>
-                                  </p:childTnLst>
-                                </p:cTn>
-                              </p:par>
-                              <p:par>
-                                <p:cTn id="35" presetID="2" presetClass="exit" presetSubtype="4" fill="hold" grpId="0" nodeType="withEffect">
-                                  <p:stCondLst>
-                                    <p:cond delay="0"/>
-                                  </p:stCondLst>
-                                  <p:childTnLst>
-                                    <p:anim calcmode="lin" valueType="num">
-                                      <p:cBhvr additive="base">
-                                        <p:cTn id="36" dur="500"/>
-                                        <p:tgtEl>
-                                          <p:spTgt spid="3">
-                                            <p:txEl>
-                                              <p:pRg st="7" end="7"/>
-                                            </p:txEl>
-                                          </p:spTgt>
-                                        </p:tgtEl>
-                                        <p:attrNameLst>
-                                          <p:attrName>ppt_x</p:attrName>
-                                        </p:attrNameLst>
-                                      </p:cBhvr>
-                                      <p:tavLst>
-                                        <p:tav tm="0">
-                                          <p:val>
-                                            <p:strVal val="ppt_x"/>
-                                          </p:val>
-                                        </p:tav>
-                                        <p:tav tm="100000">
-                                          <p:val>
-                                            <p:strVal val="ppt_x"/>
-                                          </p:val>
-                                        </p:tav>
-                                      </p:tavLst>
-                                    </p:anim>
-                                    <p:anim calcmode="lin" valueType="num">
-                                      <p:cBhvr additive="base">
-                                        <p:cTn id="37" dur="500"/>
-                                        <p:tgtEl>
-                                          <p:spTgt spid="3">
-                                            <p:txEl>
-                                              <p:pRg st="7" end="7"/>
-                                            </p:txEl>
-                                          </p:spTgt>
-                                        </p:tgtEl>
-                                        <p:attrNameLst>
-                                          <p:attrName>ppt_y</p:attrName>
-                                        </p:attrNameLst>
-                                      </p:cBhvr>
-                                      <p:tavLst>
-                                        <p:tav tm="0">
-                                          <p:val>
-                                            <p:strVal val="ppt_y"/>
-                                          </p:val>
-                                        </p:tav>
-                                        <p:tav tm="100000">
-                                          <p:val>
-                                            <p:strVal val="1+ppt_h/2"/>
-                                          </p:val>
-                                        </p:tav>
-                                      </p:tavLst>
-                                    </p:anim>
-                                    <p:set>
-                                      <p:cBhvr>
-                                        <p:cTn id="38" dur="1" fill="hold">
-                                          <p:stCondLst>
-                                            <p:cond delay="499"/>
-                                          </p:stCondLst>
-                                        </p:cTn>
-                                        <p:tgtEl>
-                                          <p:spTgt spid="3">
-                                            <p:txEl>
-                                              <p:pRg st="7" end="7"/>
                                             </p:txEl>
                                           </p:spTgt>
                                         </p:tgtEl>

</xml_diff>